<commit_message>
system design chapter update
</commit_message>
<xml_diff>
--- a/figures.pptx
+++ b/figures.pptx
@@ -9,6 +9,8 @@
     <p:sldId id="257" r:id="rId3"/>
     <p:sldId id="258" r:id="rId4"/>
     <p:sldId id="259" r:id="rId5"/>
+    <p:sldId id="260" r:id="rId6"/>
+    <p:sldId id="261" r:id="rId7"/>
   </p:sldIdLst>
   <p:sldSz cx="12192000" cy="6858000"/>
   <p:notesSz cx="6858000" cy="9144000"/>
@@ -116,6 +118,753 @@
 </file>
 
 <file path=ppt/diagrams/colors1.xml><?xml version="1.0" encoding="utf-8"?>
+<dgm:colorsDef xmlns:dgm="http://schemas.openxmlformats.org/drawingml/2006/diagram" xmlns:a="http://schemas.openxmlformats.org/drawingml/2006/main" uniqueId="urn:microsoft.com/office/officeart/2005/8/colors/accent1_2">
+  <dgm:title val=""/>
+  <dgm:desc val=""/>
+  <dgm:catLst>
+    <dgm:cat type="accent1" pri="11200"/>
+  </dgm:catLst>
+  <dgm:styleLbl name="node0">
+    <dgm:fillClrLst meth="repeat">
+      <a:schemeClr val="accent1"/>
+    </dgm:fillClrLst>
+    <dgm:linClrLst meth="repeat">
+      <a:schemeClr val="lt1"/>
+    </dgm:linClrLst>
+    <dgm:effectClrLst/>
+    <dgm:txLinClrLst/>
+    <dgm:txFillClrLst/>
+    <dgm:txEffectClrLst/>
+  </dgm:styleLbl>
+  <dgm:styleLbl name="alignNode1">
+    <dgm:fillClrLst meth="repeat">
+      <a:schemeClr val="accent1"/>
+    </dgm:fillClrLst>
+    <dgm:linClrLst meth="repeat">
+      <a:schemeClr val="accent1"/>
+    </dgm:linClrLst>
+    <dgm:effectClrLst/>
+    <dgm:txLinClrLst/>
+    <dgm:txFillClrLst/>
+    <dgm:txEffectClrLst/>
+  </dgm:styleLbl>
+  <dgm:styleLbl name="node1">
+    <dgm:fillClrLst meth="repeat">
+      <a:schemeClr val="accent1"/>
+    </dgm:fillClrLst>
+    <dgm:linClrLst meth="repeat">
+      <a:schemeClr val="lt1"/>
+    </dgm:linClrLst>
+    <dgm:effectClrLst/>
+    <dgm:txLinClrLst/>
+    <dgm:txFillClrLst/>
+    <dgm:txEffectClrLst/>
+  </dgm:styleLbl>
+  <dgm:styleLbl name="lnNode1">
+    <dgm:fillClrLst meth="repeat">
+      <a:schemeClr val="accent1"/>
+    </dgm:fillClrLst>
+    <dgm:linClrLst meth="repeat">
+      <a:schemeClr val="lt1"/>
+    </dgm:linClrLst>
+    <dgm:effectClrLst/>
+    <dgm:txLinClrLst/>
+    <dgm:txFillClrLst/>
+    <dgm:txEffectClrLst/>
+  </dgm:styleLbl>
+  <dgm:styleLbl name="vennNode1">
+    <dgm:fillClrLst meth="repeat">
+      <a:schemeClr val="accent1">
+        <a:alpha val="50000"/>
+      </a:schemeClr>
+    </dgm:fillClrLst>
+    <dgm:linClrLst meth="repeat">
+      <a:schemeClr val="lt1"/>
+    </dgm:linClrLst>
+    <dgm:effectClrLst/>
+    <dgm:txLinClrLst/>
+    <dgm:txFillClrLst/>
+    <dgm:txEffectClrLst/>
+  </dgm:styleLbl>
+  <dgm:styleLbl name="node2">
+    <dgm:fillClrLst meth="repeat">
+      <a:schemeClr val="accent1"/>
+    </dgm:fillClrLst>
+    <dgm:linClrLst meth="repeat">
+      <a:schemeClr val="lt1"/>
+    </dgm:linClrLst>
+    <dgm:effectClrLst/>
+    <dgm:txLinClrLst/>
+    <dgm:txFillClrLst/>
+    <dgm:txEffectClrLst/>
+  </dgm:styleLbl>
+  <dgm:styleLbl name="node3">
+    <dgm:fillClrLst meth="repeat">
+      <a:schemeClr val="accent1"/>
+    </dgm:fillClrLst>
+    <dgm:linClrLst meth="repeat">
+      <a:schemeClr val="lt1"/>
+    </dgm:linClrLst>
+    <dgm:effectClrLst/>
+    <dgm:txLinClrLst/>
+    <dgm:txFillClrLst/>
+    <dgm:txEffectClrLst/>
+  </dgm:styleLbl>
+  <dgm:styleLbl name="node4">
+    <dgm:fillClrLst meth="repeat">
+      <a:schemeClr val="accent1"/>
+    </dgm:fillClrLst>
+    <dgm:linClrLst meth="repeat">
+      <a:schemeClr val="lt1"/>
+    </dgm:linClrLst>
+    <dgm:effectClrLst/>
+    <dgm:txLinClrLst/>
+    <dgm:txFillClrLst/>
+    <dgm:txEffectClrLst/>
+  </dgm:styleLbl>
+  <dgm:styleLbl name="fgImgPlace1">
+    <dgm:fillClrLst meth="repeat">
+      <a:schemeClr val="accent1">
+        <a:tint val="50000"/>
+      </a:schemeClr>
+    </dgm:fillClrLst>
+    <dgm:linClrLst meth="repeat">
+      <a:schemeClr val="lt1"/>
+    </dgm:linClrLst>
+    <dgm:effectClrLst/>
+    <dgm:txLinClrLst/>
+    <dgm:txFillClrLst meth="repeat">
+      <a:schemeClr val="lt1"/>
+    </dgm:txFillClrLst>
+    <dgm:txEffectClrLst/>
+  </dgm:styleLbl>
+  <dgm:styleLbl name="alignImgPlace1">
+    <dgm:fillClrLst meth="repeat">
+      <a:schemeClr val="accent1">
+        <a:tint val="50000"/>
+      </a:schemeClr>
+    </dgm:fillClrLst>
+    <dgm:linClrLst meth="repeat">
+      <a:schemeClr val="lt1"/>
+    </dgm:linClrLst>
+    <dgm:effectClrLst/>
+    <dgm:txLinClrLst/>
+    <dgm:txFillClrLst meth="repeat">
+      <a:schemeClr val="lt1"/>
+    </dgm:txFillClrLst>
+    <dgm:txEffectClrLst/>
+  </dgm:styleLbl>
+  <dgm:styleLbl name="bgImgPlace1">
+    <dgm:fillClrLst meth="repeat">
+      <a:schemeClr val="accent1">
+        <a:tint val="50000"/>
+      </a:schemeClr>
+    </dgm:fillClrLst>
+    <dgm:linClrLst meth="repeat">
+      <a:schemeClr val="lt1"/>
+    </dgm:linClrLst>
+    <dgm:effectClrLst/>
+    <dgm:txLinClrLst/>
+    <dgm:txFillClrLst meth="repeat">
+      <a:schemeClr val="lt1"/>
+    </dgm:txFillClrLst>
+    <dgm:txEffectClrLst/>
+  </dgm:styleLbl>
+  <dgm:styleLbl name="sibTrans2D1">
+    <dgm:fillClrLst meth="repeat">
+      <a:schemeClr val="accent1">
+        <a:tint val="60000"/>
+      </a:schemeClr>
+    </dgm:fillClrLst>
+    <dgm:linClrLst meth="repeat">
+      <a:schemeClr val="accent1">
+        <a:tint val="60000"/>
+      </a:schemeClr>
+    </dgm:linClrLst>
+    <dgm:effectClrLst/>
+    <dgm:txLinClrLst/>
+    <dgm:txFillClrLst/>
+    <dgm:txEffectClrLst/>
+  </dgm:styleLbl>
+  <dgm:styleLbl name="fgSibTrans2D1">
+    <dgm:fillClrLst meth="repeat">
+      <a:schemeClr val="accent1">
+        <a:tint val="60000"/>
+      </a:schemeClr>
+    </dgm:fillClrLst>
+    <dgm:linClrLst meth="repeat">
+      <a:schemeClr val="accent1">
+        <a:tint val="60000"/>
+      </a:schemeClr>
+    </dgm:linClrLst>
+    <dgm:effectClrLst/>
+    <dgm:txLinClrLst/>
+    <dgm:txFillClrLst/>
+    <dgm:txEffectClrLst/>
+  </dgm:styleLbl>
+  <dgm:styleLbl name="bgSibTrans2D1">
+    <dgm:fillClrLst meth="repeat">
+      <a:schemeClr val="accent1">
+        <a:tint val="60000"/>
+      </a:schemeClr>
+    </dgm:fillClrLst>
+    <dgm:linClrLst meth="repeat">
+      <a:schemeClr val="accent1">
+        <a:tint val="60000"/>
+      </a:schemeClr>
+    </dgm:linClrLst>
+    <dgm:effectClrLst/>
+    <dgm:txLinClrLst/>
+    <dgm:txFillClrLst/>
+    <dgm:txEffectClrLst/>
+  </dgm:styleLbl>
+  <dgm:styleLbl name="sibTrans1D1">
+    <dgm:fillClrLst meth="repeat">
+      <a:schemeClr val="accent1"/>
+    </dgm:fillClrLst>
+    <dgm:linClrLst meth="repeat">
+      <a:schemeClr val="accent1"/>
+    </dgm:linClrLst>
+    <dgm:effectClrLst/>
+    <dgm:txLinClrLst/>
+    <dgm:txFillClrLst meth="repeat">
+      <a:schemeClr val="tx1"/>
+    </dgm:txFillClrLst>
+    <dgm:txEffectClrLst/>
+  </dgm:styleLbl>
+  <dgm:styleLbl name="callout">
+    <dgm:fillClrLst meth="repeat">
+      <a:schemeClr val="accent1"/>
+    </dgm:fillClrLst>
+    <dgm:linClrLst meth="repeat">
+      <a:schemeClr val="accent1">
+        <a:tint val="50000"/>
+      </a:schemeClr>
+    </dgm:linClrLst>
+    <dgm:effectClrLst/>
+    <dgm:txLinClrLst/>
+    <dgm:txFillClrLst meth="repeat">
+      <a:schemeClr val="tx1"/>
+    </dgm:txFillClrLst>
+    <dgm:txEffectClrLst/>
+  </dgm:styleLbl>
+  <dgm:styleLbl name="asst0">
+    <dgm:fillClrLst meth="repeat">
+      <a:schemeClr val="accent1"/>
+    </dgm:fillClrLst>
+    <dgm:linClrLst meth="repeat">
+      <a:schemeClr val="lt1"/>
+    </dgm:linClrLst>
+    <dgm:effectClrLst/>
+    <dgm:txLinClrLst/>
+    <dgm:txFillClrLst/>
+    <dgm:txEffectClrLst/>
+  </dgm:styleLbl>
+  <dgm:styleLbl name="asst1">
+    <dgm:fillClrLst meth="repeat">
+      <a:schemeClr val="accent1"/>
+    </dgm:fillClrLst>
+    <dgm:linClrLst meth="repeat">
+      <a:schemeClr val="lt1"/>
+    </dgm:linClrLst>
+    <dgm:effectClrLst/>
+    <dgm:txLinClrLst/>
+    <dgm:txFillClrLst/>
+    <dgm:txEffectClrLst/>
+  </dgm:styleLbl>
+  <dgm:styleLbl name="asst2">
+    <dgm:fillClrLst meth="repeat">
+      <a:schemeClr val="accent1"/>
+    </dgm:fillClrLst>
+    <dgm:linClrLst meth="repeat">
+      <a:schemeClr val="lt1"/>
+    </dgm:linClrLst>
+    <dgm:effectClrLst/>
+    <dgm:txLinClrLst/>
+    <dgm:txFillClrLst/>
+    <dgm:txEffectClrLst/>
+  </dgm:styleLbl>
+  <dgm:styleLbl name="asst3">
+    <dgm:fillClrLst meth="repeat">
+      <a:schemeClr val="accent1"/>
+    </dgm:fillClrLst>
+    <dgm:linClrLst meth="repeat">
+      <a:schemeClr val="lt1"/>
+    </dgm:linClrLst>
+    <dgm:effectClrLst/>
+    <dgm:txLinClrLst/>
+    <dgm:txFillClrLst/>
+    <dgm:txEffectClrLst/>
+  </dgm:styleLbl>
+  <dgm:styleLbl name="asst4">
+    <dgm:fillClrLst meth="repeat">
+      <a:schemeClr val="accent1"/>
+    </dgm:fillClrLst>
+    <dgm:linClrLst meth="repeat">
+      <a:schemeClr val="lt1"/>
+    </dgm:linClrLst>
+    <dgm:effectClrLst/>
+    <dgm:txLinClrLst/>
+    <dgm:txFillClrLst/>
+    <dgm:txEffectClrLst/>
+  </dgm:styleLbl>
+  <dgm:styleLbl name="parChTrans2D1">
+    <dgm:fillClrLst meth="repeat">
+      <a:schemeClr val="accent1">
+        <a:tint val="60000"/>
+      </a:schemeClr>
+    </dgm:fillClrLst>
+    <dgm:linClrLst meth="repeat">
+      <a:schemeClr val="accent1">
+        <a:tint val="60000"/>
+      </a:schemeClr>
+    </dgm:linClrLst>
+    <dgm:effectClrLst/>
+    <dgm:txLinClrLst/>
+    <dgm:txFillClrLst meth="repeat">
+      <a:schemeClr val="lt1"/>
+    </dgm:txFillClrLst>
+    <dgm:txEffectClrLst/>
+  </dgm:styleLbl>
+  <dgm:styleLbl name="parChTrans2D2">
+    <dgm:fillClrLst meth="repeat">
+      <a:schemeClr val="accent1"/>
+    </dgm:fillClrLst>
+    <dgm:linClrLst meth="repeat">
+      <a:schemeClr val="accent1"/>
+    </dgm:linClrLst>
+    <dgm:effectClrLst/>
+    <dgm:txLinClrLst/>
+    <dgm:txFillClrLst meth="repeat">
+      <a:schemeClr val="lt1"/>
+    </dgm:txFillClrLst>
+    <dgm:txEffectClrLst/>
+  </dgm:styleLbl>
+  <dgm:styleLbl name="parChTrans2D3">
+    <dgm:fillClrLst meth="repeat">
+      <a:schemeClr val="accent1"/>
+    </dgm:fillClrLst>
+    <dgm:linClrLst meth="repeat">
+      <a:schemeClr val="accent1"/>
+    </dgm:linClrLst>
+    <dgm:effectClrLst/>
+    <dgm:txLinClrLst/>
+    <dgm:txFillClrLst meth="repeat">
+      <a:schemeClr val="lt1"/>
+    </dgm:txFillClrLst>
+    <dgm:txEffectClrLst/>
+  </dgm:styleLbl>
+  <dgm:styleLbl name="parChTrans2D4">
+    <dgm:fillClrLst meth="repeat">
+      <a:schemeClr val="accent1"/>
+    </dgm:fillClrLst>
+    <dgm:linClrLst meth="repeat">
+      <a:schemeClr val="accent1"/>
+    </dgm:linClrLst>
+    <dgm:effectClrLst/>
+    <dgm:txLinClrLst/>
+    <dgm:txFillClrLst meth="repeat">
+      <a:schemeClr val="lt1"/>
+    </dgm:txFillClrLst>
+    <dgm:txEffectClrLst/>
+  </dgm:styleLbl>
+  <dgm:styleLbl name="parChTrans1D1">
+    <dgm:fillClrLst meth="repeat">
+      <a:schemeClr val="accent1"/>
+    </dgm:fillClrLst>
+    <dgm:linClrLst meth="repeat">
+      <a:schemeClr val="accent1">
+        <a:shade val="60000"/>
+      </a:schemeClr>
+    </dgm:linClrLst>
+    <dgm:effectClrLst/>
+    <dgm:txLinClrLst/>
+    <dgm:txFillClrLst meth="repeat">
+      <a:schemeClr val="tx1"/>
+    </dgm:txFillClrLst>
+    <dgm:txEffectClrLst/>
+  </dgm:styleLbl>
+  <dgm:styleLbl name="parChTrans1D2">
+    <dgm:fillClrLst meth="repeat">
+      <a:schemeClr val="accent1"/>
+    </dgm:fillClrLst>
+    <dgm:linClrLst meth="repeat">
+      <a:schemeClr val="accent1">
+        <a:shade val="60000"/>
+      </a:schemeClr>
+    </dgm:linClrLst>
+    <dgm:effectClrLst/>
+    <dgm:txLinClrLst/>
+    <dgm:txFillClrLst meth="repeat">
+      <a:schemeClr val="tx1"/>
+    </dgm:txFillClrLst>
+    <dgm:txEffectClrLst/>
+  </dgm:styleLbl>
+  <dgm:styleLbl name="parChTrans1D3">
+    <dgm:fillClrLst meth="repeat">
+      <a:schemeClr val="accent1"/>
+    </dgm:fillClrLst>
+    <dgm:linClrLst meth="repeat">
+      <a:schemeClr val="accent1">
+        <a:shade val="80000"/>
+      </a:schemeClr>
+    </dgm:linClrLst>
+    <dgm:effectClrLst/>
+    <dgm:txLinClrLst/>
+    <dgm:txFillClrLst meth="repeat">
+      <a:schemeClr val="tx1"/>
+    </dgm:txFillClrLst>
+    <dgm:txEffectClrLst/>
+  </dgm:styleLbl>
+  <dgm:styleLbl name="parChTrans1D4">
+    <dgm:fillClrLst meth="repeat">
+      <a:schemeClr val="accent1"/>
+    </dgm:fillClrLst>
+    <dgm:linClrLst meth="repeat">
+      <a:schemeClr val="accent1">
+        <a:shade val="80000"/>
+      </a:schemeClr>
+    </dgm:linClrLst>
+    <dgm:effectClrLst/>
+    <dgm:txLinClrLst/>
+    <dgm:txFillClrLst meth="repeat">
+      <a:schemeClr val="tx1"/>
+    </dgm:txFillClrLst>
+    <dgm:txEffectClrLst/>
+  </dgm:styleLbl>
+  <dgm:styleLbl name="fgAcc1">
+    <dgm:fillClrLst meth="repeat">
+      <a:schemeClr val="lt1">
+        <a:alpha val="90000"/>
+      </a:schemeClr>
+    </dgm:fillClrLst>
+    <dgm:linClrLst meth="repeat">
+      <a:schemeClr val="accent1"/>
+    </dgm:linClrLst>
+    <dgm:effectClrLst/>
+    <dgm:txLinClrLst/>
+    <dgm:txFillClrLst meth="repeat">
+      <a:schemeClr val="dk1"/>
+    </dgm:txFillClrLst>
+    <dgm:txEffectClrLst/>
+  </dgm:styleLbl>
+  <dgm:styleLbl name="conFgAcc1">
+    <dgm:fillClrLst meth="repeat">
+      <a:schemeClr val="lt1">
+        <a:alpha val="90000"/>
+      </a:schemeClr>
+    </dgm:fillClrLst>
+    <dgm:linClrLst meth="repeat">
+      <a:schemeClr val="accent1"/>
+    </dgm:linClrLst>
+    <dgm:effectClrLst/>
+    <dgm:txLinClrLst/>
+    <dgm:txFillClrLst meth="repeat">
+      <a:schemeClr val="dk1"/>
+    </dgm:txFillClrLst>
+    <dgm:txEffectClrLst/>
+  </dgm:styleLbl>
+  <dgm:styleLbl name="alignAcc1">
+    <dgm:fillClrLst meth="repeat">
+      <a:schemeClr val="lt1">
+        <a:alpha val="90000"/>
+      </a:schemeClr>
+    </dgm:fillClrLst>
+    <dgm:linClrLst meth="repeat">
+      <a:schemeClr val="accent1"/>
+    </dgm:linClrLst>
+    <dgm:effectClrLst/>
+    <dgm:txLinClrLst/>
+    <dgm:txFillClrLst meth="repeat">
+      <a:schemeClr val="dk1"/>
+    </dgm:txFillClrLst>
+    <dgm:txEffectClrLst/>
+  </dgm:styleLbl>
+  <dgm:styleLbl name="trAlignAcc1">
+    <dgm:fillClrLst meth="repeat">
+      <a:schemeClr val="lt1">
+        <a:alpha val="40000"/>
+      </a:schemeClr>
+    </dgm:fillClrLst>
+    <dgm:linClrLst meth="repeat">
+      <a:schemeClr val="accent1"/>
+    </dgm:linClrLst>
+    <dgm:effectClrLst/>
+    <dgm:txLinClrLst/>
+    <dgm:txFillClrLst meth="repeat">
+      <a:schemeClr val="dk1"/>
+    </dgm:txFillClrLst>
+    <dgm:txEffectClrLst/>
+  </dgm:styleLbl>
+  <dgm:styleLbl name="bgAcc1">
+    <dgm:fillClrLst meth="repeat">
+      <a:schemeClr val="lt1">
+        <a:alpha val="90000"/>
+      </a:schemeClr>
+    </dgm:fillClrLst>
+    <dgm:linClrLst meth="repeat">
+      <a:schemeClr val="accent1"/>
+    </dgm:linClrLst>
+    <dgm:effectClrLst/>
+    <dgm:txLinClrLst/>
+    <dgm:txFillClrLst meth="repeat">
+      <a:schemeClr val="dk1"/>
+    </dgm:txFillClrLst>
+    <dgm:txEffectClrLst/>
+  </dgm:styleLbl>
+  <dgm:styleLbl name="solidFgAcc1">
+    <dgm:fillClrLst meth="repeat">
+      <a:schemeClr val="lt1"/>
+    </dgm:fillClrLst>
+    <dgm:linClrLst meth="repeat">
+      <a:schemeClr val="accent1"/>
+    </dgm:linClrLst>
+    <dgm:effectClrLst/>
+    <dgm:txLinClrLst/>
+    <dgm:txFillClrLst meth="repeat">
+      <a:schemeClr val="dk1"/>
+    </dgm:txFillClrLst>
+    <dgm:txEffectClrLst/>
+  </dgm:styleLbl>
+  <dgm:styleLbl name="solidAlignAcc1">
+    <dgm:fillClrLst meth="repeat">
+      <a:schemeClr val="lt1"/>
+    </dgm:fillClrLst>
+    <dgm:linClrLst meth="repeat">
+      <a:schemeClr val="accent1"/>
+    </dgm:linClrLst>
+    <dgm:effectClrLst/>
+    <dgm:txLinClrLst/>
+    <dgm:txFillClrLst meth="repeat">
+      <a:schemeClr val="dk1"/>
+    </dgm:txFillClrLst>
+    <dgm:txEffectClrLst/>
+  </dgm:styleLbl>
+  <dgm:styleLbl name="solidBgAcc1">
+    <dgm:fillClrLst meth="repeat">
+      <a:schemeClr val="lt1"/>
+    </dgm:fillClrLst>
+    <dgm:linClrLst meth="repeat">
+      <a:schemeClr val="accent1"/>
+    </dgm:linClrLst>
+    <dgm:effectClrLst/>
+    <dgm:txLinClrLst/>
+    <dgm:txFillClrLst meth="repeat">
+      <a:schemeClr val="dk1"/>
+    </dgm:txFillClrLst>
+    <dgm:txEffectClrLst/>
+  </dgm:styleLbl>
+  <dgm:styleLbl name="fgAccFollowNode1">
+    <dgm:fillClrLst meth="repeat">
+      <a:schemeClr val="accent1">
+        <a:alpha val="90000"/>
+        <a:tint val="40000"/>
+      </a:schemeClr>
+    </dgm:fillClrLst>
+    <dgm:linClrLst meth="repeat">
+      <a:schemeClr val="accent1">
+        <a:alpha val="90000"/>
+        <a:tint val="40000"/>
+      </a:schemeClr>
+    </dgm:linClrLst>
+    <dgm:effectClrLst/>
+    <dgm:txLinClrLst/>
+    <dgm:txFillClrLst meth="repeat">
+      <a:schemeClr val="dk1"/>
+    </dgm:txFillClrLst>
+    <dgm:txEffectClrLst/>
+  </dgm:styleLbl>
+  <dgm:styleLbl name="alignAccFollowNode1">
+    <dgm:fillClrLst meth="repeat">
+      <a:schemeClr val="accent1">
+        <a:alpha val="90000"/>
+        <a:tint val="40000"/>
+      </a:schemeClr>
+    </dgm:fillClrLst>
+    <dgm:linClrLst meth="repeat">
+      <a:schemeClr val="accent1">
+        <a:alpha val="90000"/>
+        <a:tint val="40000"/>
+      </a:schemeClr>
+    </dgm:linClrLst>
+    <dgm:effectClrLst/>
+    <dgm:txLinClrLst/>
+    <dgm:txFillClrLst meth="repeat">
+      <a:schemeClr val="dk1"/>
+    </dgm:txFillClrLst>
+    <dgm:txEffectClrLst/>
+  </dgm:styleLbl>
+  <dgm:styleLbl name="bgAccFollowNode1">
+    <dgm:fillClrLst meth="repeat">
+      <a:schemeClr val="accent1">
+        <a:alpha val="90000"/>
+        <a:tint val="40000"/>
+      </a:schemeClr>
+    </dgm:fillClrLst>
+    <dgm:linClrLst meth="repeat">
+      <a:schemeClr val="accent1">
+        <a:alpha val="90000"/>
+        <a:tint val="40000"/>
+      </a:schemeClr>
+    </dgm:linClrLst>
+    <dgm:effectClrLst/>
+    <dgm:txLinClrLst/>
+    <dgm:txFillClrLst meth="repeat">
+      <a:schemeClr val="dk1"/>
+    </dgm:txFillClrLst>
+    <dgm:txEffectClrLst/>
+  </dgm:styleLbl>
+  <dgm:styleLbl name="fgAcc0">
+    <dgm:fillClrLst meth="repeat">
+      <a:schemeClr val="lt1">
+        <a:alpha val="90000"/>
+      </a:schemeClr>
+    </dgm:fillClrLst>
+    <dgm:linClrLst meth="repeat">
+      <a:schemeClr val="accent1"/>
+    </dgm:linClrLst>
+    <dgm:effectClrLst/>
+    <dgm:txLinClrLst/>
+    <dgm:txFillClrLst meth="repeat">
+      <a:schemeClr val="dk1"/>
+    </dgm:txFillClrLst>
+    <dgm:txEffectClrLst/>
+  </dgm:styleLbl>
+  <dgm:styleLbl name="fgAcc2">
+    <dgm:fillClrLst meth="repeat">
+      <a:schemeClr val="lt1">
+        <a:alpha val="90000"/>
+      </a:schemeClr>
+    </dgm:fillClrLst>
+    <dgm:linClrLst meth="repeat">
+      <a:schemeClr val="accent1"/>
+    </dgm:linClrLst>
+    <dgm:effectClrLst/>
+    <dgm:txLinClrLst/>
+    <dgm:txFillClrLst meth="repeat">
+      <a:schemeClr val="dk1"/>
+    </dgm:txFillClrLst>
+    <dgm:txEffectClrLst/>
+  </dgm:styleLbl>
+  <dgm:styleLbl name="fgAcc3">
+    <dgm:fillClrLst meth="repeat">
+      <a:schemeClr val="lt1">
+        <a:alpha val="90000"/>
+      </a:schemeClr>
+    </dgm:fillClrLst>
+    <dgm:linClrLst meth="repeat">
+      <a:schemeClr val="accent1"/>
+    </dgm:linClrLst>
+    <dgm:effectClrLst/>
+    <dgm:txLinClrLst/>
+    <dgm:txFillClrLst meth="repeat">
+      <a:schemeClr val="dk1"/>
+    </dgm:txFillClrLst>
+    <dgm:txEffectClrLst/>
+  </dgm:styleLbl>
+  <dgm:styleLbl name="fgAcc4">
+    <dgm:fillClrLst meth="repeat">
+      <a:schemeClr val="lt1">
+        <a:alpha val="90000"/>
+      </a:schemeClr>
+    </dgm:fillClrLst>
+    <dgm:linClrLst meth="repeat">
+      <a:schemeClr val="accent1"/>
+    </dgm:linClrLst>
+    <dgm:effectClrLst/>
+    <dgm:txLinClrLst/>
+    <dgm:txFillClrLst meth="repeat">
+      <a:schemeClr val="dk1"/>
+    </dgm:txFillClrLst>
+    <dgm:txEffectClrLst/>
+  </dgm:styleLbl>
+  <dgm:styleLbl name="bgShp">
+    <dgm:fillClrLst meth="repeat">
+      <a:schemeClr val="accent1">
+        <a:tint val="40000"/>
+      </a:schemeClr>
+    </dgm:fillClrLst>
+    <dgm:linClrLst meth="repeat">
+      <a:schemeClr val="accent1"/>
+    </dgm:linClrLst>
+    <dgm:effectClrLst/>
+    <dgm:txLinClrLst/>
+    <dgm:txFillClrLst meth="repeat">
+      <a:schemeClr val="dk1"/>
+    </dgm:txFillClrLst>
+    <dgm:txEffectClrLst/>
+  </dgm:styleLbl>
+  <dgm:styleLbl name="dkBgShp">
+    <dgm:fillClrLst meth="repeat">
+      <a:schemeClr val="accent1">
+        <a:shade val="80000"/>
+      </a:schemeClr>
+    </dgm:fillClrLst>
+    <dgm:linClrLst meth="repeat">
+      <a:schemeClr val="accent1"/>
+    </dgm:linClrLst>
+    <dgm:effectClrLst/>
+    <dgm:txLinClrLst/>
+    <dgm:txFillClrLst meth="repeat">
+      <a:schemeClr val="lt1"/>
+    </dgm:txFillClrLst>
+    <dgm:txEffectClrLst/>
+  </dgm:styleLbl>
+  <dgm:styleLbl name="trBgShp">
+    <dgm:fillClrLst meth="repeat">
+      <a:schemeClr val="accent1">
+        <a:tint val="50000"/>
+        <a:alpha val="40000"/>
+      </a:schemeClr>
+    </dgm:fillClrLst>
+    <dgm:linClrLst meth="repeat">
+      <a:schemeClr val="accent1"/>
+    </dgm:linClrLst>
+    <dgm:effectClrLst/>
+    <dgm:txLinClrLst/>
+    <dgm:txFillClrLst meth="repeat">
+      <a:schemeClr val="lt1"/>
+    </dgm:txFillClrLst>
+    <dgm:txEffectClrLst/>
+  </dgm:styleLbl>
+  <dgm:styleLbl name="fgShp">
+    <dgm:fillClrLst meth="repeat">
+      <a:schemeClr val="accent1">
+        <a:tint val="60000"/>
+      </a:schemeClr>
+    </dgm:fillClrLst>
+    <dgm:linClrLst meth="repeat">
+      <a:schemeClr val="lt1"/>
+    </dgm:linClrLst>
+    <dgm:effectClrLst/>
+    <dgm:txLinClrLst/>
+    <dgm:txFillClrLst meth="repeat">
+      <a:schemeClr val="dk1"/>
+    </dgm:txFillClrLst>
+    <dgm:txEffectClrLst/>
+  </dgm:styleLbl>
+  <dgm:styleLbl name="revTx">
+    <dgm:fillClrLst meth="repeat">
+      <a:schemeClr val="lt1">
+        <a:alpha val="0"/>
+      </a:schemeClr>
+    </dgm:fillClrLst>
+    <dgm:linClrLst meth="repeat">
+      <a:schemeClr val="dk1">
+        <a:alpha val="0"/>
+      </a:schemeClr>
+    </dgm:linClrLst>
+    <dgm:effectClrLst/>
+    <dgm:txLinClrLst/>
+    <dgm:txFillClrLst meth="repeat">
+      <a:schemeClr val="tx1"/>
+    </dgm:txFillClrLst>
+    <dgm:txEffectClrLst/>
+  </dgm:styleLbl>
+</dgm:colorsDef>
+</file>
+
+<file path=ppt/diagrams/colors2.xml><?xml version="1.0" encoding="utf-8"?>
 <dgm:colorsDef xmlns:dgm="http://schemas.openxmlformats.org/drawingml/2006/diagram" xmlns:a="http://schemas.openxmlformats.org/drawingml/2006/main" uniqueId="urn:microsoft.com/office/officeart/2005/8/colors/accent1_2">
   <dgm:title val=""/>
   <dgm:desc val=""/>
@@ -1229,6 +1978,246 @@
   <dgm:extLst>
     <a:ext uri="http://schemas.microsoft.com/office/drawing/2008/diagram">
       <dsp:dataModelExt xmlns:dsp="http://schemas.microsoft.com/office/drawing/2008/diagram" relId="rId6" minVer="http://schemas.openxmlformats.org/drawingml/2006/diagram"/>
+    </a:ext>
+  </dgm:extLst>
+</dgm:dataModel>
+</file>
+
+<file path=ppt/diagrams/data2.xml><?xml version="1.0" encoding="utf-8"?>
+<dgm:dataModel xmlns:dgm="http://schemas.openxmlformats.org/drawingml/2006/diagram" xmlns:a="http://schemas.openxmlformats.org/drawingml/2006/main">
+  <dgm:ptLst>
+    <dgm:pt modelId="{DD36BFCF-C059-0641-8E04-D59E2EE6ECAE}" type="doc">
+      <dgm:prSet loTypeId="urn:microsoft.com/office/officeart/2005/8/layout/funnel1" loCatId="" qsTypeId="urn:microsoft.com/office/officeart/2005/8/quickstyle/simple1" qsCatId="simple" csTypeId="urn:microsoft.com/office/officeart/2005/8/colors/accent1_2" csCatId="accent1" phldr="1"/>
+      <dgm:spPr/>
+      <dgm:t>
+        <a:bodyPr/>
+        <a:lstStyle/>
+        <a:p>
+          <a:endParaRPr lang="en-US"/>
+        </a:p>
+      </dgm:t>
+    </dgm:pt>
+    <dgm:pt modelId="{844A12C2-6B42-D140-AF29-BD921A7C756C}">
+      <dgm:prSet phldrT="[Text]"/>
+      <dgm:spPr/>
+      <dgm:t>
+        <a:bodyPr/>
+        <a:lstStyle/>
+        <a:p>
+          <a:r>
+            <a:rPr lang="en-US" dirty="0"/>
+            <a:t>Frontend</a:t>
+          </a:r>
+        </a:p>
+      </dgm:t>
+    </dgm:pt>
+    <dgm:pt modelId="{C088FA55-8B52-A246-9C4B-3EA57E507F01}" type="parTrans" cxnId="{6D0E4D2B-0CE4-564F-9F98-8F6AB1E343B4}">
+      <dgm:prSet/>
+      <dgm:spPr/>
+      <dgm:t>
+        <a:bodyPr/>
+        <a:lstStyle/>
+        <a:p>
+          <a:endParaRPr lang="en-US"/>
+        </a:p>
+      </dgm:t>
+    </dgm:pt>
+    <dgm:pt modelId="{C3810CDF-7975-584A-8BA9-5B0F5C03628D}" type="sibTrans" cxnId="{6D0E4D2B-0CE4-564F-9F98-8F6AB1E343B4}">
+      <dgm:prSet/>
+      <dgm:spPr/>
+      <dgm:t>
+        <a:bodyPr/>
+        <a:lstStyle/>
+        <a:p>
+          <a:endParaRPr lang="en-US"/>
+        </a:p>
+      </dgm:t>
+    </dgm:pt>
+    <dgm:pt modelId="{F38CC652-A661-6D4C-BDB7-9B25D3E206AA}">
+      <dgm:prSet phldrT="[Text]"/>
+      <dgm:spPr/>
+      <dgm:t>
+        <a:bodyPr/>
+        <a:lstStyle/>
+        <a:p>
+          <a:r>
+            <a:rPr lang="en-US" dirty="0"/>
+            <a:t>Backend</a:t>
+          </a:r>
+        </a:p>
+      </dgm:t>
+    </dgm:pt>
+    <dgm:pt modelId="{920FC5BD-5E2C-5440-B754-874574E92766}" type="parTrans" cxnId="{4E0D04ED-E819-8447-9A07-FD3E207A2D5B}">
+      <dgm:prSet/>
+      <dgm:spPr/>
+      <dgm:t>
+        <a:bodyPr/>
+        <a:lstStyle/>
+        <a:p>
+          <a:endParaRPr lang="en-US"/>
+        </a:p>
+      </dgm:t>
+    </dgm:pt>
+    <dgm:pt modelId="{23E080EF-622A-654A-99DC-7C6680500BC4}" type="sibTrans" cxnId="{4E0D04ED-E819-8447-9A07-FD3E207A2D5B}">
+      <dgm:prSet/>
+      <dgm:spPr/>
+      <dgm:t>
+        <a:bodyPr/>
+        <a:lstStyle/>
+        <a:p>
+          <a:endParaRPr lang="en-US"/>
+        </a:p>
+      </dgm:t>
+    </dgm:pt>
+    <dgm:pt modelId="{3528438F-93F5-074F-952A-895D4FD85C26}">
+      <dgm:prSet phldrT="[Text]"/>
+      <dgm:spPr/>
+      <dgm:t>
+        <a:bodyPr/>
+        <a:lstStyle/>
+        <a:p>
+          <a:r>
+            <a:rPr lang="en-US" dirty="0"/>
+            <a:t>Db</a:t>
+          </a:r>
+        </a:p>
+      </dgm:t>
+    </dgm:pt>
+    <dgm:pt modelId="{86FDBACA-1BF0-8942-A944-CD638C218D7A}" type="parTrans" cxnId="{69105D39-2EDE-E946-919F-7DD4503ACA32}">
+      <dgm:prSet/>
+      <dgm:spPr/>
+      <dgm:t>
+        <a:bodyPr/>
+        <a:lstStyle/>
+        <a:p>
+          <a:endParaRPr lang="en-US"/>
+        </a:p>
+      </dgm:t>
+    </dgm:pt>
+    <dgm:pt modelId="{88AC15DD-C6FB-194C-82F6-2EE9E3369EA7}" type="sibTrans" cxnId="{69105D39-2EDE-E946-919F-7DD4503ACA32}">
+      <dgm:prSet/>
+      <dgm:spPr/>
+      <dgm:t>
+        <a:bodyPr/>
+        <a:lstStyle/>
+        <a:p>
+          <a:endParaRPr lang="en-US"/>
+        </a:p>
+      </dgm:t>
+    </dgm:pt>
+    <dgm:pt modelId="{C3CB17ED-E5FD-1940-A6E2-3C1422B71684}">
+      <dgm:prSet phldrT="[Text]"/>
+      <dgm:spPr/>
+      <dgm:t>
+        <a:bodyPr/>
+        <a:lstStyle/>
+        <a:p>
+          <a:r>
+            <a:rPr lang="en-US" dirty="0"/>
+            <a:t>My APP</a:t>
+          </a:r>
+        </a:p>
+      </dgm:t>
+    </dgm:pt>
+    <dgm:pt modelId="{F052CED6-50C7-B14D-A566-50D8BB518970}" type="parTrans" cxnId="{738279BE-0B32-EC43-8794-797E40C4813B}">
+      <dgm:prSet/>
+      <dgm:spPr/>
+      <dgm:t>
+        <a:bodyPr/>
+        <a:lstStyle/>
+        <a:p>
+          <a:endParaRPr lang="en-US"/>
+        </a:p>
+      </dgm:t>
+    </dgm:pt>
+    <dgm:pt modelId="{6DDC67EA-C959-CF41-9DEE-0459F97A707C}" type="sibTrans" cxnId="{738279BE-0B32-EC43-8794-797E40C4813B}">
+      <dgm:prSet/>
+      <dgm:spPr/>
+      <dgm:t>
+        <a:bodyPr/>
+        <a:lstStyle/>
+        <a:p>
+          <a:endParaRPr lang="en-US"/>
+        </a:p>
+      </dgm:t>
+    </dgm:pt>
+    <dgm:pt modelId="{A3E367B3-92D2-4342-9E3D-42CE7977AA24}" type="pres">
+      <dgm:prSet presAssocID="{DD36BFCF-C059-0641-8E04-D59E2EE6ECAE}" presName="Name0" presStyleCnt="0">
+        <dgm:presLayoutVars>
+          <dgm:chMax val="4"/>
+          <dgm:resizeHandles val="exact"/>
+        </dgm:presLayoutVars>
+      </dgm:prSet>
+      <dgm:spPr/>
+    </dgm:pt>
+    <dgm:pt modelId="{60B213E7-4BCF-C040-8E8F-FD9342942D77}" type="pres">
+      <dgm:prSet presAssocID="{DD36BFCF-C059-0641-8E04-D59E2EE6ECAE}" presName="ellipse" presStyleLbl="trBgShp" presStyleIdx="0" presStyleCnt="1"/>
+      <dgm:spPr/>
+    </dgm:pt>
+    <dgm:pt modelId="{5F1FDAF6-9825-2342-AF58-90616057410A}" type="pres">
+      <dgm:prSet presAssocID="{DD36BFCF-C059-0641-8E04-D59E2EE6ECAE}" presName="arrow1" presStyleLbl="fgShp" presStyleIdx="0" presStyleCnt="1"/>
+      <dgm:spPr/>
+    </dgm:pt>
+    <dgm:pt modelId="{D764BBCA-3146-8447-84C7-564B62B39447}" type="pres">
+      <dgm:prSet presAssocID="{DD36BFCF-C059-0641-8E04-D59E2EE6ECAE}" presName="rectangle" presStyleLbl="revTx" presStyleIdx="0" presStyleCnt="1" custLinFactNeighborY="35353">
+        <dgm:presLayoutVars>
+          <dgm:bulletEnabled val="1"/>
+        </dgm:presLayoutVars>
+      </dgm:prSet>
+      <dgm:spPr/>
+    </dgm:pt>
+    <dgm:pt modelId="{1ABD8563-783E-304E-A4C5-A413D082CA74}" type="pres">
+      <dgm:prSet presAssocID="{F38CC652-A661-6D4C-BDB7-9B25D3E206AA}" presName="item1" presStyleLbl="node1" presStyleIdx="0" presStyleCnt="3">
+        <dgm:presLayoutVars>
+          <dgm:bulletEnabled val="1"/>
+        </dgm:presLayoutVars>
+      </dgm:prSet>
+      <dgm:spPr/>
+    </dgm:pt>
+    <dgm:pt modelId="{7781A67B-3616-5142-B7A7-FF7B4A054798}" type="pres">
+      <dgm:prSet presAssocID="{3528438F-93F5-074F-952A-895D4FD85C26}" presName="item2" presStyleLbl="node1" presStyleIdx="1" presStyleCnt="3">
+        <dgm:presLayoutVars>
+          <dgm:bulletEnabled val="1"/>
+        </dgm:presLayoutVars>
+      </dgm:prSet>
+      <dgm:spPr/>
+    </dgm:pt>
+    <dgm:pt modelId="{5E243B6E-1A17-E742-AD50-5A5D80C964D8}" type="pres">
+      <dgm:prSet presAssocID="{C3CB17ED-E5FD-1940-A6E2-3C1422B71684}" presName="item3" presStyleLbl="node1" presStyleIdx="2" presStyleCnt="3">
+        <dgm:presLayoutVars>
+          <dgm:bulletEnabled val="1"/>
+        </dgm:presLayoutVars>
+      </dgm:prSet>
+      <dgm:spPr/>
+    </dgm:pt>
+    <dgm:pt modelId="{3A7FDB97-7BD7-E846-B567-D50FB5B474C2}" type="pres">
+      <dgm:prSet presAssocID="{DD36BFCF-C059-0641-8E04-D59E2EE6ECAE}" presName="funnel" presStyleLbl="trAlignAcc1" presStyleIdx="0" presStyleCnt="1" custLinFactNeighborX="119" custLinFactNeighborY="-893"/>
+      <dgm:spPr/>
+    </dgm:pt>
+  </dgm:ptLst>
+  <dgm:cxnLst>
+    <dgm:cxn modelId="{C368820C-2EEC-214E-9060-37F00382B602}" type="presOf" srcId="{DD36BFCF-C059-0641-8E04-D59E2EE6ECAE}" destId="{A3E367B3-92D2-4342-9E3D-42CE7977AA24}" srcOrd="0" destOrd="0" presId="urn:microsoft.com/office/officeart/2005/8/layout/funnel1"/>
+    <dgm:cxn modelId="{6D0E4D2B-0CE4-564F-9F98-8F6AB1E343B4}" srcId="{DD36BFCF-C059-0641-8E04-D59E2EE6ECAE}" destId="{844A12C2-6B42-D140-AF29-BD921A7C756C}" srcOrd="0" destOrd="0" parTransId="{C088FA55-8B52-A246-9C4B-3EA57E507F01}" sibTransId="{C3810CDF-7975-584A-8BA9-5B0F5C03628D}"/>
+    <dgm:cxn modelId="{69105D39-2EDE-E946-919F-7DD4503ACA32}" srcId="{DD36BFCF-C059-0641-8E04-D59E2EE6ECAE}" destId="{3528438F-93F5-074F-952A-895D4FD85C26}" srcOrd="2" destOrd="0" parTransId="{86FDBACA-1BF0-8942-A944-CD638C218D7A}" sibTransId="{88AC15DD-C6FB-194C-82F6-2EE9E3369EA7}"/>
+    <dgm:cxn modelId="{C0ACFA3E-C2F9-1D49-8104-7CD63BBBFEE3}" type="presOf" srcId="{F38CC652-A661-6D4C-BDB7-9B25D3E206AA}" destId="{7781A67B-3616-5142-B7A7-FF7B4A054798}" srcOrd="0" destOrd="0" presId="urn:microsoft.com/office/officeart/2005/8/layout/funnel1"/>
+    <dgm:cxn modelId="{57DC316B-F297-D447-B3AC-EBE6A090428C}" type="presOf" srcId="{C3CB17ED-E5FD-1940-A6E2-3C1422B71684}" destId="{D764BBCA-3146-8447-84C7-564B62B39447}" srcOrd="0" destOrd="0" presId="urn:microsoft.com/office/officeart/2005/8/layout/funnel1"/>
+    <dgm:cxn modelId="{738279BE-0B32-EC43-8794-797E40C4813B}" srcId="{DD36BFCF-C059-0641-8E04-D59E2EE6ECAE}" destId="{C3CB17ED-E5FD-1940-A6E2-3C1422B71684}" srcOrd="3" destOrd="0" parTransId="{F052CED6-50C7-B14D-A566-50D8BB518970}" sibTransId="{6DDC67EA-C959-CF41-9DEE-0459F97A707C}"/>
+    <dgm:cxn modelId="{4774DED9-D27A-AE49-B2EC-6B2A56F1E1F7}" type="presOf" srcId="{844A12C2-6B42-D140-AF29-BD921A7C756C}" destId="{5E243B6E-1A17-E742-AD50-5A5D80C964D8}" srcOrd="0" destOrd="0" presId="urn:microsoft.com/office/officeart/2005/8/layout/funnel1"/>
+    <dgm:cxn modelId="{52B6F1E4-6491-D84A-8429-1DA9911CA10C}" type="presOf" srcId="{3528438F-93F5-074F-952A-895D4FD85C26}" destId="{1ABD8563-783E-304E-A4C5-A413D082CA74}" srcOrd="0" destOrd="0" presId="urn:microsoft.com/office/officeart/2005/8/layout/funnel1"/>
+    <dgm:cxn modelId="{4E0D04ED-E819-8447-9A07-FD3E207A2D5B}" srcId="{DD36BFCF-C059-0641-8E04-D59E2EE6ECAE}" destId="{F38CC652-A661-6D4C-BDB7-9B25D3E206AA}" srcOrd="1" destOrd="0" parTransId="{920FC5BD-5E2C-5440-B754-874574E92766}" sibTransId="{23E080EF-622A-654A-99DC-7C6680500BC4}"/>
+    <dgm:cxn modelId="{2D7568B2-1C25-4641-A86B-331D3A233D8B}" type="presParOf" srcId="{A3E367B3-92D2-4342-9E3D-42CE7977AA24}" destId="{60B213E7-4BCF-C040-8E8F-FD9342942D77}" srcOrd="0" destOrd="0" presId="urn:microsoft.com/office/officeart/2005/8/layout/funnel1"/>
+    <dgm:cxn modelId="{9E407268-6B9B-5346-B768-FC5B05B3E665}" type="presParOf" srcId="{A3E367B3-92D2-4342-9E3D-42CE7977AA24}" destId="{5F1FDAF6-9825-2342-AF58-90616057410A}" srcOrd="1" destOrd="0" presId="urn:microsoft.com/office/officeart/2005/8/layout/funnel1"/>
+    <dgm:cxn modelId="{DD2C3648-DA71-D943-89F0-36B9EE7CBAFB}" type="presParOf" srcId="{A3E367B3-92D2-4342-9E3D-42CE7977AA24}" destId="{D764BBCA-3146-8447-84C7-564B62B39447}" srcOrd="2" destOrd="0" presId="urn:microsoft.com/office/officeart/2005/8/layout/funnel1"/>
+    <dgm:cxn modelId="{C03E36FA-5309-914A-8514-5D79069E7F10}" type="presParOf" srcId="{A3E367B3-92D2-4342-9E3D-42CE7977AA24}" destId="{1ABD8563-783E-304E-A4C5-A413D082CA74}" srcOrd="3" destOrd="0" presId="urn:microsoft.com/office/officeart/2005/8/layout/funnel1"/>
+    <dgm:cxn modelId="{A84E6709-25C7-DF4E-A0C1-0670883C6E94}" type="presParOf" srcId="{A3E367B3-92D2-4342-9E3D-42CE7977AA24}" destId="{7781A67B-3616-5142-B7A7-FF7B4A054798}" srcOrd="4" destOrd="0" presId="urn:microsoft.com/office/officeart/2005/8/layout/funnel1"/>
+    <dgm:cxn modelId="{3061C596-9548-A74D-B9C2-429CA3CDFACA}" type="presParOf" srcId="{A3E367B3-92D2-4342-9E3D-42CE7977AA24}" destId="{5E243B6E-1A17-E742-AD50-5A5D80C964D8}" srcOrd="5" destOrd="0" presId="urn:microsoft.com/office/officeart/2005/8/layout/funnel1"/>
+    <dgm:cxn modelId="{60AD6778-F3DC-1D4B-9DC2-CC9D5A319CD0}" type="presParOf" srcId="{A3E367B3-92D2-4342-9E3D-42CE7977AA24}" destId="{3A7FDB97-7BD7-E846-B567-D50FB5B474C2}" srcOrd="6" destOrd="0" presId="urn:microsoft.com/office/officeart/2005/8/layout/funnel1"/>
+  </dgm:cxnLst>
+  <dgm:bg/>
+  <dgm:whole/>
+  <dgm:extLst>
+    <a:ext uri="http://schemas.microsoft.com/office/drawing/2008/diagram">
+      <dsp:dataModelExt xmlns:dsp="http://schemas.microsoft.com/office/drawing/2008/diagram" relId="rId8" minVer="http://schemas.openxmlformats.org/drawingml/2006/diagram"/>
     </a:ext>
   </dgm:extLst>
 </dgm:dataModel>
@@ -1944,6 +2933,451 @@
 </dsp:drawing>
 </file>
 
+<file path=ppt/diagrams/drawing2.xml><?xml version="1.0" encoding="utf-8"?>
+<dsp:drawing xmlns:dgm="http://schemas.openxmlformats.org/drawingml/2006/diagram" xmlns:dsp="http://schemas.microsoft.com/office/drawing/2008/diagram" xmlns:a="http://schemas.openxmlformats.org/drawingml/2006/main">
+  <dsp:spTree>
+    <dsp:nvGrpSpPr>
+      <dsp:cNvPr id="0" name=""/>
+      <dsp:cNvGrpSpPr/>
+    </dsp:nvGrpSpPr>
+    <dsp:grpSpPr/>
+    <dsp:sp modelId="{60B213E7-4BCF-C040-8E8F-FD9342942D77}">
+      <dsp:nvSpPr>
+        <dsp:cNvPr id="0" name=""/>
+        <dsp:cNvSpPr/>
+      </dsp:nvSpPr>
+      <dsp:spPr>
+        <a:xfrm>
+          <a:off x="1016810" y="104641"/>
+          <a:ext cx="2076739" cy="721224"/>
+        </a:xfrm>
+        <a:prstGeom prst="ellipse">
+          <a:avLst/>
+        </a:prstGeom>
+        <a:solidFill>
+          <a:schemeClr val="accent1">
+            <a:tint val="50000"/>
+            <a:alpha val="40000"/>
+            <a:hueOff val="0"/>
+            <a:satOff val="0"/>
+            <a:lumOff val="0"/>
+            <a:alphaOff val="0"/>
+          </a:schemeClr>
+        </a:solidFill>
+        <a:ln>
+          <a:noFill/>
+        </a:ln>
+        <a:effectLst/>
+      </dsp:spPr>
+      <dsp:style>
+        <a:lnRef idx="0">
+          <a:scrgbClr r="0" g="0" b="0"/>
+        </a:lnRef>
+        <a:fillRef idx="1">
+          <a:scrgbClr r="0" g="0" b="0"/>
+        </a:fillRef>
+        <a:effectRef idx="0">
+          <a:scrgbClr r="0" g="0" b="0"/>
+        </a:effectRef>
+        <a:fontRef idx="minor"/>
+      </dsp:style>
+    </dsp:sp>
+    <dsp:sp modelId="{5F1FDAF6-9825-2342-AF58-90616057410A}">
+      <dsp:nvSpPr>
+        <dsp:cNvPr id="0" name=""/>
+        <dsp:cNvSpPr/>
+      </dsp:nvSpPr>
+      <dsp:spPr>
+        <a:xfrm>
+          <a:off x="1857165" y="1870675"/>
+          <a:ext cx="402468" cy="257580"/>
+        </a:xfrm>
+        <a:prstGeom prst="downArrow">
+          <a:avLst/>
+        </a:prstGeom>
+        <a:solidFill>
+          <a:schemeClr val="accent1">
+            <a:tint val="60000"/>
+            <a:hueOff val="0"/>
+            <a:satOff val="0"/>
+            <a:lumOff val="0"/>
+            <a:alphaOff val="0"/>
+          </a:schemeClr>
+        </a:solidFill>
+        <a:ln w="19050" cap="flat" cmpd="sng" algn="ctr">
+          <a:solidFill>
+            <a:schemeClr val="lt1">
+              <a:hueOff val="0"/>
+              <a:satOff val="0"/>
+              <a:lumOff val="0"/>
+              <a:alphaOff val="0"/>
+            </a:schemeClr>
+          </a:solidFill>
+          <a:prstDash val="solid"/>
+          <a:miter lim="800000"/>
+        </a:ln>
+        <a:effectLst/>
+      </dsp:spPr>
+      <dsp:style>
+        <a:lnRef idx="2">
+          <a:scrgbClr r="0" g="0" b="0"/>
+        </a:lnRef>
+        <a:fillRef idx="1">
+          <a:scrgbClr r="0" g="0" b="0"/>
+        </a:fillRef>
+        <a:effectRef idx="0">
+          <a:scrgbClr r="0" g="0" b="0"/>
+        </a:effectRef>
+        <a:fontRef idx="minor"/>
+      </dsp:style>
+    </dsp:sp>
+    <dsp:sp modelId="{D764BBCA-3146-8447-84C7-564B62B39447}">
+      <dsp:nvSpPr>
+        <dsp:cNvPr id="0" name=""/>
+        <dsp:cNvSpPr/>
+      </dsp:nvSpPr>
+      <dsp:spPr>
+        <a:xfrm>
+          <a:off x="1092474" y="2092838"/>
+          <a:ext cx="1931850" cy="482962"/>
+        </a:xfrm>
+        <a:prstGeom prst="rect">
+          <a:avLst/>
+        </a:prstGeom>
+        <a:noFill/>
+        <a:ln>
+          <a:noFill/>
+        </a:ln>
+        <a:effectLst/>
+      </dsp:spPr>
+      <dsp:style>
+        <a:lnRef idx="0">
+          <a:scrgbClr r="0" g="0" b="0"/>
+        </a:lnRef>
+        <a:fillRef idx="0">
+          <a:scrgbClr r="0" g="0" b="0"/>
+        </a:fillRef>
+        <a:effectRef idx="0">
+          <a:scrgbClr r="0" g="0" b="0"/>
+        </a:effectRef>
+        <a:fontRef idx="minor"/>
+      </dsp:style>
+      <dsp:txBody>
+        <a:bodyPr spcFirstLastPara="0" vert="horz" wrap="square" lIns="120904" tIns="120904" rIns="120904" bIns="120904" numCol="1" spcCol="1270" anchor="ctr" anchorCtr="0">
+          <a:noAutofit/>
+        </a:bodyPr>
+        <a:lstStyle/>
+        <a:p>
+          <a:pPr marL="0" lvl="0" indent="0" algn="ctr" defTabSz="755650">
+            <a:lnSpc>
+              <a:spcPct val="90000"/>
+            </a:lnSpc>
+            <a:spcBef>
+              <a:spcPct val="0"/>
+            </a:spcBef>
+            <a:spcAft>
+              <a:spcPct val="35000"/>
+            </a:spcAft>
+            <a:buNone/>
+          </a:pPr>
+          <a:r>
+            <a:rPr lang="en-US" sz="1700" kern="1200" dirty="0"/>
+            <a:t>My APP</a:t>
+          </a:r>
+        </a:p>
+      </dsp:txBody>
+      <dsp:txXfrm>
+        <a:off x="1092474" y="2092838"/>
+        <a:ext cx="1931850" cy="482962"/>
+      </dsp:txXfrm>
+    </dsp:sp>
+    <dsp:sp modelId="{1ABD8563-783E-304E-A4C5-A413D082CA74}">
+      <dsp:nvSpPr>
+        <dsp:cNvPr id="0" name=""/>
+        <dsp:cNvSpPr/>
+      </dsp:nvSpPr>
+      <dsp:spPr>
+        <a:xfrm>
+          <a:off x="1771842" y="881567"/>
+          <a:ext cx="724444" cy="724444"/>
+        </a:xfrm>
+        <a:prstGeom prst="ellipse">
+          <a:avLst/>
+        </a:prstGeom>
+        <a:solidFill>
+          <a:schemeClr val="accent1">
+            <a:hueOff val="0"/>
+            <a:satOff val="0"/>
+            <a:lumOff val="0"/>
+            <a:alphaOff val="0"/>
+          </a:schemeClr>
+        </a:solidFill>
+        <a:ln w="19050" cap="flat" cmpd="sng" algn="ctr">
+          <a:solidFill>
+            <a:schemeClr val="lt1">
+              <a:hueOff val="0"/>
+              <a:satOff val="0"/>
+              <a:lumOff val="0"/>
+              <a:alphaOff val="0"/>
+            </a:schemeClr>
+          </a:solidFill>
+          <a:prstDash val="solid"/>
+          <a:miter lim="800000"/>
+        </a:ln>
+        <a:effectLst/>
+      </dsp:spPr>
+      <dsp:style>
+        <a:lnRef idx="2">
+          <a:scrgbClr r="0" g="0" b="0"/>
+        </a:lnRef>
+        <a:fillRef idx="1">
+          <a:scrgbClr r="0" g="0" b="0"/>
+        </a:fillRef>
+        <a:effectRef idx="0">
+          <a:scrgbClr r="0" g="0" b="0"/>
+        </a:effectRef>
+        <a:fontRef idx="minor">
+          <a:schemeClr val="lt1"/>
+        </a:fontRef>
+      </dsp:style>
+      <dsp:txBody>
+        <a:bodyPr spcFirstLastPara="0" vert="horz" wrap="square" lIns="11430" tIns="11430" rIns="11430" bIns="11430" numCol="1" spcCol="1270" anchor="ctr" anchorCtr="0">
+          <a:noAutofit/>
+        </a:bodyPr>
+        <a:lstStyle/>
+        <a:p>
+          <a:pPr marL="0" lvl="0" indent="0" algn="ctr" defTabSz="400050">
+            <a:lnSpc>
+              <a:spcPct val="90000"/>
+            </a:lnSpc>
+            <a:spcBef>
+              <a:spcPct val="0"/>
+            </a:spcBef>
+            <a:spcAft>
+              <a:spcPct val="35000"/>
+            </a:spcAft>
+            <a:buNone/>
+          </a:pPr>
+          <a:r>
+            <a:rPr lang="en-US" sz="900" kern="1200" dirty="0"/>
+            <a:t>Db</a:t>
+          </a:r>
+        </a:p>
+      </dsp:txBody>
+      <dsp:txXfrm>
+        <a:off x="1877934" y="987659"/>
+        <a:ext cx="512260" cy="512260"/>
+      </dsp:txXfrm>
+    </dsp:sp>
+    <dsp:sp modelId="{7781A67B-3616-5142-B7A7-FF7B4A054798}">
+      <dsp:nvSpPr>
+        <dsp:cNvPr id="0" name=""/>
+        <dsp:cNvSpPr/>
+      </dsp:nvSpPr>
+      <dsp:spPr>
+        <a:xfrm>
+          <a:off x="1253462" y="338073"/>
+          <a:ext cx="724444" cy="724444"/>
+        </a:xfrm>
+        <a:prstGeom prst="ellipse">
+          <a:avLst/>
+        </a:prstGeom>
+        <a:solidFill>
+          <a:schemeClr val="accent1">
+            <a:hueOff val="0"/>
+            <a:satOff val="0"/>
+            <a:lumOff val="0"/>
+            <a:alphaOff val="0"/>
+          </a:schemeClr>
+        </a:solidFill>
+        <a:ln w="19050" cap="flat" cmpd="sng" algn="ctr">
+          <a:solidFill>
+            <a:schemeClr val="lt1">
+              <a:hueOff val="0"/>
+              <a:satOff val="0"/>
+              <a:lumOff val="0"/>
+              <a:alphaOff val="0"/>
+            </a:schemeClr>
+          </a:solidFill>
+          <a:prstDash val="solid"/>
+          <a:miter lim="800000"/>
+        </a:ln>
+        <a:effectLst/>
+      </dsp:spPr>
+      <dsp:style>
+        <a:lnRef idx="2">
+          <a:scrgbClr r="0" g="0" b="0"/>
+        </a:lnRef>
+        <a:fillRef idx="1">
+          <a:scrgbClr r="0" g="0" b="0"/>
+        </a:fillRef>
+        <a:effectRef idx="0">
+          <a:scrgbClr r="0" g="0" b="0"/>
+        </a:effectRef>
+        <a:fontRef idx="minor">
+          <a:schemeClr val="lt1"/>
+        </a:fontRef>
+      </dsp:style>
+      <dsp:txBody>
+        <a:bodyPr spcFirstLastPara="0" vert="horz" wrap="square" lIns="11430" tIns="11430" rIns="11430" bIns="11430" numCol="1" spcCol="1270" anchor="ctr" anchorCtr="0">
+          <a:noAutofit/>
+        </a:bodyPr>
+        <a:lstStyle/>
+        <a:p>
+          <a:pPr marL="0" lvl="0" indent="0" algn="ctr" defTabSz="400050">
+            <a:lnSpc>
+              <a:spcPct val="90000"/>
+            </a:lnSpc>
+            <a:spcBef>
+              <a:spcPct val="0"/>
+            </a:spcBef>
+            <a:spcAft>
+              <a:spcPct val="35000"/>
+            </a:spcAft>
+            <a:buNone/>
+          </a:pPr>
+          <a:r>
+            <a:rPr lang="en-US" sz="900" kern="1200" dirty="0"/>
+            <a:t>Backend</a:t>
+          </a:r>
+        </a:p>
+      </dsp:txBody>
+      <dsp:txXfrm>
+        <a:off x="1359554" y="444165"/>
+        <a:ext cx="512260" cy="512260"/>
+      </dsp:txXfrm>
+    </dsp:sp>
+    <dsp:sp modelId="{5E243B6E-1A17-E742-AD50-5A5D80C964D8}">
+      <dsp:nvSpPr>
+        <dsp:cNvPr id="0" name=""/>
+        <dsp:cNvSpPr/>
+      </dsp:nvSpPr>
+      <dsp:spPr>
+        <a:xfrm>
+          <a:off x="1994004" y="162919"/>
+          <a:ext cx="724444" cy="724444"/>
+        </a:xfrm>
+        <a:prstGeom prst="ellipse">
+          <a:avLst/>
+        </a:prstGeom>
+        <a:solidFill>
+          <a:schemeClr val="accent1">
+            <a:hueOff val="0"/>
+            <a:satOff val="0"/>
+            <a:lumOff val="0"/>
+            <a:alphaOff val="0"/>
+          </a:schemeClr>
+        </a:solidFill>
+        <a:ln w="19050" cap="flat" cmpd="sng" algn="ctr">
+          <a:solidFill>
+            <a:schemeClr val="lt1">
+              <a:hueOff val="0"/>
+              <a:satOff val="0"/>
+              <a:lumOff val="0"/>
+              <a:alphaOff val="0"/>
+            </a:schemeClr>
+          </a:solidFill>
+          <a:prstDash val="solid"/>
+          <a:miter lim="800000"/>
+        </a:ln>
+        <a:effectLst/>
+      </dsp:spPr>
+      <dsp:style>
+        <a:lnRef idx="2">
+          <a:scrgbClr r="0" g="0" b="0"/>
+        </a:lnRef>
+        <a:fillRef idx="1">
+          <a:scrgbClr r="0" g="0" b="0"/>
+        </a:fillRef>
+        <a:effectRef idx="0">
+          <a:scrgbClr r="0" g="0" b="0"/>
+        </a:effectRef>
+        <a:fontRef idx="minor">
+          <a:schemeClr val="lt1"/>
+        </a:fontRef>
+      </dsp:style>
+      <dsp:txBody>
+        <a:bodyPr spcFirstLastPara="0" vert="horz" wrap="square" lIns="11430" tIns="11430" rIns="11430" bIns="11430" numCol="1" spcCol="1270" anchor="ctr" anchorCtr="0">
+          <a:noAutofit/>
+        </a:bodyPr>
+        <a:lstStyle/>
+        <a:p>
+          <a:pPr marL="0" lvl="0" indent="0" algn="ctr" defTabSz="400050">
+            <a:lnSpc>
+              <a:spcPct val="90000"/>
+            </a:lnSpc>
+            <a:spcBef>
+              <a:spcPct val="0"/>
+            </a:spcBef>
+            <a:spcAft>
+              <a:spcPct val="35000"/>
+            </a:spcAft>
+            <a:buNone/>
+          </a:pPr>
+          <a:r>
+            <a:rPr lang="en-US" sz="900" kern="1200" dirty="0"/>
+            <a:t>Frontend</a:t>
+          </a:r>
+        </a:p>
+      </dsp:txBody>
+      <dsp:txXfrm>
+        <a:off x="2100096" y="269011"/>
+        <a:ext cx="512260" cy="512260"/>
+      </dsp:txXfrm>
+    </dsp:sp>
+    <dsp:sp modelId="{3A7FDB97-7BD7-E846-B567-D50FB5B474C2}">
+      <dsp:nvSpPr>
+        <dsp:cNvPr id="0" name=""/>
+        <dsp:cNvSpPr/>
+      </dsp:nvSpPr>
+      <dsp:spPr>
+        <a:xfrm>
+          <a:off x="934169" y="0"/>
+          <a:ext cx="2253825" cy="1803060"/>
+        </a:xfrm>
+        <a:prstGeom prst="funnel">
+          <a:avLst/>
+        </a:prstGeom>
+        <a:solidFill>
+          <a:schemeClr val="lt1">
+            <a:alpha val="40000"/>
+            <a:hueOff val="0"/>
+            <a:satOff val="0"/>
+            <a:lumOff val="0"/>
+            <a:alphaOff val="0"/>
+          </a:schemeClr>
+        </a:solidFill>
+        <a:ln w="12700" cap="flat" cmpd="sng" algn="ctr">
+          <a:solidFill>
+            <a:schemeClr val="accent1">
+              <a:hueOff val="0"/>
+              <a:satOff val="0"/>
+              <a:lumOff val="0"/>
+              <a:alphaOff val="0"/>
+            </a:schemeClr>
+          </a:solidFill>
+          <a:prstDash val="solid"/>
+          <a:miter lim="800000"/>
+        </a:ln>
+        <a:effectLst/>
+      </dsp:spPr>
+      <dsp:style>
+        <a:lnRef idx="1">
+          <a:scrgbClr r="0" g="0" b="0"/>
+        </a:lnRef>
+        <a:fillRef idx="1">
+          <a:scrgbClr r="0" g="0" b="0"/>
+        </a:fillRef>
+        <a:effectRef idx="0">
+          <a:scrgbClr r="0" g="0" b="0"/>
+        </a:effectRef>
+        <a:fontRef idx="minor"/>
+      </dsp:style>
+    </dsp:sp>
+  </dsp:spTree>
+</dsp:drawing>
+</file>
+
 <file path=ppt/diagrams/layout1.xml><?xml version="1.0" encoding="utf-8"?>
 <dgm:layoutDef xmlns:dgm="http://schemas.openxmlformats.org/drawingml/2006/diagram" xmlns:a="http://schemas.openxmlformats.org/drawingml/2006/main" uniqueId="urn:microsoft.com/office/officeart/2005/8/layout/radial6">
   <dgm:title val=""/>
@@ -2351,7 +3785,1359 @@
 </dgm:layoutDef>
 </file>
 
+<file path=ppt/diagrams/layout2.xml><?xml version="1.0" encoding="utf-8"?>
+<dgm:layoutDef xmlns:dgm="http://schemas.openxmlformats.org/drawingml/2006/diagram" xmlns:a="http://schemas.openxmlformats.org/drawingml/2006/main" uniqueId="urn:microsoft.com/office/officeart/2005/8/layout/funnel1">
+  <dgm:title val=""/>
+  <dgm:desc val=""/>
+  <dgm:catLst>
+    <dgm:cat type="relationship" pri="2000"/>
+    <dgm:cat type="process" pri="27000"/>
+  </dgm:catLst>
+  <dgm:sampData>
+    <dgm:dataModel>
+      <dgm:ptLst>
+        <dgm:pt modelId="0" type="doc"/>
+        <dgm:pt modelId="1">
+          <dgm:prSet phldr="1"/>
+        </dgm:pt>
+        <dgm:pt modelId="2">
+          <dgm:prSet phldr="1"/>
+        </dgm:pt>
+        <dgm:pt modelId="3">
+          <dgm:prSet phldr="1"/>
+        </dgm:pt>
+        <dgm:pt modelId="4">
+          <dgm:prSet phldr="1"/>
+        </dgm:pt>
+      </dgm:ptLst>
+      <dgm:cxnLst>
+        <dgm:cxn modelId="5" srcId="0" destId="1" srcOrd="0" destOrd="0"/>
+        <dgm:cxn modelId="6" srcId="0" destId="2" srcOrd="1" destOrd="0"/>
+        <dgm:cxn modelId="7" srcId="0" destId="3" srcOrd="2" destOrd="0"/>
+        <dgm:cxn modelId="8" srcId="0" destId="4" srcOrd="3" destOrd="0"/>
+      </dgm:cxnLst>
+      <dgm:bg/>
+      <dgm:whole/>
+    </dgm:dataModel>
+  </dgm:sampData>
+  <dgm:styleData>
+    <dgm:dataModel>
+      <dgm:ptLst>
+        <dgm:pt modelId="0" type="doc"/>
+        <dgm:pt modelId="1"/>
+        <dgm:pt modelId="2"/>
+      </dgm:ptLst>
+      <dgm:cxnLst>
+        <dgm:cxn modelId="3" srcId="0" destId="1" srcOrd="0" destOrd="0"/>
+        <dgm:cxn modelId="4" srcId="0" destId="2" srcOrd="1" destOrd="0"/>
+      </dgm:cxnLst>
+      <dgm:bg/>
+      <dgm:whole/>
+    </dgm:dataModel>
+  </dgm:styleData>
+  <dgm:clrData>
+    <dgm:dataModel>
+      <dgm:ptLst>
+        <dgm:pt modelId="0" type="doc"/>
+        <dgm:pt modelId="1"/>
+        <dgm:pt modelId="2"/>
+        <dgm:pt modelId="3"/>
+        <dgm:pt modelId="4"/>
+      </dgm:ptLst>
+      <dgm:cxnLst>
+        <dgm:cxn modelId="5" srcId="0" destId="1" srcOrd="0" destOrd="0"/>
+        <dgm:cxn modelId="6" srcId="0" destId="2" srcOrd="1" destOrd="0"/>
+        <dgm:cxn modelId="7" srcId="0" destId="3" srcOrd="2" destOrd="0"/>
+        <dgm:cxn modelId="8" srcId="0" destId="4" srcOrd="3" destOrd="0"/>
+      </dgm:cxnLst>
+      <dgm:bg/>
+      <dgm:whole/>
+    </dgm:dataModel>
+  </dgm:clrData>
+  <dgm:layoutNode name="Name0">
+    <dgm:varLst>
+      <dgm:chMax val="4"/>
+      <dgm:resizeHandles val="exact"/>
+    </dgm:varLst>
+    <dgm:alg type="composite">
+      <dgm:param type="ar" val="1.25"/>
+    </dgm:alg>
+    <dgm:shape xmlns:r="http://schemas.openxmlformats.org/officeDocument/2006/relationships" r:blip="">
+      <dgm:adjLst/>
+    </dgm:shape>
+    <dgm:presOf/>
+    <dgm:choose name="Name1">
+      <dgm:if name="Name2" axis="ch" ptType="node" func="cnt" op="equ" val="2">
+        <dgm:constrLst>
+          <dgm:constr type="w" for="ch" forName="ellipse" refType="w" fact="0.645"/>
+          <dgm:constr type="h" for="ch" forName="ellipse" refType="h" fact="0.28"/>
+          <dgm:constr type="t" for="ch" forName="ellipse" refType="w" fact="0.0275"/>
+          <dgm:constr type="l" for="ch" forName="ellipse" refType="w" fact="0.0265"/>
+          <dgm:constr type="w" for="ch" forName="arrow1" refType="w" fact="0.125"/>
+          <dgm:constr type="h" for="ch" forName="arrow1" refType="h" fact="0.1"/>
+          <dgm:constr type="t" for="ch" forName="arrow1" refType="h" fact="0.72"/>
+          <dgm:constr type="l" for="ch" forName="arrow1" refType="w" fact="0.2875"/>
+          <dgm:constr type="w" for="ch" forName="rectangle" refType="w" fact="0.6"/>
+          <dgm:constr type="h" for="ch" forName="rectangle" refType="w" refFor="ch" refForName="rectangle" fact="0.25"/>
+          <dgm:constr type="t" for="ch" forName="rectangle" refType="h" fact="0.8"/>
+          <dgm:constr type="l" for="ch" forName="rectangle" refType="w" fact="0.05"/>
+          <dgm:constr type="w" for="ch" forName="item1" refType="w" fact="0.35"/>
+          <dgm:constr type="h" for="ch" forName="item1" refType="w" fact="0.35"/>
+          <dgm:constr type="t" for="ch" forName="item1" refType="h" fact="0.05"/>
+          <dgm:constr type="l" for="ch" forName="item1" refType="w" fact="0.125"/>
+          <dgm:constr type="primFontSz" for="ch" forName="item1" op="equ" val="65"/>
+          <dgm:constr type="w" for="ch" forName="funnel" refType="w" fact="0.7"/>
+          <dgm:constr type="h" for="ch" forName="funnel" refType="h" fact="0.7"/>
+          <dgm:constr type="t" for="ch" forName="funnel"/>
+          <dgm:constr type="l" for="ch" forName="funnel"/>
+        </dgm:constrLst>
+      </dgm:if>
+      <dgm:else name="Name3">
+        <dgm:constrLst>
+          <dgm:constr type="w" for="ch" forName="ellipse" refType="w" fact="0.645"/>
+          <dgm:constr type="h" for="ch" forName="ellipse" refType="h" fact="0.28"/>
+          <dgm:constr type="t" for="ch" forName="ellipse" refType="w" fact="0.0275"/>
+          <dgm:constr type="l" for="ch" forName="ellipse" refType="w" fact="0.0265"/>
+          <dgm:constr type="w" for="ch" forName="arrow1" refType="w" fact="0.125"/>
+          <dgm:constr type="h" for="ch" forName="arrow1" refType="h" fact="0.1"/>
+          <dgm:constr type="t" for="ch" forName="arrow1" refType="h" fact="0.72"/>
+          <dgm:constr type="l" for="ch" forName="arrow1" refType="w" fact="0.2875"/>
+          <dgm:constr type="w" for="ch" forName="rectangle" refType="w" fact="0.6"/>
+          <dgm:constr type="h" for="ch" forName="rectangle" refType="w" refFor="ch" refForName="rectangle" fact="0.25"/>
+          <dgm:constr type="t" for="ch" forName="rectangle" refType="h" fact="0.8"/>
+          <dgm:constr type="l" for="ch" forName="rectangle" refType="w" fact="0.05"/>
+          <dgm:constr type="primFontSz" for="ch" forName="rectangle" val="65"/>
+          <dgm:constr type="w" for="ch" forName="item1" refType="w" fact="0.225"/>
+          <dgm:constr type="h" for="ch" forName="item1" refType="w" fact="0.225"/>
+          <dgm:constr type="t" for="ch" forName="item1" refType="h" fact="0.336"/>
+          <dgm:constr type="l" for="ch" forName="item1" refType="w" fact="0.261"/>
+          <dgm:constr type="primFontSz" for="ch" forName="item1" val="65"/>
+          <dgm:constr type="w" for="ch" forName="item2" refType="w" fact="0.225"/>
+          <dgm:constr type="h" for="ch" forName="item2" refType="w" fact="0.225"/>
+          <dgm:constr type="t" for="ch" forName="item2" refType="h" fact="0.125"/>
+          <dgm:constr type="l" for="ch" forName="item2" refType="w" fact="0.1"/>
+          <dgm:constr type="primFontSz" for="ch" forName="item2" refType="primFontSz" refFor="ch" refForName="item1" op="equ"/>
+          <dgm:constr type="w" for="ch" forName="item3" refType="w" fact="0.225"/>
+          <dgm:constr type="h" for="ch" forName="item3" refType="w" fact="0.225"/>
+          <dgm:constr type="t" for="ch" forName="item3" refType="h" fact="0.057"/>
+          <dgm:constr type="l" for="ch" forName="item3" refType="w" fact="0.33"/>
+          <dgm:constr type="primFontSz" for="ch" forName="item3" refType="primFontSz" refFor="ch" refForName="item1" op="equ"/>
+          <dgm:constr type="w" for="ch" forName="funnel" refType="w" fact="0.7"/>
+          <dgm:constr type="h" for="ch" forName="funnel" refType="h" fact="0.7"/>
+          <dgm:constr type="t" for="ch" forName="funnel"/>
+          <dgm:constr type="l" for="ch" forName="funnel"/>
+        </dgm:constrLst>
+      </dgm:else>
+    </dgm:choose>
+    <dgm:ruleLst/>
+    <dgm:choose name="Name4">
+      <dgm:if name="Name5" axis="ch" ptType="node" func="cnt" op="gte" val="1">
+        <dgm:layoutNode name="ellipse" styleLbl="trBgShp">
+          <dgm:alg type="sp"/>
+          <dgm:shape xmlns:r="http://schemas.openxmlformats.org/officeDocument/2006/relationships" type="ellipse" r:blip="">
+            <dgm:adjLst/>
+          </dgm:shape>
+          <dgm:presOf/>
+          <dgm:constrLst/>
+          <dgm:ruleLst/>
+        </dgm:layoutNode>
+        <dgm:layoutNode name="arrow1" styleLbl="fgShp">
+          <dgm:alg type="sp"/>
+          <dgm:shape xmlns:r="http://schemas.openxmlformats.org/officeDocument/2006/relationships" type="downArrow" r:blip="">
+            <dgm:adjLst/>
+          </dgm:shape>
+          <dgm:presOf/>
+          <dgm:constrLst/>
+          <dgm:ruleLst/>
+        </dgm:layoutNode>
+        <dgm:layoutNode name="rectangle" styleLbl="revTx">
+          <dgm:varLst>
+            <dgm:bulletEnabled val="1"/>
+          </dgm:varLst>
+          <dgm:alg type="tx">
+            <dgm:param type="txAnchorHorzCh" val="ctr"/>
+          </dgm:alg>
+          <dgm:shape xmlns:r="http://schemas.openxmlformats.org/officeDocument/2006/relationships" type="rect" r:blip="">
+            <dgm:adjLst/>
+          </dgm:shape>
+          <dgm:choose name="Name6">
+            <dgm:if name="Name7" axis="ch" ptType="node" func="cnt" op="equ" val="1">
+              <dgm:presOf axis="ch desOrSelf" ptType="node node" st="1 1" cnt="1 0"/>
+            </dgm:if>
+            <dgm:if name="Name8" axis="ch" ptType="node" func="cnt" op="equ" val="2">
+              <dgm:presOf axis="ch desOrSelf" ptType="node node" st="2 1" cnt="1 0"/>
+            </dgm:if>
+            <dgm:if name="Name9" axis="ch" ptType="node" func="cnt" op="equ" val="3">
+              <dgm:presOf axis="ch desOrSelf" ptType="node node" st="3 1" cnt="1 0"/>
+            </dgm:if>
+            <dgm:else name="Name10">
+              <dgm:presOf axis="ch desOrSelf" ptType="node node" st="4 1" cnt="1 0"/>
+            </dgm:else>
+          </dgm:choose>
+          <dgm:constrLst/>
+          <dgm:ruleLst>
+            <dgm:rule type="primFontSz" val="5" fact="NaN" max="NaN"/>
+          </dgm:ruleLst>
+        </dgm:layoutNode>
+        <dgm:forEach name="Name11" axis="ch" ptType="node" st="2" cnt="1">
+          <dgm:layoutNode name="item1" styleLbl="node1">
+            <dgm:varLst>
+              <dgm:bulletEnabled val="1"/>
+            </dgm:varLst>
+            <dgm:alg type="tx">
+              <dgm:param type="txAnchorVertCh" val="mid"/>
+            </dgm:alg>
+            <dgm:shape xmlns:r="http://schemas.openxmlformats.org/officeDocument/2006/relationships" type="ellipse" r:blip="">
+              <dgm:adjLst/>
+            </dgm:shape>
+            <dgm:choose name="Name12">
+              <dgm:if name="Name13" axis="root ch" ptType="all node" func="cnt" op="equ" val="1">
+                <dgm:presOf/>
+              </dgm:if>
+              <dgm:if name="Name14" axis="root ch" ptType="all node" func="cnt" op="equ" val="2">
+                <dgm:presOf axis="root ch desOrSelf" ptType="all node node" st="1 1 1" cnt="0 1 0"/>
+              </dgm:if>
+              <dgm:if name="Name15" axis="root ch" ptType="all node" func="cnt" op="equ" val="3">
+                <dgm:presOf axis="root ch desOrSelf" ptType="all node node" st="1 2 1" cnt="0 1 0"/>
+              </dgm:if>
+              <dgm:else name="Name16">
+                <dgm:presOf axis="root ch desOrSelf" ptType="all node node" st="1 3 1" cnt="0 1 0"/>
+              </dgm:else>
+            </dgm:choose>
+            <dgm:constrLst>
+              <dgm:constr type="tMarg" refType="primFontSz" fact="0.1"/>
+              <dgm:constr type="bMarg" refType="primFontSz" fact="0.1"/>
+              <dgm:constr type="lMarg" refType="primFontSz" fact="0.1"/>
+              <dgm:constr type="rMarg" refType="primFontSz" fact="0.1"/>
+            </dgm:constrLst>
+            <dgm:ruleLst>
+              <dgm:rule type="primFontSz" val="5" fact="NaN" max="NaN"/>
+            </dgm:ruleLst>
+          </dgm:layoutNode>
+        </dgm:forEach>
+        <dgm:forEach name="Name17" axis="ch" ptType="node" st="3" cnt="1">
+          <dgm:layoutNode name="item2" styleLbl="node1">
+            <dgm:varLst>
+              <dgm:bulletEnabled val="1"/>
+            </dgm:varLst>
+            <dgm:alg type="tx">
+              <dgm:param type="txAnchorVertCh" val="mid"/>
+            </dgm:alg>
+            <dgm:shape xmlns:r="http://schemas.openxmlformats.org/officeDocument/2006/relationships" type="ellipse" r:blip="">
+              <dgm:adjLst/>
+            </dgm:shape>
+            <dgm:choose name="Name18">
+              <dgm:if name="Name19" axis="root ch" ptType="all node" func="cnt" op="equ" val="1">
+                <dgm:presOf/>
+              </dgm:if>
+              <dgm:if name="Name20" axis="root ch" ptType="all node" func="cnt" op="equ" val="2">
+                <dgm:presOf/>
+              </dgm:if>
+              <dgm:if name="Name21" axis="root ch" ptType="all node" func="cnt" op="equ" val="3">
+                <dgm:presOf axis="root ch desOrSelf" ptType="all node node" st="1 1 1" cnt="0 1 0"/>
+              </dgm:if>
+              <dgm:else name="Name22">
+                <dgm:presOf axis="root ch desOrSelf" ptType="all node node" st="1 2 1" cnt="0 1 0"/>
+              </dgm:else>
+            </dgm:choose>
+            <dgm:constrLst>
+              <dgm:constr type="tMarg" refType="primFontSz" fact="0.1"/>
+              <dgm:constr type="bMarg" refType="primFontSz" fact="0.1"/>
+              <dgm:constr type="lMarg" refType="primFontSz" fact="0.1"/>
+              <dgm:constr type="rMarg" refType="primFontSz" fact="0.1"/>
+            </dgm:constrLst>
+            <dgm:ruleLst>
+              <dgm:rule type="primFontSz" val="5" fact="NaN" max="NaN"/>
+            </dgm:ruleLst>
+          </dgm:layoutNode>
+        </dgm:forEach>
+        <dgm:forEach name="Name23" axis="ch" ptType="node" st="4" cnt="1">
+          <dgm:layoutNode name="item3" styleLbl="node1">
+            <dgm:varLst>
+              <dgm:bulletEnabled val="1"/>
+            </dgm:varLst>
+            <dgm:alg type="tx">
+              <dgm:param type="txAnchorVertCh" val="mid"/>
+            </dgm:alg>
+            <dgm:shape xmlns:r="http://schemas.openxmlformats.org/officeDocument/2006/relationships" type="ellipse" r:blip="">
+              <dgm:adjLst/>
+            </dgm:shape>
+            <dgm:choose name="Name24">
+              <dgm:if name="Name25" axis="root ch" ptType="all node" func="cnt" op="equ" val="1">
+                <dgm:presOf/>
+              </dgm:if>
+              <dgm:if name="Name26" axis="root ch" ptType="all node" func="cnt" op="equ" val="2">
+                <dgm:presOf/>
+              </dgm:if>
+              <dgm:if name="Name27" axis="root ch" ptType="all node" func="cnt" op="equ" val="3">
+                <dgm:presOf/>
+              </dgm:if>
+              <dgm:else name="Name28">
+                <dgm:presOf axis="root ch desOrSelf" ptType="all node node" st="1 1 1" cnt="0 1 0"/>
+              </dgm:else>
+            </dgm:choose>
+            <dgm:constrLst>
+              <dgm:constr type="tMarg" refType="primFontSz" fact="0.1"/>
+              <dgm:constr type="bMarg" refType="primFontSz" fact="0.1"/>
+              <dgm:constr type="lMarg" refType="primFontSz" fact="0.1"/>
+              <dgm:constr type="rMarg" refType="primFontSz" fact="0.1"/>
+            </dgm:constrLst>
+            <dgm:ruleLst>
+              <dgm:rule type="primFontSz" val="5" fact="NaN" max="NaN"/>
+            </dgm:ruleLst>
+          </dgm:layoutNode>
+        </dgm:forEach>
+        <dgm:layoutNode name="funnel" styleLbl="trAlignAcc1">
+          <dgm:alg type="sp"/>
+          <dgm:shape xmlns:r="http://schemas.openxmlformats.org/officeDocument/2006/relationships" type="funnel" r:blip="">
+            <dgm:adjLst/>
+          </dgm:shape>
+          <dgm:presOf/>
+          <dgm:constrLst/>
+          <dgm:ruleLst/>
+        </dgm:layoutNode>
+      </dgm:if>
+      <dgm:else name="Name29"/>
+    </dgm:choose>
+  </dgm:layoutNode>
+</dgm:layoutDef>
+</file>
+
 <file path=ppt/diagrams/quickStyle1.xml><?xml version="1.0" encoding="utf-8"?>
+<dgm:styleDef xmlns:dgm="http://schemas.openxmlformats.org/drawingml/2006/diagram" xmlns:a="http://schemas.openxmlformats.org/drawingml/2006/main" uniqueId="urn:microsoft.com/office/officeart/2005/8/quickstyle/simple1">
+  <dgm:title val=""/>
+  <dgm:desc val=""/>
+  <dgm:catLst>
+    <dgm:cat type="simple" pri="10100"/>
+  </dgm:catLst>
+  <dgm:scene3d>
+    <a:camera prst="orthographicFront"/>
+    <a:lightRig rig="threePt" dir="t"/>
+  </dgm:scene3d>
+  <dgm:styleLbl name="node0">
+    <dgm:scene3d>
+      <a:camera prst="orthographicFront"/>
+      <a:lightRig rig="threePt" dir="t"/>
+    </dgm:scene3d>
+    <dgm:sp3d/>
+    <dgm:txPr/>
+    <dgm:style>
+      <a:lnRef idx="2">
+        <a:scrgbClr r="0" g="0" b="0"/>
+      </a:lnRef>
+      <a:fillRef idx="1">
+        <a:scrgbClr r="0" g="0" b="0"/>
+      </a:fillRef>
+      <a:effectRef idx="0">
+        <a:scrgbClr r="0" g="0" b="0"/>
+      </a:effectRef>
+      <a:fontRef idx="minor">
+        <a:schemeClr val="lt1"/>
+      </a:fontRef>
+    </dgm:style>
+  </dgm:styleLbl>
+  <dgm:styleLbl name="lnNode1">
+    <dgm:scene3d>
+      <a:camera prst="orthographicFront"/>
+      <a:lightRig rig="threePt" dir="t"/>
+    </dgm:scene3d>
+    <dgm:sp3d/>
+    <dgm:txPr/>
+    <dgm:style>
+      <a:lnRef idx="2">
+        <a:scrgbClr r="0" g="0" b="0"/>
+      </a:lnRef>
+      <a:fillRef idx="1">
+        <a:scrgbClr r="0" g="0" b="0"/>
+      </a:fillRef>
+      <a:effectRef idx="0">
+        <a:scrgbClr r="0" g="0" b="0"/>
+      </a:effectRef>
+      <a:fontRef idx="minor">
+        <a:schemeClr val="lt1"/>
+      </a:fontRef>
+    </dgm:style>
+  </dgm:styleLbl>
+  <dgm:styleLbl name="vennNode1">
+    <dgm:scene3d>
+      <a:camera prst="orthographicFront"/>
+      <a:lightRig rig="threePt" dir="t"/>
+    </dgm:scene3d>
+    <dgm:sp3d/>
+    <dgm:txPr/>
+    <dgm:style>
+      <a:lnRef idx="2">
+        <a:scrgbClr r="0" g="0" b="0"/>
+      </a:lnRef>
+      <a:fillRef idx="1">
+        <a:scrgbClr r="0" g="0" b="0"/>
+      </a:fillRef>
+      <a:effectRef idx="0">
+        <a:scrgbClr r="0" g="0" b="0"/>
+      </a:effectRef>
+      <a:fontRef idx="minor">
+        <a:schemeClr val="tx1"/>
+      </a:fontRef>
+    </dgm:style>
+  </dgm:styleLbl>
+  <dgm:styleLbl name="alignNode1">
+    <dgm:scene3d>
+      <a:camera prst="orthographicFront"/>
+      <a:lightRig rig="threePt" dir="t"/>
+    </dgm:scene3d>
+    <dgm:sp3d/>
+    <dgm:txPr/>
+    <dgm:style>
+      <a:lnRef idx="2">
+        <a:scrgbClr r="0" g="0" b="0"/>
+      </a:lnRef>
+      <a:fillRef idx="1">
+        <a:scrgbClr r="0" g="0" b="0"/>
+      </a:fillRef>
+      <a:effectRef idx="0">
+        <a:scrgbClr r="0" g="0" b="0"/>
+      </a:effectRef>
+      <a:fontRef idx="minor">
+        <a:schemeClr val="lt1"/>
+      </a:fontRef>
+    </dgm:style>
+  </dgm:styleLbl>
+  <dgm:styleLbl name="node1">
+    <dgm:scene3d>
+      <a:camera prst="orthographicFront"/>
+      <a:lightRig rig="threePt" dir="t"/>
+    </dgm:scene3d>
+    <dgm:sp3d/>
+    <dgm:txPr/>
+    <dgm:style>
+      <a:lnRef idx="2">
+        <a:scrgbClr r="0" g="0" b="0"/>
+      </a:lnRef>
+      <a:fillRef idx="1">
+        <a:scrgbClr r="0" g="0" b="0"/>
+      </a:fillRef>
+      <a:effectRef idx="0">
+        <a:scrgbClr r="0" g="0" b="0"/>
+      </a:effectRef>
+      <a:fontRef idx="minor">
+        <a:schemeClr val="lt1"/>
+      </a:fontRef>
+    </dgm:style>
+  </dgm:styleLbl>
+  <dgm:styleLbl name="node2">
+    <dgm:scene3d>
+      <a:camera prst="orthographicFront"/>
+      <a:lightRig rig="threePt" dir="t"/>
+    </dgm:scene3d>
+    <dgm:sp3d/>
+    <dgm:txPr/>
+    <dgm:style>
+      <a:lnRef idx="2">
+        <a:scrgbClr r="0" g="0" b="0"/>
+      </a:lnRef>
+      <a:fillRef idx="1">
+        <a:scrgbClr r="0" g="0" b="0"/>
+      </a:fillRef>
+      <a:effectRef idx="0">
+        <a:scrgbClr r="0" g="0" b="0"/>
+      </a:effectRef>
+      <a:fontRef idx="minor">
+        <a:schemeClr val="lt1"/>
+      </a:fontRef>
+    </dgm:style>
+  </dgm:styleLbl>
+  <dgm:styleLbl name="node3">
+    <dgm:scene3d>
+      <a:camera prst="orthographicFront"/>
+      <a:lightRig rig="threePt" dir="t"/>
+    </dgm:scene3d>
+    <dgm:sp3d/>
+    <dgm:txPr/>
+    <dgm:style>
+      <a:lnRef idx="2">
+        <a:scrgbClr r="0" g="0" b="0"/>
+      </a:lnRef>
+      <a:fillRef idx="1">
+        <a:scrgbClr r="0" g="0" b="0"/>
+      </a:fillRef>
+      <a:effectRef idx="0">
+        <a:scrgbClr r="0" g="0" b="0"/>
+      </a:effectRef>
+      <a:fontRef idx="minor">
+        <a:schemeClr val="lt1"/>
+      </a:fontRef>
+    </dgm:style>
+  </dgm:styleLbl>
+  <dgm:styleLbl name="node4">
+    <dgm:scene3d>
+      <a:camera prst="orthographicFront"/>
+      <a:lightRig rig="threePt" dir="t"/>
+    </dgm:scene3d>
+    <dgm:sp3d/>
+    <dgm:txPr/>
+    <dgm:style>
+      <a:lnRef idx="2">
+        <a:scrgbClr r="0" g="0" b="0"/>
+      </a:lnRef>
+      <a:fillRef idx="1">
+        <a:scrgbClr r="0" g="0" b="0"/>
+      </a:fillRef>
+      <a:effectRef idx="0">
+        <a:scrgbClr r="0" g="0" b="0"/>
+      </a:effectRef>
+      <a:fontRef idx="minor">
+        <a:schemeClr val="lt1"/>
+      </a:fontRef>
+    </dgm:style>
+  </dgm:styleLbl>
+  <dgm:styleLbl name="fgImgPlace1">
+    <dgm:scene3d>
+      <a:camera prst="orthographicFront"/>
+      <a:lightRig rig="threePt" dir="t"/>
+    </dgm:scene3d>
+    <dgm:sp3d/>
+    <dgm:txPr/>
+    <dgm:style>
+      <a:lnRef idx="2">
+        <a:scrgbClr r="0" g="0" b="0"/>
+      </a:lnRef>
+      <a:fillRef idx="1">
+        <a:scrgbClr r="0" g="0" b="0"/>
+      </a:fillRef>
+      <a:effectRef idx="0">
+        <a:scrgbClr r="0" g="0" b="0"/>
+      </a:effectRef>
+      <a:fontRef idx="minor"/>
+    </dgm:style>
+  </dgm:styleLbl>
+  <dgm:styleLbl name="alignImgPlace1">
+    <dgm:scene3d>
+      <a:camera prst="orthographicFront"/>
+      <a:lightRig rig="threePt" dir="t"/>
+    </dgm:scene3d>
+    <dgm:sp3d/>
+    <dgm:txPr/>
+    <dgm:style>
+      <a:lnRef idx="2">
+        <a:scrgbClr r="0" g="0" b="0"/>
+      </a:lnRef>
+      <a:fillRef idx="1">
+        <a:scrgbClr r="0" g="0" b="0"/>
+      </a:fillRef>
+      <a:effectRef idx="0">
+        <a:scrgbClr r="0" g="0" b="0"/>
+      </a:effectRef>
+      <a:fontRef idx="minor"/>
+    </dgm:style>
+  </dgm:styleLbl>
+  <dgm:styleLbl name="bgImgPlace1">
+    <dgm:scene3d>
+      <a:camera prst="orthographicFront"/>
+      <a:lightRig rig="threePt" dir="t"/>
+    </dgm:scene3d>
+    <dgm:sp3d/>
+    <dgm:txPr/>
+    <dgm:style>
+      <a:lnRef idx="2">
+        <a:scrgbClr r="0" g="0" b="0"/>
+      </a:lnRef>
+      <a:fillRef idx="1">
+        <a:scrgbClr r="0" g="0" b="0"/>
+      </a:fillRef>
+      <a:effectRef idx="0">
+        <a:scrgbClr r="0" g="0" b="0"/>
+      </a:effectRef>
+      <a:fontRef idx="minor"/>
+    </dgm:style>
+  </dgm:styleLbl>
+  <dgm:styleLbl name="sibTrans2D1">
+    <dgm:scene3d>
+      <a:camera prst="orthographicFront"/>
+      <a:lightRig rig="threePt" dir="t"/>
+    </dgm:scene3d>
+    <dgm:sp3d/>
+    <dgm:txPr/>
+    <dgm:style>
+      <a:lnRef idx="0">
+        <a:scrgbClr r="0" g="0" b="0"/>
+      </a:lnRef>
+      <a:fillRef idx="1">
+        <a:scrgbClr r="0" g="0" b="0"/>
+      </a:fillRef>
+      <a:effectRef idx="0">
+        <a:scrgbClr r="0" g="0" b="0"/>
+      </a:effectRef>
+      <a:fontRef idx="minor">
+        <a:schemeClr val="lt1"/>
+      </a:fontRef>
+    </dgm:style>
+  </dgm:styleLbl>
+  <dgm:styleLbl name="fgSibTrans2D1">
+    <dgm:scene3d>
+      <a:camera prst="orthographicFront"/>
+      <a:lightRig rig="threePt" dir="t"/>
+    </dgm:scene3d>
+    <dgm:sp3d/>
+    <dgm:txPr/>
+    <dgm:style>
+      <a:lnRef idx="0">
+        <a:scrgbClr r="0" g="0" b="0"/>
+      </a:lnRef>
+      <a:fillRef idx="1">
+        <a:scrgbClr r="0" g="0" b="0"/>
+      </a:fillRef>
+      <a:effectRef idx="0">
+        <a:scrgbClr r="0" g="0" b="0"/>
+      </a:effectRef>
+      <a:fontRef idx="minor">
+        <a:schemeClr val="lt1"/>
+      </a:fontRef>
+    </dgm:style>
+  </dgm:styleLbl>
+  <dgm:styleLbl name="bgSibTrans2D1">
+    <dgm:scene3d>
+      <a:camera prst="orthographicFront"/>
+      <a:lightRig rig="threePt" dir="t"/>
+    </dgm:scene3d>
+    <dgm:sp3d/>
+    <dgm:txPr/>
+    <dgm:style>
+      <a:lnRef idx="0">
+        <a:scrgbClr r="0" g="0" b="0"/>
+      </a:lnRef>
+      <a:fillRef idx="1">
+        <a:scrgbClr r="0" g="0" b="0"/>
+      </a:fillRef>
+      <a:effectRef idx="0">
+        <a:scrgbClr r="0" g="0" b="0"/>
+      </a:effectRef>
+      <a:fontRef idx="minor">
+        <a:schemeClr val="lt1"/>
+      </a:fontRef>
+    </dgm:style>
+  </dgm:styleLbl>
+  <dgm:styleLbl name="sibTrans1D1">
+    <dgm:scene3d>
+      <a:camera prst="orthographicFront"/>
+      <a:lightRig rig="threePt" dir="t"/>
+    </dgm:scene3d>
+    <dgm:sp3d/>
+    <dgm:txPr/>
+    <dgm:style>
+      <a:lnRef idx="1">
+        <a:scrgbClr r="0" g="0" b="0"/>
+      </a:lnRef>
+      <a:fillRef idx="0">
+        <a:scrgbClr r="0" g="0" b="0"/>
+      </a:fillRef>
+      <a:effectRef idx="0">
+        <a:scrgbClr r="0" g="0" b="0"/>
+      </a:effectRef>
+      <a:fontRef idx="minor"/>
+    </dgm:style>
+  </dgm:styleLbl>
+  <dgm:styleLbl name="callout">
+    <dgm:scene3d>
+      <a:camera prst="orthographicFront"/>
+      <a:lightRig rig="threePt" dir="t"/>
+    </dgm:scene3d>
+    <dgm:sp3d/>
+    <dgm:txPr/>
+    <dgm:style>
+      <a:lnRef idx="2">
+        <a:scrgbClr r="0" g="0" b="0"/>
+      </a:lnRef>
+      <a:fillRef idx="1">
+        <a:scrgbClr r="0" g="0" b="0"/>
+      </a:fillRef>
+      <a:effectRef idx="0">
+        <a:scrgbClr r="0" g="0" b="0"/>
+      </a:effectRef>
+      <a:fontRef idx="minor"/>
+    </dgm:style>
+  </dgm:styleLbl>
+  <dgm:styleLbl name="asst0">
+    <dgm:scene3d>
+      <a:camera prst="orthographicFront"/>
+      <a:lightRig rig="threePt" dir="t"/>
+    </dgm:scene3d>
+    <dgm:sp3d/>
+    <dgm:txPr/>
+    <dgm:style>
+      <a:lnRef idx="2">
+        <a:scrgbClr r="0" g="0" b="0"/>
+      </a:lnRef>
+      <a:fillRef idx="1">
+        <a:scrgbClr r="0" g="0" b="0"/>
+      </a:fillRef>
+      <a:effectRef idx="0">
+        <a:scrgbClr r="0" g="0" b="0"/>
+      </a:effectRef>
+      <a:fontRef idx="minor">
+        <a:schemeClr val="lt1"/>
+      </a:fontRef>
+    </dgm:style>
+  </dgm:styleLbl>
+  <dgm:styleLbl name="asst1">
+    <dgm:scene3d>
+      <a:camera prst="orthographicFront"/>
+      <a:lightRig rig="threePt" dir="t"/>
+    </dgm:scene3d>
+    <dgm:sp3d/>
+    <dgm:txPr/>
+    <dgm:style>
+      <a:lnRef idx="2">
+        <a:scrgbClr r="0" g="0" b="0"/>
+      </a:lnRef>
+      <a:fillRef idx="1">
+        <a:scrgbClr r="0" g="0" b="0"/>
+      </a:fillRef>
+      <a:effectRef idx="0">
+        <a:scrgbClr r="0" g="0" b="0"/>
+      </a:effectRef>
+      <a:fontRef idx="minor">
+        <a:schemeClr val="lt1"/>
+      </a:fontRef>
+    </dgm:style>
+  </dgm:styleLbl>
+  <dgm:styleLbl name="asst2">
+    <dgm:scene3d>
+      <a:camera prst="orthographicFront"/>
+      <a:lightRig rig="threePt" dir="t"/>
+    </dgm:scene3d>
+    <dgm:sp3d/>
+    <dgm:txPr/>
+    <dgm:style>
+      <a:lnRef idx="2">
+        <a:scrgbClr r="0" g="0" b="0"/>
+      </a:lnRef>
+      <a:fillRef idx="1">
+        <a:scrgbClr r="0" g="0" b="0"/>
+      </a:fillRef>
+      <a:effectRef idx="0">
+        <a:scrgbClr r="0" g="0" b="0"/>
+      </a:effectRef>
+      <a:fontRef idx="minor">
+        <a:schemeClr val="lt1"/>
+      </a:fontRef>
+    </dgm:style>
+  </dgm:styleLbl>
+  <dgm:styleLbl name="asst3">
+    <dgm:scene3d>
+      <a:camera prst="orthographicFront"/>
+      <a:lightRig rig="threePt" dir="t"/>
+    </dgm:scene3d>
+    <dgm:sp3d/>
+    <dgm:txPr/>
+    <dgm:style>
+      <a:lnRef idx="2">
+        <a:scrgbClr r="0" g="0" b="0"/>
+      </a:lnRef>
+      <a:fillRef idx="1">
+        <a:scrgbClr r="0" g="0" b="0"/>
+      </a:fillRef>
+      <a:effectRef idx="0">
+        <a:scrgbClr r="0" g="0" b="0"/>
+      </a:effectRef>
+      <a:fontRef idx="minor">
+        <a:schemeClr val="lt1"/>
+      </a:fontRef>
+    </dgm:style>
+  </dgm:styleLbl>
+  <dgm:styleLbl name="asst4">
+    <dgm:scene3d>
+      <a:camera prst="orthographicFront"/>
+      <a:lightRig rig="threePt" dir="t"/>
+    </dgm:scene3d>
+    <dgm:sp3d/>
+    <dgm:txPr/>
+    <dgm:style>
+      <a:lnRef idx="2">
+        <a:scrgbClr r="0" g="0" b="0"/>
+      </a:lnRef>
+      <a:fillRef idx="1">
+        <a:scrgbClr r="0" g="0" b="0"/>
+      </a:fillRef>
+      <a:effectRef idx="0">
+        <a:scrgbClr r="0" g="0" b="0"/>
+      </a:effectRef>
+      <a:fontRef idx="minor">
+        <a:schemeClr val="lt1"/>
+      </a:fontRef>
+    </dgm:style>
+  </dgm:styleLbl>
+  <dgm:styleLbl name="parChTrans2D1">
+    <dgm:scene3d>
+      <a:camera prst="orthographicFront"/>
+      <a:lightRig rig="threePt" dir="t"/>
+    </dgm:scene3d>
+    <dgm:sp3d/>
+    <dgm:txPr/>
+    <dgm:style>
+      <a:lnRef idx="2">
+        <a:scrgbClr r="0" g="0" b="0"/>
+      </a:lnRef>
+      <a:fillRef idx="1">
+        <a:scrgbClr r="0" g="0" b="0"/>
+      </a:fillRef>
+      <a:effectRef idx="0">
+        <a:scrgbClr r="0" g="0" b="0"/>
+      </a:effectRef>
+      <a:fontRef idx="minor">
+        <a:schemeClr val="lt1"/>
+      </a:fontRef>
+    </dgm:style>
+  </dgm:styleLbl>
+  <dgm:styleLbl name="parChTrans2D2">
+    <dgm:scene3d>
+      <a:camera prst="orthographicFront"/>
+      <a:lightRig rig="threePt" dir="t"/>
+    </dgm:scene3d>
+    <dgm:sp3d/>
+    <dgm:txPr/>
+    <dgm:style>
+      <a:lnRef idx="2">
+        <a:scrgbClr r="0" g="0" b="0"/>
+      </a:lnRef>
+      <a:fillRef idx="1">
+        <a:scrgbClr r="0" g="0" b="0"/>
+      </a:fillRef>
+      <a:effectRef idx="0">
+        <a:scrgbClr r="0" g="0" b="0"/>
+      </a:effectRef>
+      <a:fontRef idx="minor">
+        <a:schemeClr val="lt1"/>
+      </a:fontRef>
+    </dgm:style>
+  </dgm:styleLbl>
+  <dgm:styleLbl name="parChTrans2D3">
+    <dgm:scene3d>
+      <a:camera prst="orthographicFront"/>
+      <a:lightRig rig="threePt" dir="t"/>
+    </dgm:scene3d>
+    <dgm:sp3d/>
+    <dgm:txPr/>
+    <dgm:style>
+      <a:lnRef idx="2">
+        <a:scrgbClr r="0" g="0" b="0"/>
+      </a:lnRef>
+      <a:fillRef idx="1">
+        <a:scrgbClr r="0" g="0" b="0"/>
+      </a:fillRef>
+      <a:effectRef idx="0">
+        <a:scrgbClr r="0" g="0" b="0"/>
+      </a:effectRef>
+      <a:fontRef idx="minor">
+        <a:schemeClr val="lt1"/>
+      </a:fontRef>
+    </dgm:style>
+  </dgm:styleLbl>
+  <dgm:styleLbl name="parChTrans2D4">
+    <dgm:scene3d>
+      <a:camera prst="orthographicFront"/>
+      <a:lightRig rig="threePt" dir="t"/>
+    </dgm:scene3d>
+    <dgm:sp3d/>
+    <dgm:txPr/>
+    <dgm:style>
+      <a:lnRef idx="2">
+        <a:scrgbClr r="0" g="0" b="0"/>
+      </a:lnRef>
+      <a:fillRef idx="1">
+        <a:scrgbClr r="0" g="0" b="0"/>
+      </a:fillRef>
+      <a:effectRef idx="0">
+        <a:scrgbClr r="0" g="0" b="0"/>
+      </a:effectRef>
+      <a:fontRef idx="minor">
+        <a:schemeClr val="lt1"/>
+      </a:fontRef>
+    </dgm:style>
+  </dgm:styleLbl>
+  <dgm:styleLbl name="parChTrans1D1">
+    <dgm:scene3d>
+      <a:camera prst="orthographicFront"/>
+      <a:lightRig rig="threePt" dir="t"/>
+    </dgm:scene3d>
+    <dgm:sp3d/>
+    <dgm:txPr/>
+    <dgm:style>
+      <a:lnRef idx="2">
+        <a:scrgbClr r="0" g="0" b="0"/>
+      </a:lnRef>
+      <a:fillRef idx="0">
+        <a:scrgbClr r="0" g="0" b="0"/>
+      </a:fillRef>
+      <a:effectRef idx="0">
+        <a:scrgbClr r="0" g="0" b="0"/>
+      </a:effectRef>
+      <a:fontRef idx="minor"/>
+    </dgm:style>
+  </dgm:styleLbl>
+  <dgm:styleLbl name="parChTrans1D2">
+    <dgm:scene3d>
+      <a:camera prst="orthographicFront"/>
+      <a:lightRig rig="threePt" dir="t"/>
+    </dgm:scene3d>
+    <dgm:sp3d/>
+    <dgm:txPr/>
+    <dgm:style>
+      <a:lnRef idx="2">
+        <a:scrgbClr r="0" g="0" b="0"/>
+      </a:lnRef>
+      <a:fillRef idx="0">
+        <a:scrgbClr r="0" g="0" b="0"/>
+      </a:fillRef>
+      <a:effectRef idx="0">
+        <a:scrgbClr r="0" g="0" b="0"/>
+      </a:effectRef>
+      <a:fontRef idx="minor"/>
+    </dgm:style>
+  </dgm:styleLbl>
+  <dgm:styleLbl name="parChTrans1D3">
+    <dgm:scene3d>
+      <a:camera prst="orthographicFront"/>
+      <a:lightRig rig="threePt" dir="t"/>
+    </dgm:scene3d>
+    <dgm:sp3d/>
+    <dgm:txPr/>
+    <dgm:style>
+      <a:lnRef idx="2">
+        <a:scrgbClr r="0" g="0" b="0"/>
+      </a:lnRef>
+      <a:fillRef idx="0">
+        <a:scrgbClr r="0" g="0" b="0"/>
+      </a:fillRef>
+      <a:effectRef idx="0">
+        <a:scrgbClr r="0" g="0" b="0"/>
+      </a:effectRef>
+      <a:fontRef idx="minor"/>
+    </dgm:style>
+  </dgm:styleLbl>
+  <dgm:styleLbl name="parChTrans1D4">
+    <dgm:scene3d>
+      <a:camera prst="orthographicFront"/>
+      <a:lightRig rig="threePt" dir="t"/>
+    </dgm:scene3d>
+    <dgm:sp3d/>
+    <dgm:txPr/>
+    <dgm:style>
+      <a:lnRef idx="2">
+        <a:scrgbClr r="0" g="0" b="0"/>
+      </a:lnRef>
+      <a:fillRef idx="0">
+        <a:scrgbClr r="0" g="0" b="0"/>
+      </a:fillRef>
+      <a:effectRef idx="0">
+        <a:scrgbClr r="0" g="0" b="0"/>
+      </a:effectRef>
+      <a:fontRef idx="minor"/>
+    </dgm:style>
+  </dgm:styleLbl>
+  <dgm:styleLbl name="fgAcc1">
+    <dgm:scene3d>
+      <a:camera prst="orthographicFront"/>
+      <a:lightRig rig="threePt" dir="t"/>
+    </dgm:scene3d>
+    <dgm:sp3d/>
+    <dgm:txPr/>
+    <dgm:style>
+      <a:lnRef idx="2">
+        <a:scrgbClr r="0" g="0" b="0"/>
+      </a:lnRef>
+      <a:fillRef idx="1">
+        <a:scrgbClr r="0" g="0" b="0"/>
+      </a:fillRef>
+      <a:effectRef idx="0">
+        <a:scrgbClr r="0" g="0" b="0"/>
+      </a:effectRef>
+      <a:fontRef idx="minor"/>
+    </dgm:style>
+  </dgm:styleLbl>
+  <dgm:styleLbl name="conFgAcc1">
+    <dgm:scene3d>
+      <a:camera prst="orthographicFront"/>
+      <a:lightRig rig="threePt" dir="t"/>
+    </dgm:scene3d>
+    <dgm:sp3d/>
+    <dgm:txPr/>
+    <dgm:style>
+      <a:lnRef idx="2">
+        <a:scrgbClr r="0" g="0" b="0"/>
+      </a:lnRef>
+      <a:fillRef idx="1">
+        <a:scrgbClr r="0" g="0" b="0"/>
+      </a:fillRef>
+      <a:effectRef idx="0">
+        <a:scrgbClr r="0" g="0" b="0"/>
+      </a:effectRef>
+      <a:fontRef idx="minor"/>
+    </dgm:style>
+  </dgm:styleLbl>
+  <dgm:styleLbl name="alignAcc1">
+    <dgm:scene3d>
+      <a:camera prst="orthographicFront"/>
+      <a:lightRig rig="threePt" dir="t"/>
+    </dgm:scene3d>
+    <dgm:sp3d/>
+    <dgm:txPr/>
+    <dgm:style>
+      <a:lnRef idx="2">
+        <a:scrgbClr r="0" g="0" b="0"/>
+      </a:lnRef>
+      <a:fillRef idx="1">
+        <a:scrgbClr r="0" g="0" b="0"/>
+      </a:fillRef>
+      <a:effectRef idx="0">
+        <a:scrgbClr r="0" g="0" b="0"/>
+      </a:effectRef>
+      <a:fontRef idx="minor"/>
+    </dgm:style>
+  </dgm:styleLbl>
+  <dgm:styleLbl name="trAlignAcc1">
+    <dgm:scene3d>
+      <a:camera prst="orthographicFront"/>
+      <a:lightRig rig="threePt" dir="t"/>
+    </dgm:scene3d>
+    <dgm:sp3d/>
+    <dgm:txPr/>
+    <dgm:style>
+      <a:lnRef idx="1">
+        <a:scrgbClr r="0" g="0" b="0"/>
+      </a:lnRef>
+      <a:fillRef idx="1">
+        <a:scrgbClr r="0" g="0" b="0"/>
+      </a:fillRef>
+      <a:effectRef idx="0">
+        <a:scrgbClr r="0" g="0" b="0"/>
+      </a:effectRef>
+      <a:fontRef idx="minor"/>
+    </dgm:style>
+  </dgm:styleLbl>
+  <dgm:styleLbl name="bgAcc1">
+    <dgm:scene3d>
+      <a:camera prst="orthographicFront"/>
+      <a:lightRig rig="threePt" dir="t"/>
+    </dgm:scene3d>
+    <dgm:sp3d/>
+    <dgm:txPr/>
+    <dgm:style>
+      <a:lnRef idx="2">
+        <a:scrgbClr r="0" g="0" b="0"/>
+      </a:lnRef>
+      <a:fillRef idx="1">
+        <a:scrgbClr r="0" g="0" b="0"/>
+      </a:fillRef>
+      <a:effectRef idx="0">
+        <a:scrgbClr r="0" g="0" b="0"/>
+      </a:effectRef>
+      <a:fontRef idx="minor"/>
+    </dgm:style>
+  </dgm:styleLbl>
+  <dgm:styleLbl name="solidFgAcc1">
+    <dgm:scene3d>
+      <a:camera prst="orthographicFront"/>
+      <a:lightRig rig="threePt" dir="t"/>
+    </dgm:scene3d>
+    <dgm:sp3d/>
+    <dgm:txPr/>
+    <dgm:style>
+      <a:lnRef idx="2">
+        <a:scrgbClr r="0" g="0" b="0"/>
+      </a:lnRef>
+      <a:fillRef idx="1">
+        <a:scrgbClr r="0" g="0" b="0"/>
+      </a:fillRef>
+      <a:effectRef idx="0">
+        <a:scrgbClr r="0" g="0" b="0"/>
+      </a:effectRef>
+      <a:fontRef idx="minor"/>
+    </dgm:style>
+  </dgm:styleLbl>
+  <dgm:styleLbl name="solidAlignAcc1">
+    <dgm:scene3d>
+      <a:camera prst="orthographicFront"/>
+      <a:lightRig rig="threePt" dir="t"/>
+    </dgm:scene3d>
+    <dgm:sp3d/>
+    <dgm:txPr/>
+    <dgm:style>
+      <a:lnRef idx="2">
+        <a:scrgbClr r="0" g="0" b="0"/>
+      </a:lnRef>
+      <a:fillRef idx="1">
+        <a:scrgbClr r="0" g="0" b="0"/>
+      </a:fillRef>
+      <a:effectRef idx="0">
+        <a:scrgbClr r="0" g="0" b="0"/>
+      </a:effectRef>
+      <a:fontRef idx="minor"/>
+    </dgm:style>
+  </dgm:styleLbl>
+  <dgm:styleLbl name="solidBgAcc1">
+    <dgm:scene3d>
+      <a:camera prst="orthographicFront"/>
+      <a:lightRig rig="threePt" dir="t"/>
+    </dgm:scene3d>
+    <dgm:sp3d/>
+    <dgm:txPr/>
+    <dgm:style>
+      <a:lnRef idx="2">
+        <a:scrgbClr r="0" g="0" b="0"/>
+      </a:lnRef>
+      <a:fillRef idx="1">
+        <a:scrgbClr r="0" g="0" b="0"/>
+      </a:fillRef>
+      <a:effectRef idx="0">
+        <a:scrgbClr r="0" g="0" b="0"/>
+      </a:effectRef>
+      <a:fontRef idx="minor"/>
+    </dgm:style>
+  </dgm:styleLbl>
+  <dgm:styleLbl name="fgAccFollowNode1">
+    <dgm:scene3d>
+      <a:camera prst="orthographicFront"/>
+      <a:lightRig rig="threePt" dir="t"/>
+    </dgm:scene3d>
+    <dgm:sp3d/>
+    <dgm:txPr/>
+    <dgm:style>
+      <a:lnRef idx="2">
+        <a:scrgbClr r="0" g="0" b="0"/>
+      </a:lnRef>
+      <a:fillRef idx="1">
+        <a:scrgbClr r="0" g="0" b="0"/>
+      </a:fillRef>
+      <a:effectRef idx="0">
+        <a:scrgbClr r="0" g="0" b="0"/>
+      </a:effectRef>
+      <a:fontRef idx="minor"/>
+    </dgm:style>
+  </dgm:styleLbl>
+  <dgm:styleLbl name="alignAccFollowNode1">
+    <dgm:scene3d>
+      <a:camera prst="orthographicFront"/>
+      <a:lightRig rig="threePt" dir="t"/>
+    </dgm:scene3d>
+    <dgm:sp3d/>
+    <dgm:txPr/>
+    <dgm:style>
+      <a:lnRef idx="2">
+        <a:scrgbClr r="0" g="0" b="0"/>
+      </a:lnRef>
+      <a:fillRef idx="1">
+        <a:scrgbClr r="0" g="0" b="0"/>
+      </a:fillRef>
+      <a:effectRef idx="0">
+        <a:scrgbClr r="0" g="0" b="0"/>
+      </a:effectRef>
+      <a:fontRef idx="minor"/>
+    </dgm:style>
+  </dgm:styleLbl>
+  <dgm:styleLbl name="bgAccFollowNode1">
+    <dgm:scene3d>
+      <a:camera prst="orthographicFront"/>
+      <a:lightRig rig="threePt" dir="t"/>
+    </dgm:scene3d>
+    <dgm:sp3d/>
+    <dgm:txPr/>
+    <dgm:style>
+      <a:lnRef idx="2">
+        <a:scrgbClr r="0" g="0" b="0"/>
+      </a:lnRef>
+      <a:fillRef idx="1">
+        <a:scrgbClr r="0" g="0" b="0"/>
+      </a:fillRef>
+      <a:effectRef idx="0">
+        <a:scrgbClr r="0" g="0" b="0"/>
+      </a:effectRef>
+      <a:fontRef idx="minor"/>
+    </dgm:style>
+  </dgm:styleLbl>
+  <dgm:styleLbl name="fgAcc0">
+    <dgm:scene3d>
+      <a:camera prst="orthographicFront"/>
+      <a:lightRig rig="threePt" dir="t"/>
+    </dgm:scene3d>
+    <dgm:sp3d/>
+    <dgm:txPr/>
+    <dgm:style>
+      <a:lnRef idx="2">
+        <a:scrgbClr r="0" g="0" b="0"/>
+      </a:lnRef>
+      <a:fillRef idx="1">
+        <a:scrgbClr r="0" g="0" b="0"/>
+      </a:fillRef>
+      <a:effectRef idx="0">
+        <a:scrgbClr r="0" g="0" b="0"/>
+      </a:effectRef>
+      <a:fontRef idx="minor"/>
+    </dgm:style>
+  </dgm:styleLbl>
+  <dgm:styleLbl name="fgAcc2">
+    <dgm:scene3d>
+      <a:camera prst="orthographicFront"/>
+      <a:lightRig rig="threePt" dir="t"/>
+    </dgm:scene3d>
+    <dgm:sp3d/>
+    <dgm:txPr/>
+    <dgm:style>
+      <a:lnRef idx="2">
+        <a:scrgbClr r="0" g="0" b="0"/>
+      </a:lnRef>
+      <a:fillRef idx="1">
+        <a:scrgbClr r="0" g="0" b="0"/>
+      </a:fillRef>
+      <a:effectRef idx="0">
+        <a:scrgbClr r="0" g="0" b="0"/>
+      </a:effectRef>
+      <a:fontRef idx="minor"/>
+    </dgm:style>
+  </dgm:styleLbl>
+  <dgm:styleLbl name="fgAcc3">
+    <dgm:scene3d>
+      <a:camera prst="orthographicFront"/>
+      <a:lightRig rig="threePt" dir="t"/>
+    </dgm:scene3d>
+    <dgm:sp3d/>
+    <dgm:txPr/>
+    <dgm:style>
+      <a:lnRef idx="2">
+        <a:scrgbClr r="0" g="0" b="0"/>
+      </a:lnRef>
+      <a:fillRef idx="1">
+        <a:scrgbClr r="0" g="0" b="0"/>
+      </a:fillRef>
+      <a:effectRef idx="0">
+        <a:scrgbClr r="0" g="0" b="0"/>
+      </a:effectRef>
+      <a:fontRef idx="minor"/>
+    </dgm:style>
+  </dgm:styleLbl>
+  <dgm:styleLbl name="fgAcc4">
+    <dgm:scene3d>
+      <a:camera prst="orthographicFront"/>
+      <a:lightRig rig="threePt" dir="t"/>
+    </dgm:scene3d>
+    <dgm:sp3d/>
+    <dgm:txPr/>
+    <dgm:style>
+      <a:lnRef idx="2">
+        <a:scrgbClr r="0" g="0" b="0"/>
+      </a:lnRef>
+      <a:fillRef idx="1">
+        <a:scrgbClr r="0" g="0" b="0"/>
+      </a:fillRef>
+      <a:effectRef idx="0">
+        <a:scrgbClr r="0" g="0" b="0"/>
+      </a:effectRef>
+      <a:fontRef idx="minor"/>
+    </dgm:style>
+  </dgm:styleLbl>
+  <dgm:styleLbl name="bgShp">
+    <dgm:scene3d>
+      <a:camera prst="orthographicFront"/>
+      <a:lightRig rig="threePt" dir="t"/>
+    </dgm:scene3d>
+    <dgm:sp3d/>
+    <dgm:txPr/>
+    <dgm:style>
+      <a:lnRef idx="0">
+        <a:scrgbClr r="0" g="0" b="0"/>
+      </a:lnRef>
+      <a:fillRef idx="1">
+        <a:scrgbClr r="0" g="0" b="0"/>
+      </a:fillRef>
+      <a:effectRef idx="0">
+        <a:scrgbClr r="0" g="0" b="0"/>
+      </a:effectRef>
+      <a:fontRef idx="minor"/>
+    </dgm:style>
+  </dgm:styleLbl>
+  <dgm:styleLbl name="dkBgShp">
+    <dgm:scene3d>
+      <a:camera prst="orthographicFront"/>
+      <a:lightRig rig="threePt" dir="t"/>
+    </dgm:scene3d>
+    <dgm:sp3d/>
+    <dgm:txPr/>
+    <dgm:style>
+      <a:lnRef idx="0">
+        <a:scrgbClr r="0" g="0" b="0"/>
+      </a:lnRef>
+      <a:fillRef idx="1">
+        <a:scrgbClr r="0" g="0" b="0"/>
+      </a:fillRef>
+      <a:effectRef idx="0">
+        <a:scrgbClr r="0" g="0" b="0"/>
+      </a:effectRef>
+      <a:fontRef idx="minor"/>
+    </dgm:style>
+  </dgm:styleLbl>
+  <dgm:styleLbl name="trBgShp">
+    <dgm:scene3d>
+      <a:camera prst="orthographicFront"/>
+      <a:lightRig rig="threePt" dir="t"/>
+    </dgm:scene3d>
+    <dgm:sp3d/>
+    <dgm:txPr/>
+    <dgm:style>
+      <a:lnRef idx="0">
+        <a:scrgbClr r="0" g="0" b="0"/>
+      </a:lnRef>
+      <a:fillRef idx="1">
+        <a:scrgbClr r="0" g="0" b="0"/>
+      </a:fillRef>
+      <a:effectRef idx="0">
+        <a:scrgbClr r="0" g="0" b="0"/>
+      </a:effectRef>
+      <a:fontRef idx="minor"/>
+    </dgm:style>
+  </dgm:styleLbl>
+  <dgm:styleLbl name="fgShp">
+    <dgm:scene3d>
+      <a:camera prst="orthographicFront"/>
+      <a:lightRig rig="threePt" dir="t"/>
+    </dgm:scene3d>
+    <dgm:sp3d/>
+    <dgm:txPr/>
+    <dgm:style>
+      <a:lnRef idx="2">
+        <a:scrgbClr r="0" g="0" b="0"/>
+      </a:lnRef>
+      <a:fillRef idx="1">
+        <a:scrgbClr r="0" g="0" b="0"/>
+      </a:fillRef>
+      <a:effectRef idx="0">
+        <a:scrgbClr r="0" g="0" b="0"/>
+      </a:effectRef>
+      <a:fontRef idx="minor"/>
+    </dgm:style>
+  </dgm:styleLbl>
+  <dgm:styleLbl name="revTx">
+    <dgm:scene3d>
+      <a:camera prst="orthographicFront"/>
+      <a:lightRig rig="threePt" dir="t"/>
+    </dgm:scene3d>
+    <dgm:sp3d/>
+    <dgm:txPr/>
+    <dgm:style>
+      <a:lnRef idx="0">
+        <a:scrgbClr r="0" g="0" b="0"/>
+      </a:lnRef>
+      <a:fillRef idx="0">
+        <a:scrgbClr r="0" g="0" b="0"/>
+      </a:fillRef>
+      <a:effectRef idx="0">
+        <a:scrgbClr r="0" g="0" b="0"/>
+      </a:effectRef>
+      <a:fontRef idx="minor"/>
+    </dgm:style>
+  </dgm:styleLbl>
+</dgm:styleDef>
+</file>
+
+<file path=ppt/diagrams/quickStyle2.xml><?xml version="1.0" encoding="utf-8"?>
 <dgm:styleDef xmlns:dgm="http://schemas.openxmlformats.org/drawingml/2006/diagram" xmlns:a="http://schemas.openxmlformats.org/drawingml/2006/main" uniqueId="urn:microsoft.com/office/officeart/2005/8/quickstyle/simple1">
   <dgm:title val=""/>
   <dgm:desc val=""/>
@@ -9365,6 +12151,1770 @@
 </p:sld>
 </file>
 
+<file path=ppt/slides/slide5.xml><?xml version="1.0" encoding="utf-8"?>
+<p:sld xmlns:a="http://schemas.openxmlformats.org/drawingml/2006/main" xmlns:r="http://schemas.openxmlformats.org/officeDocument/2006/relationships" xmlns:p="http://schemas.openxmlformats.org/presentationml/2006/main">
+  <p:cSld>
+    <p:spTree>
+      <p:nvGrpSpPr>
+        <p:cNvPr id="1" name=""/>
+        <p:cNvGrpSpPr/>
+        <p:nvPr/>
+      </p:nvGrpSpPr>
+      <p:grpSpPr>
+        <a:xfrm>
+          <a:off x="0" y="0"/>
+          <a:ext cx="0" cy="0"/>
+          <a:chOff x="0" y="0"/>
+          <a:chExt cx="0" cy="0"/>
+        </a:xfrm>
+      </p:grpSpPr>
+      <p:sp>
+        <p:nvSpPr>
+          <p:cNvPr id="3" name="Content Placeholder 2">
+            <a:extLst>
+              <a:ext uri="{FF2B5EF4-FFF2-40B4-BE49-F238E27FC236}">
+                <a16:creationId xmlns:a16="http://schemas.microsoft.com/office/drawing/2014/main" id="{CC05E816-907F-9163-9766-B78C31141410}"/>
+              </a:ext>
+            </a:extLst>
+          </p:cNvPr>
+          <p:cNvSpPr>
+            <a:spLocks noGrp="1"/>
+          </p:cNvSpPr>
+          <p:nvPr>
+            <p:ph idx="1"/>
+          </p:nvPr>
+        </p:nvSpPr>
+        <p:spPr/>
+        <p:txBody>
+          <a:bodyPr/>
+          <a:lstStyle/>
+          <a:p>
+            <a:endParaRPr lang="en-US"/>
+          </a:p>
+        </p:txBody>
+      </p:sp>
+      <p:pic>
+        <p:nvPicPr>
+          <p:cNvPr id="1026" name="Picture 2">
+            <a:extLst>
+              <a:ext uri="{FF2B5EF4-FFF2-40B4-BE49-F238E27FC236}">
+                <a16:creationId xmlns:a16="http://schemas.microsoft.com/office/drawing/2014/main" id="{9BEC061C-E826-B7E2-A178-DCFE4F8D83A8}"/>
+              </a:ext>
+            </a:extLst>
+          </p:cNvPr>
+          <p:cNvPicPr>
+            <a:picLocks noChangeAspect="1" noChangeArrowheads="1"/>
+          </p:cNvPicPr>
+          <p:nvPr/>
+        </p:nvPicPr>
+        <p:blipFill>
+          <a:blip r:embed="rId2">
+            <a:extLst>
+              <a:ext uri="{28A0092B-C50C-407E-A947-70E740481C1C}">
+                <a14:useLocalDpi xmlns:a14="http://schemas.microsoft.com/office/drawing/2010/main" val="0"/>
+              </a:ext>
+            </a:extLst>
+          </a:blip>
+          <a:srcRect/>
+          <a:stretch>
+            <a:fillRect/>
+          </a:stretch>
+        </p:blipFill>
+        <p:spPr bwMode="auto">
+          <a:xfrm>
+            <a:off x="742800" y="836043"/>
+            <a:ext cx="10706400" cy="5185913"/>
+          </a:xfrm>
+          <a:prstGeom prst="rect">
+            <a:avLst/>
+          </a:prstGeom>
+          <a:noFill/>
+          <a:extLst>
+            <a:ext uri="{909E8E84-426E-40DD-AFC4-6F175D3DCCD1}">
+              <a14:hiddenFill xmlns:a14="http://schemas.microsoft.com/office/drawing/2010/main">
+                <a:solidFill>
+                  <a:srgbClr val="FFFFFF"/>
+                </a:solidFill>
+              </a14:hiddenFill>
+            </a:ext>
+          </a:extLst>
+        </p:spPr>
+      </p:pic>
+    </p:spTree>
+    <p:extLst>
+      <p:ext uri="{BB962C8B-B14F-4D97-AF65-F5344CB8AC3E}">
+        <p14:creationId xmlns:p14="http://schemas.microsoft.com/office/powerpoint/2010/main" val="2687146659"/>
+      </p:ext>
+    </p:extLst>
+  </p:cSld>
+  <p:clrMapOvr>
+    <a:masterClrMapping/>
+  </p:clrMapOvr>
+</p:sld>
+</file>
+
+<file path=ppt/slides/slide6.xml><?xml version="1.0" encoding="utf-8"?>
+<p:sld xmlns:a="http://schemas.openxmlformats.org/drawingml/2006/main" xmlns:r="http://schemas.openxmlformats.org/officeDocument/2006/relationships" xmlns:p="http://schemas.openxmlformats.org/presentationml/2006/main">
+  <p:cSld>
+    <p:spTree>
+      <p:nvGrpSpPr>
+        <p:cNvPr id="1" name=""/>
+        <p:cNvGrpSpPr/>
+        <p:nvPr/>
+      </p:nvGrpSpPr>
+      <p:grpSpPr>
+        <a:xfrm>
+          <a:off x="0" y="0"/>
+          <a:ext cx="0" cy="0"/>
+          <a:chOff x="0" y="0"/>
+          <a:chExt cx="0" cy="0"/>
+        </a:xfrm>
+      </p:grpSpPr>
+      <p:pic>
+        <p:nvPicPr>
+          <p:cNvPr id="2062" name="Picture 14" descr="Docker, Docker Compose, Docker Swarm, Docker Kubernetes">
+            <a:extLst>
+              <a:ext uri="{FF2B5EF4-FFF2-40B4-BE49-F238E27FC236}">
+                <a16:creationId xmlns:a16="http://schemas.microsoft.com/office/drawing/2014/main" id="{C1930AAD-1B05-92A9-9091-BEDC6AC8C9E2}"/>
+              </a:ext>
+            </a:extLst>
+          </p:cNvPr>
+          <p:cNvPicPr>
+            <a:picLocks noChangeAspect="1" noChangeArrowheads="1"/>
+          </p:cNvPicPr>
+          <p:nvPr/>
+        </p:nvPicPr>
+        <p:blipFill>
+          <a:blip r:embed="rId2">
+            <a:extLst>
+              <a:ext uri="{28A0092B-C50C-407E-A947-70E740481C1C}">
+                <a14:useLocalDpi xmlns:a14="http://schemas.microsoft.com/office/drawing/2010/main" val="0"/>
+              </a:ext>
+            </a:extLst>
+          </a:blip>
+          <a:srcRect/>
+          <a:stretch>
+            <a:fillRect/>
+          </a:stretch>
+        </p:blipFill>
+        <p:spPr bwMode="auto">
+          <a:xfrm>
+            <a:off x="4006432" y="4799240"/>
+            <a:ext cx="6490673" cy="2058760"/>
+          </a:xfrm>
+          <a:prstGeom prst="rect">
+            <a:avLst/>
+          </a:prstGeom>
+          <a:noFill/>
+          <a:extLst>
+            <a:ext uri="{909E8E84-426E-40DD-AFC4-6F175D3DCCD1}">
+              <a14:hiddenFill xmlns:a14="http://schemas.microsoft.com/office/drawing/2010/main">
+                <a:solidFill>
+                  <a:srgbClr val="FFFFFF"/>
+                </a:solidFill>
+              </a14:hiddenFill>
+            </a:ext>
+          </a:extLst>
+        </p:spPr>
+      </p:pic>
+      <p:grpSp>
+        <p:nvGrpSpPr>
+          <p:cNvPr id="9" name="Group 8">
+            <a:extLst>
+              <a:ext uri="{FF2B5EF4-FFF2-40B4-BE49-F238E27FC236}">
+                <a16:creationId xmlns:a16="http://schemas.microsoft.com/office/drawing/2014/main" id="{1B3C1ECD-C3AB-90EB-0DA4-BA9EA8231789}"/>
+              </a:ext>
+            </a:extLst>
+          </p:cNvPr>
+          <p:cNvGrpSpPr/>
+          <p:nvPr/>
+        </p:nvGrpSpPr>
+        <p:grpSpPr>
+          <a:xfrm>
+            <a:off x="4998400" y="2829095"/>
+            <a:ext cx="4116800" cy="2575801"/>
+            <a:chOff x="2838400" y="2270367"/>
+            <a:chExt cx="4116800" cy="2575801"/>
+          </a:xfrm>
+        </p:grpSpPr>
+        <p:pic>
+          <p:nvPicPr>
+            <p:cNvPr id="8" name="Picture 7" descr="A blue and black logo&#10;&#10;Description automatically generated">
+              <a:extLst>
+                <a:ext uri="{FF2B5EF4-FFF2-40B4-BE49-F238E27FC236}">
+                  <a16:creationId xmlns:a16="http://schemas.microsoft.com/office/drawing/2014/main" id="{544CEA87-4A92-01EB-AF4E-46201F6B6816}"/>
+                </a:ext>
+              </a:extLst>
+            </p:cNvPr>
+            <p:cNvPicPr>
+              <a:picLocks noChangeAspect="1"/>
+            </p:cNvPicPr>
+            <p:nvPr/>
+          </p:nvPicPr>
+          <p:blipFill rotWithShape="1">
+            <a:blip r:embed="rId3"/>
+            <a:srcRect r="63297"/>
+            <a:stretch/>
+          </p:blipFill>
+          <p:spPr>
+            <a:xfrm>
+              <a:off x="5091769" y="3042931"/>
+              <a:ext cx="575663" cy="403200"/>
+            </a:xfrm>
+            <a:prstGeom prst="rect">
+              <a:avLst/>
+            </a:prstGeom>
+          </p:spPr>
+        </p:pic>
+        <p:graphicFrame>
+          <p:nvGraphicFramePr>
+            <p:cNvPr id="4" name="Diagram 3">
+              <a:extLst>
+                <a:ext uri="{FF2B5EF4-FFF2-40B4-BE49-F238E27FC236}">
+                  <a16:creationId xmlns:a16="http://schemas.microsoft.com/office/drawing/2014/main" id="{C7643944-D9C1-14B6-6033-F2D5D5E1F084}"/>
+                </a:ext>
+              </a:extLst>
+            </p:cNvPr>
+            <p:cNvGraphicFramePr/>
+            <p:nvPr>
+              <p:extLst>
+                <p:ext uri="{D42A27DB-BD31-4B8C-83A1-F6EECF244321}">
+                  <p14:modId xmlns:p14="http://schemas.microsoft.com/office/powerpoint/2010/main" val="4056921314"/>
+                </p:ext>
+              </p:extLst>
+            </p:nvPr>
+          </p:nvGraphicFramePr>
+          <p:xfrm>
+            <a:off x="2838400" y="2270367"/>
+            <a:ext cx="4116800" cy="2575801"/>
+          </p:xfrm>
+          <a:graphic>
+            <a:graphicData uri="http://schemas.openxmlformats.org/drawingml/2006/diagram">
+              <dgm:relIds xmlns:dgm="http://schemas.openxmlformats.org/drawingml/2006/diagram" xmlns:r="http://schemas.openxmlformats.org/officeDocument/2006/relationships" r:dm="rId4" r:lo="rId5" r:qs="rId6" r:cs="rId7"/>
+            </a:graphicData>
+          </a:graphic>
+        </p:graphicFrame>
+        <p:pic>
+          <p:nvPicPr>
+            <p:cNvPr id="6" name="Picture 5" descr="A blue and black logo&#10;&#10;Description automatically generated">
+              <a:extLst>
+                <a:ext uri="{FF2B5EF4-FFF2-40B4-BE49-F238E27FC236}">
+                  <a16:creationId xmlns:a16="http://schemas.microsoft.com/office/drawing/2014/main" id="{E3888C2F-D3BC-1C4A-3DE8-1A262DD11240}"/>
+                </a:ext>
+              </a:extLst>
+            </p:cNvPr>
+            <p:cNvPicPr>
+              <a:picLocks noChangeAspect="1"/>
+            </p:cNvPicPr>
+            <p:nvPr/>
+          </p:nvPicPr>
+          <p:blipFill rotWithShape="1">
+            <a:blip r:embed="rId3"/>
+            <a:srcRect r="63297"/>
+            <a:stretch/>
+          </p:blipFill>
+          <p:spPr>
+            <a:xfrm>
+              <a:off x="4032001" y="2498164"/>
+              <a:ext cx="532799" cy="373177"/>
+            </a:xfrm>
+            <a:prstGeom prst="rect">
+              <a:avLst/>
+            </a:prstGeom>
+          </p:spPr>
+        </p:pic>
+        <p:pic>
+          <p:nvPicPr>
+            <p:cNvPr id="7" name="Picture 6" descr="A blue and black logo&#10;&#10;Description automatically generated">
+              <a:extLst>
+                <a:ext uri="{FF2B5EF4-FFF2-40B4-BE49-F238E27FC236}">
+                  <a16:creationId xmlns:a16="http://schemas.microsoft.com/office/drawing/2014/main" id="{A998E5F5-EB38-2D40-B7BA-B64F5A4E9218}"/>
+                </a:ext>
+              </a:extLst>
+            </p:cNvPr>
+            <p:cNvPicPr>
+              <a:picLocks noChangeAspect="1"/>
+            </p:cNvPicPr>
+            <p:nvPr/>
+          </p:nvPicPr>
+          <p:blipFill rotWithShape="1">
+            <a:blip r:embed="rId3"/>
+            <a:srcRect r="63297"/>
+            <a:stretch/>
+          </p:blipFill>
+          <p:spPr>
+            <a:xfrm>
+              <a:off x="5214001" y="2270367"/>
+              <a:ext cx="503874" cy="352918"/>
+            </a:xfrm>
+            <a:prstGeom prst="rect">
+              <a:avLst/>
+            </a:prstGeom>
+          </p:spPr>
+        </p:pic>
+      </p:grpSp>
+      <p:pic>
+        <p:nvPicPr>
+          <p:cNvPr id="2064" name="Picture 16" descr="Top docker images that I tend to use ad-hoc - DEV Community">
+            <a:extLst>
+              <a:ext uri="{FF2B5EF4-FFF2-40B4-BE49-F238E27FC236}">
+                <a16:creationId xmlns:a16="http://schemas.microsoft.com/office/drawing/2014/main" id="{8C0CE16F-32F8-DCB0-AC7E-9EDD57C9D959}"/>
+              </a:ext>
+            </a:extLst>
+          </p:cNvPr>
+          <p:cNvPicPr>
+            <a:picLocks noChangeAspect="1" noChangeArrowheads="1"/>
+          </p:cNvPicPr>
+          <p:nvPr/>
+        </p:nvPicPr>
+        <p:blipFill>
+          <a:blip r:embed="rId9">
+            <a:extLst>
+              <a:ext uri="{28A0092B-C50C-407E-A947-70E740481C1C}">
+                <a14:useLocalDpi xmlns:a14="http://schemas.microsoft.com/office/drawing/2010/main" val="0"/>
+              </a:ext>
+            </a:extLst>
+          </a:blip>
+          <a:srcRect/>
+          <a:stretch>
+            <a:fillRect/>
+          </a:stretch>
+        </p:blipFill>
+        <p:spPr bwMode="auto">
+          <a:xfrm>
+            <a:off x="2422585" y="561267"/>
+            <a:ext cx="3829206" cy="2153929"/>
+          </a:xfrm>
+          <a:prstGeom prst="rect">
+            <a:avLst/>
+          </a:prstGeom>
+          <a:noFill/>
+          <a:extLst>
+            <a:ext uri="{909E8E84-426E-40DD-AFC4-6F175D3DCCD1}">
+              <a14:hiddenFill xmlns:a14="http://schemas.microsoft.com/office/drawing/2010/main">
+                <a:solidFill>
+                  <a:srgbClr val="FFFFFF"/>
+                </a:solidFill>
+              </a14:hiddenFill>
+            </a:ext>
+          </a:extLst>
+        </p:spPr>
+      </p:pic>
+      <p:pic>
+        <p:nvPicPr>
+          <p:cNvPr id="2066" name="Picture 18" descr="Software Developer Working With Computers Stock Illustration - Download  Image Now - Software Development, Desktop PC, Business - iStock">
+            <a:extLst>
+              <a:ext uri="{FF2B5EF4-FFF2-40B4-BE49-F238E27FC236}">
+                <a16:creationId xmlns:a16="http://schemas.microsoft.com/office/drawing/2014/main" id="{738D4933-A008-07D5-7D74-9CDDEBDEDB2E}"/>
+              </a:ext>
+            </a:extLst>
+          </p:cNvPr>
+          <p:cNvPicPr>
+            <a:picLocks noChangeAspect="1" noChangeArrowheads="1"/>
+          </p:cNvPicPr>
+          <p:nvPr/>
+        </p:nvPicPr>
+        <p:blipFill>
+          <a:blip r:embed="rId10">
+            <a:extLst>
+              <a:ext uri="{28A0092B-C50C-407E-A947-70E740481C1C}">
+                <a14:useLocalDpi xmlns:a14="http://schemas.microsoft.com/office/drawing/2010/main" val="0"/>
+              </a:ext>
+            </a:extLst>
+          </a:blip>
+          <a:srcRect/>
+          <a:stretch>
+            <a:fillRect/>
+          </a:stretch>
+        </p:blipFill>
+        <p:spPr bwMode="auto">
+          <a:xfrm>
+            <a:off x="769242" y="3288578"/>
+            <a:ext cx="2700048" cy="1350024"/>
+          </a:xfrm>
+          <a:prstGeom prst="rect">
+            <a:avLst/>
+          </a:prstGeom>
+          <a:noFill/>
+          <a:extLst>
+            <a:ext uri="{909E8E84-426E-40DD-AFC4-6F175D3DCCD1}">
+              <a14:hiddenFill xmlns:a14="http://schemas.microsoft.com/office/drawing/2010/main">
+                <a:solidFill>
+                  <a:srgbClr val="FFFFFF"/>
+                </a:solidFill>
+              </a14:hiddenFill>
+            </a:ext>
+          </a:extLst>
+        </p:spPr>
+      </p:pic>
+      <p:pic>
+        <p:nvPicPr>
+          <p:cNvPr id="2068" name="Picture 20" descr="1,236 Qa Engineer Images, Stock Photos, 3D objects, &amp; Vectors | Shutterstock">
+            <a:extLst>
+              <a:ext uri="{FF2B5EF4-FFF2-40B4-BE49-F238E27FC236}">
+                <a16:creationId xmlns:a16="http://schemas.microsoft.com/office/drawing/2014/main" id="{DCFED5FE-5190-D809-469F-3420B1FBA14E}"/>
+              </a:ext>
+            </a:extLst>
+          </p:cNvPr>
+          <p:cNvPicPr>
+            <a:picLocks noChangeAspect="1" noChangeArrowheads="1"/>
+          </p:cNvPicPr>
+          <p:nvPr/>
+        </p:nvPicPr>
+        <p:blipFill rotWithShape="1">
+          <a:blip r:embed="rId11">
+            <a:extLst>
+              <a:ext uri="{28A0092B-C50C-407E-A947-70E740481C1C}">
+                <a14:useLocalDpi xmlns:a14="http://schemas.microsoft.com/office/drawing/2010/main" val="0"/>
+              </a:ext>
+            </a:extLst>
+          </a:blip>
+          <a:srcRect b="8625"/>
+          <a:stretch/>
+        </p:blipFill>
+        <p:spPr bwMode="auto">
+          <a:xfrm>
+            <a:off x="180604" y="362200"/>
+            <a:ext cx="1938662" cy="1221688"/>
+          </a:xfrm>
+          <a:prstGeom prst="rect">
+            <a:avLst/>
+          </a:prstGeom>
+          <a:noFill/>
+          <a:extLst>
+            <a:ext uri="{909E8E84-426E-40DD-AFC4-6F175D3DCCD1}">
+              <a14:hiddenFill xmlns:a14="http://schemas.microsoft.com/office/drawing/2010/main">
+                <a:solidFill>
+                  <a:srgbClr val="FFFFFF"/>
+                </a:solidFill>
+              </a14:hiddenFill>
+            </a:ext>
+          </a:extLst>
+        </p:spPr>
+      </p:pic>
+      <p:pic>
+        <p:nvPicPr>
+          <p:cNvPr id="2070" name="Picture 22" descr="Enterprise DevOps: The Crucial Role of DevOps in Enterprise Application  Development | Turing">
+            <a:extLst>
+              <a:ext uri="{FF2B5EF4-FFF2-40B4-BE49-F238E27FC236}">
+                <a16:creationId xmlns:a16="http://schemas.microsoft.com/office/drawing/2014/main" id="{4B17F30B-3174-9A6C-BC92-79362817A773}"/>
+              </a:ext>
+            </a:extLst>
+          </p:cNvPr>
+          <p:cNvPicPr>
+            <a:picLocks noChangeAspect="1" noChangeArrowheads="1"/>
+          </p:cNvPicPr>
+          <p:nvPr/>
+        </p:nvPicPr>
+        <p:blipFill>
+          <a:blip r:embed="rId12">
+            <a:extLst>
+              <a:ext uri="{28A0092B-C50C-407E-A947-70E740481C1C}">
+                <a14:useLocalDpi xmlns:a14="http://schemas.microsoft.com/office/drawing/2010/main" val="0"/>
+              </a:ext>
+            </a:extLst>
+          </a:blip>
+          <a:srcRect/>
+          <a:stretch>
+            <a:fillRect/>
+          </a:stretch>
+        </p:blipFill>
+        <p:spPr bwMode="auto">
+          <a:xfrm>
+            <a:off x="6494250" y="530017"/>
+            <a:ext cx="3033981" cy="1423364"/>
+          </a:xfrm>
+          <a:prstGeom prst="rect">
+            <a:avLst/>
+          </a:prstGeom>
+          <a:noFill/>
+          <a:extLst>
+            <a:ext uri="{909E8E84-426E-40DD-AFC4-6F175D3DCCD1}">
+              <a14:hiddenFill xmlns:a14="http://schemas.microsoft.com/office/drawing/2010/main">
+                <a:solidFill>
+                  <a:srgbClr val="FFFFFF"/>
+                </a:solidFill>
+              </a14:hiddenFill>
+            </a:ext>
+          </a:extLst>
+        </p:spPr>
+      </p:pic>
+      <p:sp>
+        <p:nvSpPr>
+          <p:cNvPr id="13" name="Left-Right Arrow 12">
+            <a:extLst>
+              <a:ext uri="{FF2B5EF4-FFF2-40B4-BE49-F238E27FC236}">
+                <a16:creationId xmlns:a16="http://schemas.microsoft.com/office/drawing/2014/main" id="{DFE6A19D-DA3E-14E4-6F92-2711DEE4A2E2}"/>
+              </a:ext>
+            </a:extLst>
+          </p:cNvPr>
+          <p:cNvSpPr/>
+          <p:nvPr/>
+        </p:nvSpPr>
+        <p:spPr>
+          <a:xfrm rot="18042418">
+            <a:off x="2154936" y="2912984"/>
+            <a:ext cx="542095" cy="134392"/>
+          </a:xfrm>
+          <a:prstGeom prst="leftRightArrow">
+            <a:avLst/>
+          </a:prstGeom>
+        </p:spPr>
+        <p:style>
+          <a:lnRef idx="2">
+            <a:schemeClr val="accent1">
+              <a:shade val="15000"/>
+            </a:schemeClr>
+          </a:lnRef>
+          <a:fillRef idx="1">
+            <a:schemeClr val="accent1"/>
+          </a:fillRef>
+          <a:effectRef idx="0">
+            <a:schemeClr val="accent1"/>
+          </a:effectRef>
+          <a:fontRef idx="minor">
+            <a:schemeClr val="lt1"/>
+          </a:fontRef>
+        </p:style>
+        <p:txBody>
+          <a:bodyPr rtlCol="0" anchor="ctr"/>
+          <a:lstStyle/>
+          <a:p>
+            <a:pPr algn="ctr"/>
+            <a:endParaRPr lang="en-US"/>
+          </a:p>
+        </p:txBody>
+      </p:sp>
+      <p:sp>
+        <p:nvSpPr>
+          <p:cNvPr id="14" name="Left-Right Arrow 13">
+            <a:extLst>
+              <a:ext uri="{FF2B5EF4-FFF2-40B4-BE49-F238E27FC236}">
+                <a16:creationId xmlns:a16="http://schemas.microsoft.com/office/drawing/2014/main" id="{1E9D6188-D3E8-AABB-4052-F7EF688FA169}"/>
+              </a:ext>
+            </a:extLst>
+          </p:cNvPr>
+          <p:cNvSpPr/>
+          <p:nvPr/>
+        </p:nvSpPr>
+        <p:spPr>
+          <a:xfrm rot="12774481">
+            <a:off x="2144877" y="1417192"/>
+            <a:ext cx="542095" cy="134392"/>
+          </a:xfrm>
+          <a:prstGeom prst="leftRightArrow">
+            <a:avLst/>
+          </a:prstGeom>
+        </p:spPr>
+        <p:style>
+          <a:lnRef idx="2">
+            <a:schemeClr val="accent1">
+              <a:shade val="15000"/>
+            </a:schemeClr>
+          </a:lnRef>
+          <a:fillRef idx="1">
+            <a:schemeClr val="accent1"/>
+          </a:fillRef>
+          <a:effectRef idx="0">
+            <a:schemeClr val="accent1"/>
+          </a:effectRef>
+          <a:fontRef idx="minor">
+            <a:schemeClr val="lt1"/>
+          </a:fontRef>
+        </p:style>
+        <p:txBody>
+          <a:bodyPr rtlCol="0" anchor="ctr"/>
+          <a:lstStyle/>
+          <a:p>
+            <a:pPr algn="ctr"/>
+            <a:endParaRPr lang="en-US"/>
+          </a:p>
+        </p:txBody>
+      </p:sp>
+      <p:sp>
+        <p:nvSpPr>
+          <p:cNvPr id="15" name="Left-Right Arrow 14">
+            <a:extLst>
+              <a:ext uri="{FF2B5EF4-FFF2-40B4-BE49-F238E27FC236}">
+                <a16:creationId xmlns:a16="http://schemas.microsoft.com/office/drawing/2014/main" id="{773DB2DF-2239-1676-3042-4DA8E5661D0E}"/>
+              </a:ext>
+            </a:extLst>
+          </p:cNvPr>
+          <p:cNvSpPr/>
+          <p:nvPr/>
+        </p:nvSpPr>
+        <p:spPr>
+          <a:xfrm>
+            <a:off x="6191953" y="1496465"/>
+            <a:ext cx="542095" cy="134392"/>
+          </a:xfrm>
+          <a:prstGeom prst="leftRightArrow">
+            <a:avLst/>
+          </a:prstGeom>
+        </p:spPr>
+        <p:style>
+          <a:lnRef idx="2">
+            <a:schemeClr val="accent1">
+              <a:shade val="15000"/>
+            </a:schemeClr>
+          </a:lnRef>
+          <a:fillRef idx="1">
+            <a:schemeClr val="accent1"/>
+          </a:fillRef>
+          <a:effectRef idx="0">
+            <a:schemeClr val="accent1"/>
+          </a:effectRef>
+          <a:fontRef idx="minor">
+            <a:schemeClr val="lt1"/>
+          </a:fontRef>
+        </p:style>
+        <p:txBody>
+          <a:bodyPr rtlCol="0" anchor="ctr"/>
+          <a:lstStyle/>
+          <a:p>
+            <a:pPr algn="ctr"/>
+            <a:endParaRPr lang="en-US"/>
+          </a:p>
+        </p:txBody>
+      </p:sp>
+      <p:sp>
+        <p:nvSpPr>
+          <p:cNvPr id="16" name="Down Arrow 15">
+            <a:extLst>
+              <a:ext uri="{FF2B5EF4-FFF2-40B4-BE49-F238E27FC236}">
+                <a16:creationId xmlns:a16="http://schemas.microsoft.com/office/drawing/2014/main" id="{B68D5E22-0750-AA0F-A2B6-809810D8913A}"/>
+              </a:ext>
+            </a:extLst>
+          </p:cNvPr>
+          <p:cNvSpPr/>
+          <p:nvPr/>
+        </p:nvSpPr>
+        <p:spPr>
+          <a:xfrm rot="17755437">
+            <a:off x="5713095" y="2311489"/>
+            <a:ext cx="224142" cy="711228"/>
+          </a:xfrm>
+          <a:prstGeom prst="downArrow">
+            <a:avLst/>
+          </a:prstGeom>
+        </p:spPr>
+        <p:style>
+          <a:lnRef idx="2">
+            <a:schemeClr val="accent1">
+              <a:shade val="15000"/>
+            </a:schemeClr>
+          </a:lnRef>
+          <a:fillRef idx="1">
+            <a:schemeClr val="accent1"/>
+          </a:fillRef>
+          <a:effectRef idx="0">
+            <a:schemeClr val="accent1"/>
+          </a:effectRef>
+          <a:fontRef idx="minor">
+            <a:schemeClr val="lt1"/>
+          </a:fontRef>
+        </p:style>
+        <p:txBody>
+          <a:bodyPr rtlCol="0" anchor="ctr"/>
+          <a:lstStyle/>
+          <a:p>
+            <a:pPr algn="ctr"/>
+            <a:endParaRPr lang="en-US"/>
+          </a:p>
+        </p:txBody>
+      </p:sp>
+      <p:sp>
+        <p:nvSpPr>
+          <p:cNvPr id="17" name="TextBox 16">
+            <a:extLst>
+              <a:ext uri="{FF2B5EF4-FFF2-40B4-BE49-F238E27FC236}">
+                <a16:creationId xmlns:a16="http://schemas.microsoft.com/office/drawing/2014/main" id="{AC4A0E98-790A-0D40-B948-9D6E9586D4DC}"/>
+              </a:ext>
+            </a:extLst>
+          </p:cNvPr>
+          <p:cNvSpPr txBox="1"/>
+          <p:nvPr/>
+        </p:nvSpPr>
+        <p:spPr>
+          <a:xfrm>
+            <a:off x="6152142" y="2402814"/>
+            <a:ext cx="557589" cy="369332"/>
+          </a:xfrm>
+          <a:prstGeom prst="rect">
+            <a:avLst/>
+          </a:prstGeom>
+          <a:noFill/>
+        </p:spPr>
+        <p:txBody>
+          <a:bodyPr wrap="none" rtlCol="0">
+            <a:spAutoFit/>
+          </a:bodyPr>
+          <a:lstStyle/>
+          <a:p>
+            <a:r>
+              <a:rPr lang="en-US" dirty="0"/>
+              <a:t>Pull</a:t>
+            </a:r>
+          </a:p>
+        </p:txBody>
+      </p:sp>
+      <p:sp>
+        <p:nvSpPr>
+          <p:cNvPr id="18" name="TextBox 17">
+            <a:extLst>
+              <a:ext uri="{FF2B5EF4-FFF2-40B4-BE49-F238E27FC236}">
+                <a16:creationId xmlns:a16="http://schemas.microsoft.com/office/drawing/2014/main" id="{BF7DBEB0-B502-3E86-145B-4F0D183C4753}"/>
+              </a:ext>
+            </a:extLst>
+          </p:cNvPr>
+          <p:cNvSpPr txBox="1"/>
+          <p:nvPr/>
+        </p:nvSpPr>
+        <p:spPr>
+          <a:xfrm>
+            <a:off x="6038252" y="1221355"/>
+            <a:ext cx="840295" cy="253916"/>
+          </a:xfrm>
+          <a:prstGeom prst="rect">
+            <a:avLst/>
+          </a:prstGeom>
+          <a:noFill/>
+        </p:spPr>
+        <p:txBody>
+          <a:bodyPr wrap="none" rtlCol="0">
+            <a:spAutoFit/>
+          </a:bodyPr>
+          <a:lstStyle/>
+          <a:p>
+            <a:r>
+              <a:rPr lang="en-US" sz="1050" dirty="0"/>
+              <a:t>Push &amp; Pull</a:t>
+            </a:r>
+          </a:p>
+        </p:txBody>
+      </p:sp>
+      <p:sp>
+        <p:nvSpPr>
+          <p:cNvPr id="19" name="TextBox 18">
+            <a:extLst>
+              <a:ext uri="{FF2B5EF4-FFF2-40B4-BE49-F238E27FC236}">
+                <a16:creationId xmlns:a16="http://schemas.microsoft.com/office/drawing/2014/main" id="{D6024BD9-06A6-8411-8CC3-27700A94DA53}"/>
+              </a:ext>
+            </a:extLst>
+          </p:cNvPr>
+          <p:cNvSpPr txBox="1"/>
+          <p:nvPr/>
+        </p:nvSpPr>
+        <p:spPr>
+          <a:xfrm rot="18200723">
+            <a:off x="1850779" y="2704651"/>
+            <a:ext cx="840295" cy="253916"/>
+          </a:xfrm>
+          <a:prstGeom prst="rect">
+            <a:avLst/>
+          </a:prstGeom>
+          <a:noFill/>
+        </p:spPr>
+        <p:txBody>
+          <a:bodyPr wrap="none" rtlCol="0">
+            <a:spAutoFit/>
+          </a:bodyPr>
+          <a:lstStyle/>
+          <a:p>
+            <a:r>
+              <a:rPr lang="en-US" sz="1050" dirty="0"/>
+              <a:t>Push &amp; Pull</a:t>
+            </a:r>
+          </a:p>
+        </p:txBody>
+      </p:sp>
+      <p:sp>
+        <p:nvSpPr>
+          <p:cNvPr id="22" name="TextBox 21">
+            <a:extLst>
+              <a:ext uri="{FF2B5EF4-FFF2-40B4-BE49-F238E27FC236}">
+                <a16:creationId xmlns:a16="http://schemas.microsoft.com/office/drawing/2014/main" id="{BBE71ED4-F28A-441B-88F3-B202B585900A}"/>
+              </a:ext>
+            </a:extLst>
+          </p:cNvPr>
+          <p:cNvSpPr txBox="1"/>
+          <p:nvPr/>
+        </p:nvSpPr>
+        <p:spPr>
+          <a:xfrm rot="2119804">
+            <a:off x="2127424" y="1152793"/>
+            <a:ext cx="840295" cy="253916"/>
+          </a:xfrm>
+          <a:prstGeom prst="rect">
+            <a:avLst/>
+          </a:prstGeom>
+          <a:noFill/>
+        </p:spPr>
+        <p:txBody>
+          <a:bodyPr wrap="none" rtlCol="0">
+            <a:spAutoFit/>
+          </a:bodyPr>
+          <a:lstStyle/>
+          <a:p>
+            <a:r>
+              <a:rPr lang="en-US" sz="1050" dirty="0"/>
+              <a:t>Push &amp; Pull</a:t>
+            </a:r>
+          </a:p>
+        </p:txBody>
+      </p:sp>
+      <p:sp>
+        <p:nvSpPr>
+          <p:cNvPr id="23" name="TextBox 22">
+            <a:extLst>
+              <a:ext uri="{FF2B5EF4-FFF2-40B4-BE49-F238E27FC236}">
+                <a16:creationId xmlns:a16="http://schemas.microsoft.com/office/drawing/2014/main" id="{FDD68639-94AB-8B44-17DD-8A97456A94A8}"/>
+              </a:ext>
+            </a:extLst>
+          </p:cNvPr>
+          <p:cNvSpPr txBox="1"/>
+          <p:nvPr/>
+        </p:nvSpPr>
+        <p:spPr>
+          <a:xfrm>
+            <a:off x="1455997" y="4695032"/>
+            <a:ext cx="1391728" cy="253916"/>
+          </a:xfrm>
+          <a:prstGeom prst="rect">
+            <a:avLst/>
+          </a:prstGeom>
+          <a:noFill/>
+        </p:spPr>
+        <p:txBody>
+          <a:bodyPr wrap="none" rtlCol="0">
+            <a:spAutoFit/>
+          </a:bodyPr>
+          <a:lstStyle/>
+          <a:p>
+            <a:r>
+              <a:rPr lang="en-US" sz="1050" dirty="0"/>
+              <a:t>Software Developers</a:t>
+            </a:r>
+          </a:p>
+        </p:txBody>
+      </p:sp>
+      <p:sp>
+        <p:nvSpPr>
+          <p:cNvPr id="24" name="TextBox 23">
+            <a:extLst>
+              <a:ext uri="{FF2B5EF4-FFF2-40B4-BE49-F238E27FC236}">
+                <a16:creationId xmlns:a16="http://schemas.microsoft.com/office/drawing/2014/main" id="{0E1C77EC-3B9A-5520-0BF5-2C0C37979788}"/>
+              </a:ext>
+            </a:extLst>
+          </p:cNvPr>
+          <p:cNvSpPr txBox="1"/>
+          <p:nvPr/>
+        </p:nvSpPr>
+        <p:spPr>
+          <a:xfrm>
+            <a:off x="7831771" y="1907756"/>
+            <a:ext cx="1390124" cy="253916"/>
+          </a:xfrm>
+          <a:prstGeom prst="rect">
+            <a:avLst/>
+          </a:prstGeom>
+          <a:noFill/>
+        </p:spPr>
+        <p:txBody>
+          <a:bodyPr wrap="none" rtlCol="0">
+            <a:spAutoFit/>
+          </a:bodyPr>
+          <a:lstStyle/>
+          <a:p>
+            <a:r>
+              <a:rPr lang="en-US" sz="1050" dirty="0"/>
+              <a:t>Dev &amp; Ops Engineers</a:t>
+            </a:r>
+          </a:p>
+        </p:txBody>
+      </p:sp>
+      <p:sp>
+        <p:nvSpPr>
+          <p:cNvPr id="25" name="TextBox 24">
+            <a:extLst>
+              <a:ext uri="{FF2B5EF4-FFF2-40B4-BE49-F238E27FC236}">
+                <a16:creationId xmlns:a16="http://schemas.microsoft.com/office/drawing/2014/main" id="{7A78F11D-BE65-A626-99D3-BA9AF9BEB6FA}"/>
+              </a:ext>
+            </a:extLst>
+          </p:cNvPr>
+          <p:cNvSpPr txBox="1"/>
+          <p:nvPr/>
+        </p:nvSpPr>
+        <p:spPr>
+          <a:xfrm>
+            <a:off x="242471" y="1688060"/>
+            <a:ext cx="963725" cy="253916"/>
+          </a:xfrm>
+          <a:prstGeom prst="rect">
+            <a:avLst/>
+          </a:prstGeom>
+          <a:noFill/>
+        </p:spPr>
+        <p:txBody>
+          <a:bodyPr wrap="none" rtlCol="0">
+            <a:spAutoFit/>
+          </a:bodyPr>
+          <a:lstStyle/>
+          <a:p>
+            <a:r>
+              <a:rPr lang="en-US" sz="1050" dirty="0"/>
+              <a:t>QA Engineers</a:t>
+            </a:r>
+          </a:p>
+        </p:txBody>
+      </p:sp>
+      <p:pic>
+        <p:nvPicPr>
+          <p:cNvPr id="27" name="Picture 26">
+            <a:extLst>
+              <a:ext uri="{FF2B5EF4-FFF2-40B4-BE49-F238E27FC236}">
+                <a16:creationId xmlns:a16="http://schemas.microsoft.com/office/drawing/2014/main" id="{310FD351-D3C3-0789-4F58-8A714ED31261}"/>
+              </a:ext>
+            </a:extLst>
+          </p:cNvPr>
+          <p:cNvPicPr>
+            <a:picLocks noChangeAspect="1"/>
+          </p:cNvPicPr>
+          <p:nvPr/>
+        </p:nvPicPr>
+        <p:blipFill>
+          <a:blip r:embed="rId13"/>
+          <a:stretch>
+            <a:fillRect/>
+          </a:stretch>
+        </p:blipFill>
+        <p:spPr>
+          <a:xfrm>
+            <a:off x="180604" y="2762650"/>
+            <a:ext cx="867200" cy="867200"/>
+          </a:xfrm>
+          <a:prstGeom prst="rect">
+            <a:avLst/>
+          </a:prstGeom>
+        </p:spPr>
+      </p:pic>
+      <p:pic>
+        <p:nvPicPr>
+          <p:cNvPr id="2074" name="Picture 26" descr="FastAPI">
+            <a:extLst>
+              <a:ext uri="{FF2B5EF4-FFF2-40B4-BE49-F238E27FC236}">
+                <a16:creationId xmlns:a16="http://schemas.microsoft.com/office/drawing/2014/main" id="{2D49721D-7BB3-1F24-1955-34C40E56DB85}"/>
+              </a:ext>
+            </a:extLst>
+          </p:cNvPr>
+          <p:cNvPicPr>
+            <a:picLocks noChangeAspect="1" noChangeArrowheads="1"/>
+          </p:cNvPicPr>
+          <p:nvPr/>
+        </p:nvPicPr>
+        <p:blipFill>
+          <a:blip r:embed="rId14">
+            <a:extLst>
+              <a:ext uri="{28A0092B-C50C-407E-A947-70E740481C1C}">
+                <a14:useLocalDpi xmlns:a14="http://schemas.microsoft.com/office/drawing/2010/main" val="0"/>
+              </a:ext>
+            </a:extLst>
+          </a:blip>
+          <a:srcRect/>
+          <a:stretch>
+            <a:fillRect/>
+          </a:stretch>
+        </p:blipFill>
+        <p:spPr bwMode="auto">
+          <a:xfrm>
+            <a:off x="209390" y="2472774"/>
+            <a:ext cx="1266590" cy="456500"/>
+          </a:xfrm>
+          <a:prstGeom prst="rect">
+            <a:avLst/>
+          </a:prstGeom>
+          <a:noFill/>
+          <a:extLst>
+            <a:ext uri="{909E8E84-426E-40DD-AFC4-6F175D3DCCD1}">
+              <a14:hiddenFill xmlns:a14="http://schemas.microsoft.com/office/drawing/2010/main">
+                <a:solidFill>
+                  <a:srgbClr val="FFFFFF"/>
+                </a:solidFill>
+              </a14:hiddenFill>
+            </a:ext>
+          </a:extLst>
+        </p:spPr>
+      </p:pic>
+      <p:pic>
+        <p:nvPicPr>
+          <p:cNvPr id="2076" name="Picture 28" descr="20 Postgresql Icons - Free in SVG, PNG, ICO - IconScout">
+            <a:extLst>
+              <a:ext uri="{FF2B5EF4-FFF2-40B4-BE49-F238E27FC236}">
+                <a16:creationId xmlns:a16="http://schemas.microsoft.com/office/drawing/2014/main" id="{1BD7582B-6CAA-8E24-A8F1-4FC1A7B6B023}"/>
+              </a:ext>
+            </a:extLst>
+          </p:cNvPr>
+          <p:cNvPicPr>
+            <a:picLocks noChangeAspect="1" noChangeArrowheads="1"/>
+          </p:cNvPicPr>
+          <p:nvPr/>
+        </p:nvPicPr>
+        <p:blipFill>
+          <a:blip r:embed="rId15">
+            <a:extLst>
+              <a:ext uri="{28A0092B-C50C-407E-A947-70E740481C1C}">
+                <a14:useLocalDpi xmlns:a14="http://schemas.microsoft.com/office/drawing/2010/main" val="0"/>
+              </a:ext>
+            </a:extLst>
+          </a:blip>
+          <a:srcRect/>
+          <a:stretch>
+            <a:fillRect/>
+          </a:stretch>
+        </p:blipFill>
+        <p:spPr bwMode="auto">
+          <a:xfrm>
+            <a:off x="971844" y="2923364"/>
+            <a:ext cx="493400" cy="493400"/>
+          </a:xfrm>
+          <a:prstGeom prst="rect">
+            <a:avLst/>
+          </a:prstGeom>
+          <a:noFill/>
+          <a:extLst>
+            <a:ext uri="{909E8E84-426E-40DD-AFC4-6F175D3DCCD1}">
+              <a14:hiddenFill xmlns:a14="http://schemas.microsoft.com/office/drawing/2010/main">
+                <a:solidFill>
+                  <a:srgbClr val="FFFFFF"/>
+                </a:solidFill>
+              </a14:hiddenFill>
+            </a:ext>
+          </a:extLst>
+        </p:spPr>
+      </p:pic>
+      <p:pic>
+        <p:nvPicPr>
+          <p:cNvPr id="2078" name="Picture 30" descr="TensorFlow&quot; Icon - Download for free – Iconduck">
+            <a:extLst>
+              <a:ext uri="{FF2B5EF4-FFF2-40B4-BE49-F238E27FC236}">
+                <a16:creationId xmlns:a16="http://schemas.microsoft.com/office/drawing/2014/main" id="{FF44B88F-2555-4077-3254-5611741C0B92}"/>
+              </a:ext>
+            </a:extLst>
+          </p:cNvPr>
+          <p:cNvPicPr>
+            <a:picLocks noChangeAspect="1" noChangeArrowheads="1"/>
+          </p:cNvPicPr>
+          <p:nvPr/>
+        </p:nvPicPr>
+        <p:blipFill>
+          <a:blip r:embed="rId16">
+            <a:extLst>
+              <a:ext uri="{28A0092B-C50C-407E-A947-70E740481C1C}">
+                <a14:useLocalDpi xmlns:a14="http://schemas.microsoft.com/office/drawing/2010/main" val="0"/>
+              </a:ext>
+            </a:extLst>
+          </a:blip>
+          <a:srcRect/>
+          <a:stretch>
+            <a:fillRect/>
+          </a:stretch>
+        </p:blipFill>
+        <p:spPr bwMode="auto">
+          <a:xfrm>
+            <a:off x="612847" y="3493127"/>
+            <a:ext cx="406257" cy="435600"/>
+          </a:xfrm>
+          <a:prstGeom prst="rect">
+            <a:avLst/>
+          </a:prstGeom>
+          <a:noFill/>
+          <a:extLst>
+            <a:ext uri="{909E8E84-426E-40DD-AFC4-6F175D3DCCD1}">
+              <a14:hiddenFill xmlns:a14="http://schemas.microsoft.com/office/drawing/2010/main">
+                <a:solidFill>
+                  <a:srgbClr val="FFFFFF"/>
+                </a:solidFill>
+              </a14:hiddenFill>
+            </a:ext>
+          </a:extLst>
+        </p:spPr>
+      </p:pic>
+      <p:pic>
+        <p:nvPicPr>
+          <p:cNvPr id="2080" name="Picture 32">
+            <a:extLst>
+              <a:ext uri="{FF2B5EF4-FFF2-40B4-BE49-F238E27FC236}">
+                <a16:creationId xmlns:a16="http://schemas.microsoft.com/office/drawing/2014/main" id="{68EE495F-D768-AFBF-E3DD-569D6A38EE1E}"/>
+              </a:ext>
+            </a:extLst>
+          </p:cNvPr>
+          <p:cNvPicPr>
+            <a:picLocks noChangeAspect="1" noChangeArrowheads="1"/>
+          </p:cNvPicPr>
+          <p:nvPr/>
+        </p:nvPicPr>
+        <p:blipFill>
+          <a:blip r:embed="rId17">
+            <a:extLst>
+              <a:ext uri="{28A0092B-C50C-407E-A947-70E740481C1C}">
+                <a14:useLocalDpi xmlns:a14="http://schemas.microsoft.com/office/drawing/2010/main" val="0"/>
+              </a:ext>
+            </a:extLst>
+          </a:blip>
+          <a:srcRect/>
+          <a:stretch>
+            <a:fillRect/>
+          </a:stretch>
+        </p:blipFill>
+        <p:spPr bwMode="auto">
+          <a:xfrm>
+            <a:off x="8952427" y="632280"/>
+            <a:ext cx="772800" cy="290404"/>
+          </a:xfrm>
+          <a:prstGeom prst="rect">
+            <a:avLst/>
+          </a:prstGeom>
+          <a:noFill/>
+          <a:extLst>
+            <a:ext uri="{909E8E84-426E-40DD-AFC4-6F175D3DCCD1}">
+              <a14:hiddenFill xmlns:a14="http://schemas.microsoft.com/office/drawing/2010/main">
+                <a:solidFill>
+                  <a:srgbClr val="FFFFFF"/>
+                </a:solidFill>
+              </a14:hiddenFill>
+            </a:ext>
+          </a:extLst>
+        </p:spPr>
+      </p:pic>
+      <p:pic>
+        <p:nvPicPr>
+          <p:cNvPr id="2082" name="Picture 34">
+            <a:extLst>
+              <a:ext uri="{FF2B5EF4-FFF2-40B4-BE49-F238E27FC236}">
+                <a16:creationId xmlns:a16="http://schemas.microsoft.com/office/drawing/2014/main" id="{68397422-7805-5212-2623-9A5DA78C4C0E}"/>
+              </a:ext>
+            </a:extLst>
+          </p:cNvPr>
+          <p:cNvPicPr>
+            <a:picLocks noChangeAspect="1" noChangeArrowheads="1"/>
+          </p:cNvPicPr>
+          <p:nvPr/>
+        </p:nvPicPr>
+        <p:blipFill>
+          <a:blip r:embed="rId18">
+            <a:extLst>
+              <a:ext uri="{28A0092B-C50C-407E-A947-70E740481C1C}">
+                <a14:useLocalDpi xmlns:a14="http://schemas.microsoft.com/office/drawing/2010/main" val="0"/>
+              </a:ext>
+            </a:extLst>
+          </a:blip>
+          <a:srcRect/>
+          <a:stretch>
+            <a:fillRect/>
+          </a:stretch>
+        </p:blipFill>
+        <p:spPr bwMode="auto">
+          <a:xfrm>
+            <a:off x="9115200" y="1007257"/>
+            <a:ext cx="1104000" cy="261338"/>
+          </a:xfrm>
+          <a:prstGeom prst="rect">
+            <a:avLst/>
+          </a:prstGeom>
+          <a:noFill/>
+          <a:extLst>
+            <a:ext uri="{909E8E84-426E-40DD-AFC4-6F175D3DCCD1}">
+              <a14:hiddenFill xmlns:a14="http://schemas.microsoft.com/office/drawing/2010/main">
+                <a:solidFill>
+                  <a:srgbClr val="FFFFFF"/>
+                </a:solidFill>
+              </a14:hiddenFill>
+            </a:ext>
+          </a:extLst>
+        </p:spPr>
+      </p:pic>
+      <p:pic>
+        <p:nvPicPr>
+          <p:cNvPr id="2084" name="Picture 36" descr="Go programming language logo | Programming languages, Language logo,  Language">
+            <a:extLst>
+              <a:ext uri="{FF2B5EF4-FFF2-40B4-BE49-F238E27FC236}">
+                <a16:creationId xmlns:a16="http://schemas.microsoft.com/office/drawing/2014/main" id="{C525B8F1-542A-5A0B-4072-35AD88EBAFE1}"/>
+              </a:ext>
+            </a:extLst>
+          </p:cNvPr>
+          <p:cNvPicPr>
+            <a:picLocks noChangeAspect="1" noChangeArrowheads="1"/>
+          </p:cNvPicPr>
+          <p:nvPr/>
+        </p:nvPicPr>
+        <p:blipFill>
+          <a:blip r:embed="rId19">
+            <a:extLst>
+              <a:ext uri="{28A0092B-C50C-407E-A947-70E740481C1C}">
+                <a14:useLocalDpi xmlns:a14="http://schemas.microsoft.com/office/drawing/2010/main" val="0"/>
+              </a:ext>
+            </a:extLst>
+          </a:blip>
+          <a:srcRect/>
+          <a:stretch>
+            <a:fillRect/>
+          </a:stretch>
+        </p:blipFill>
+        <p:spPr bwMode="auto">
+          <a:xfrm>
+            <a:off x="9725227" y="353630"/>
+            <a:ext cx="557300" cy="557300"/>
+          </a:xfrm>
+          <a:prstGeom prst="rect">
+            <a:avLst/>
+          </a:prstGeom>
+          <a:noFill/>
+          <a:extLst>
+            <a:ext uri="{909E8E84-426E-40DD-AFC4-6F175D3DCCD1}">
+              <a14:hiddenFill xmlns:a14="http://schemas.microsoft.com/office/drawing/2010/main">
+                <a:solidFill>
+                  <a:srgbClr val="FFFFFF"/>
+                </a:solidFill>
+              </a14:hiddenFill>
+            </a:ext>
+          </a:extLst>
+        </p:spPr>
+      </p:pic>
+      <p:pic>
+        <p:nvPicPr>
+          <p:cNvPr id="2086" name="Picture 38" descr="VMware Logo and symbol, meaning, history, PNG, brand">
+            <a:extLst>
+              <a:ext uri="{FF2B5EF4-FFF2-40B4-BE49-F238E27FC236}">
+                <a16:creationId xmlns:a16="http://schemas.microsoft.com/office/drawing/2014/main" id="{45658254-044E-B845-68AE-AD1D284B2B32}"/>
+              </a:ext>
+            </a:extLst>
+          </p:cNvPr>
+          <p:cNvPicPr>
+            <a:picLocks noChangeAspect="1" noChangeArrowheads="1"/>
+          </p:cNvPicPr>
+          <p:nvPr/>
+        </p:nvPicPr>
+        <p:blipFill>
+          <a:blip r:embed="rId20">
+            <a:extLst>
+              <a:ext uri="{28A0092B-C50C-407E-A947-70E740481C1C}">
+                <a14:useLocalDpi xmlns:a14="http://schemas.microsoft.com/office/drawing/2010/main" val="0"/>
+              </a:ext>
+            </a:extLst>
+          </a:blip>
+          <a:srcRect/>
+          <a:stretch>
+            <a:fillRect/>
+          </a:stretch>
+        </p:blipFill>
+        <p:spPr bwMode="auto">
+          <a:xfrm>
+            <a:off x="9543639" y="1077360"/>
+            <a:ext cx="1126200" cy="675720"/>
+          </a:xfrm>
+          <a:prstGeom prst="rect">
+            <a:avLst/>
+          </a:prstGeom>
+          <a:noFill/>
+          <a:extLst>
+            <a:ext uri="{909E8E84-426E-40DD-AFC4-6F175D3DCCD1}">
+              <a14:hiddenFill xmlns:a14="http://schemas.microsoft.com/office/drawing/2010/main">
+                <a:solidFill>
+                  <a:srgbClr val="FFFFFF"/>
+                </a:solidFill>
+              </a14:hiddenFill>
+            </a:ext>
+          </a:extLst>
+        </p:spPr>
+      </p:pic>
+      <p:pic>
+        <p:nvPicPr>
+          <p:cNvPr id="2088" name="Picture 40">
+            <a:extLst>
+              <a:ext uri="{FF2B5EF4-FFF2-40B4-BE49-F238E27FC236}">
+                <a16:creationId xmlns:a16="http://schemas.microsoft.com/office/drawing/2014/main" id="{186CAEB2-18A2-173B-3E7E-BFE55B589382}"/>
+              </a:ext>
+            </a:extLst>
+          </p:cNvPr>
+          <p:cNvPicPr>
+            <a:picLocks noChangeAspect="1" noChangeArrowheads="1"/>
+          </p:cNvPicPr>
+          <p:nvPr/>
+        </p:nvPicPr>
+        <p:blipFill>
+          <a:blip r:embed="rId21">
+            <a:extLst>
+              <a:ext uri="{28A0092B-C50C-407E-A947-70E740481C1C}">
+                <a14:useLocalDpi xmlns:a14="http://schemas.microsoft.com/office/drawing/2010/main" val="0"/>
+              </a:ext>
+            </a:extLst>
+          </a:blip>
+          <a:srcRect/>
+          <a:stretch>
+            <a:fillRect/>
+          </a:stretch>
+        </p:blipFill>
+        <p:spPr bwMode="auto">
+          <a:xfrm>
+            <a:off x="9528231" y="1624463"/>
+            <a:ext cx="1052710" cy="252486"/>
+          </a:xfrm>
+          <a:prstGeom prst="rect">
+            <a:avLst/>
+          </a:prstGeom>
+          <a:noFill/>
+          <a:extLst>
+            <a:ext uri="{909E8E84-426E-40DD-AFC4-6F175D3DCCD1}">
+              <a14:hiddenFill xmlns:a14="http://schemas.microsoft.com/office/drawing/2010/main">
+                <a:solidFill>
+                  <a:srgbClr val="FFFFFF"/>
+                </a:solidFill>
+              </a14:hiddenFill>
+            </a:ext>
+          </a:extLst>
+        </p:spPr>
+      </p:pic>
+      <p:pic>
+        <p:nvPicPr>
+          <p:cNvPr id="2090" name="Picture 42">
+            <a:extLst>
+              <a:ext uri="{FF2B5EF4-FFF2-40B4-BE49-F238E27FC236}">
+                <a16:creationId xmlns:a16="http://schemas.microsoft.com/office/drawing/2014/main" id="{C4E7B0A9-5029-86B9-6D87-73A8198B26F4}"/>
+              </a:ext>
+            </a:extLst>
+          </p:cNvPr>
+          <p:cNvPicPr>
+            <a:picLocks noChangeAspect="1" noChangeArrowheads="1"/>
+          </p:cNvPicPr>
+          <p:nvPr/>
+        </p:nvPicPr>
+        <p:blipFill>
+          <a:blip r:embed="rId22">
+            <a:extLst>
+              <a:ext uri="{28A0092B-C50C-407E-A947-70E740481C1C}">
+                <a14:useLocalDpi xmlns:a14="http://schemas.microsoft.com/office/drawing/2010/main" val="0"/>
+              </a:ext>
+            </a:extLst>
+          </a:blip>
+          <a:srcRect/>
+          <a:stretch>
+            <a:fillRect/>
+          </a:stretch>
+        </p:blipFill>
+        <p:spPr bwMode="auto">
+          <a:xfrm>
+            <a:off x="1344801" y="99531"/>
+            <a:ext cx="926125" cy="226467"/>
+          </a:xfrm>
+          <a:prstGeom prst="rect">
+            <a:avLst/>
+          </a:prstGeom>
+          <a:noFill/>
+          <a:extLst>
+            <a:ext uri="{909E8E84-426E-40DD-AFC4-6F175D3DCCD1}">
+              <a14:hiddenFill xmlns:a14="http://schemas.microsoft.com/office/drawing/2010/main">
+                <a:solidFill>
+                  <a:srgbClr val="FFFFFF"/>
+                </a:solidFill>
+              </a14:hiddenFill>
+            </a:ext>
+          </a:extLst>
+        </p:spPr>
+      </p:pic>
+      <p:pic>
+        <p:nvPicPr>
+          <p:cNvPr id="2092" name="Picture 44" descr="Mantis Bug Tracker - Wikipedia">
+            <a:extLst>
+              <a:ext uri="{FF2B5EF4-FFF2-40B4-BE49-F238E27FC236}">
+                <a16:creationId xmlns:a16="http://schemas.microsoft.com/office/drawing/2014/main" id="{937D7413-D8DA-4416-9840-36D0F495FE6B}"/>
+              </a:ext>
+            </a:extLst>
+          </p:cNvPr>
+          <p:cNvPicPr>
+            <a:picLocks noChangeAspect="1" noChangeArrowheads="1"/>
+          </p:cNvPicPr>
+          <p:nvPr/>
+        </p:nvPicPr>
+        <p:blipFill>
+          <a:blip r:embed="rId23">
+            <a:extLst>
+              <a:ext uri="{28A0092B-C50C-407E-A947-70E740481C1C}">
+                <a14:useLocalDpi xmlns:a14="http://schemas.microsoft.com/office/drawing/2010/main" val="0"/>
+              </a:ext>
+            </a:extLst>
+          </a:blip>
+          <a:srcRect/>
+          <a:stretch>
+            <a:fillRect/>
+          </a:stretch>
+        </p:blipFill>
+        <p:spPr bwMode="auto">
+          <a:xfrm>
+            <a:off x="1913519" y="294910"/>
+            <a:ext cx="995600" cy="343310"/>
+          </a:xfrm>
+          <a:prstGeom prst="rect">
+            <a:avLst/>
+          </a:prstGeom>
+          <a:noFill/>
+          <a:extLst>
+            <a:ext uri="{909E8E84-426E-40DD-AFC4-6F175D3DCCD1}">
+              <a14:hiddenFill xmlns:a14="http://schemas.microsoft.com/office/drawing/2010/main">
+                <a:solidFill>
+                  <a:srgbClr val="FFFFFF"/>
+                </a:solidFill>
+              </a14:hiddenFill>
+            </a:ext>
+          </a:extLst>
+        </p:spPr>
+      </p:pic>
+      <p:pic>
+        <p:nvPicPr>
+          <p:cNvPr id="2094" name="Picture 46" descr="Bugzilla - MediaWiki">
+            <a:extLst>
+              <a:ext uri="{FF2B5EF4-FFF2-40B4-BE49-F238E27FC236}">
+                <a16:creationId xmlns:a16="http://schemas.microsoft.com/office/drawing/2014/main" id="{D2668804-1A44-C520-86BE-E624C307038C}"/>
+              </a:ext>
+            </a:extLst>
+          </p:cNvPr>
+          <p:cNvPicPr>
+            <a:picLocks noChangeAspect="1" noChangeArrowheads="1"/>
+          </p:cNvPicPr>
+          <p:nvPr/>
+        </p:nvPicPr>
+        <p:blipFill>
+          <a:blip r:embed="rId24">
+            <a:extLst>
+              <a:ext uri="{28A0092B-C50C-407E-A947-70E740481C1C}">
+                <a14:useLocalDpi xmlns:a14="http://schemas.microsoft.com/office/drawing/2010/main" val="0"/>
+              </a:ext>
+            </a:extLst>
+          </a:blip>
+          <a:srcRect/>
+          <a:stretch>
+            <a:fillRect/>
+          </a:stretch>
+        </p:blipFill>
+        <p:spPr bwMode="auto">
+          <a:xfrm>
+            <a:off x="2473750" y="14748"/>
+            <a:ext cx="232545" cy="305999"/>
+          </a:xfrm>
+          <a:prstGeom prst="rect">
+            <a:avLst/>
+          </a:prstGeom>
+          <a:noFill/>
+          <a:extLst>
+            <a:ext uri="{909E8E84-426E-40DD-AFC4-6F175D3DCCD1}">
+              <a14:hiddenFill xmlns:a14="http://schemas.microsoft.com/office/drawing/2010/main">
+                <a:solidFill>
+                  <a:srgbClr val="FFFFFF"/>
+                </a:solidFill>
+              </a14:hiddenFill>
+            </a:ext>
+          </a:extLst>
+        </p:spPr>
+      </p:pic>
+      <p:pic>
+        <p:nvPicPr>
+          <p:cNvPr id="29" name="Picture 28">
+            <a:extLst>
+              <a:ext uri="{FF2B5EF4-FFF2-40B4-BE49-F238E27FC236}">
+                <a16:creationId xmlns:a16="http://schemas.microsoft.com/office/drawing/2014/main" id="{E712475B-76B8-2A44-CB1F-6FB9CF4309AB}"/>
+              </a:ext>
+            </a:extLst>
+          </p:cNvPr>
+          <p:cNvPicPr>
+            <a:picLocks noChangeAspect="1"/>
+          </p:cNvPicPr>
+          <p:nvPr/>
+        </p:nvPicPr>
+        <p:blipFill>
+          <a:blip r:embed="rId25"/>
+          <a:stretch>
+            <a:fillRect/>
+          </a:stretch>
+        </p:blipFill>
+        <p:spPr>
+          <a:xfrm>
+            <a:off x="2963761" y="74368"/>
+            <a:ext cx="575664" cy="575664"/>
+          </a:xfrm>
+          <a:prstGeom prst="rect">
+            <a:avLst/>
+          </a:prstGeom>
+        </p:spPr>
+      </p:pic>
+      <p:pic>
+        <p:nvPicPr>
+          <p:cNvPr id="2098" name="Picture 50" descr="Download Google Cloud Platform (GCP) Logo in SVG Vector or PNG File Format  - Logo.wine">
+            <a:extLst>
+              <a:ext uri="{FF2B5EF4-FFF2-40B4-BE49-F238E27FC236}">
+                <a16:creationId xmlns:a16="http://schemas.microsoft.com/office/drawing/2014/main" id="{F9684C38-6A9E-3957-516C-C6E2487FDA45}"/>
+              </a:ext>
+            </a:extLst>
+          </p:cNvPr>
+          <p:cNvPicPr>
+            <a:picLocks noChangeAspect="1" noChangeArrowheads="1"/>
+          </p:cNvPicPr>
+          <p:nvPr/>
+        </p:nvPicPr>
+        <p:blipFill>
+          <a:blip r:embed="rId26">
+            <a:extLst>
+              <a:ext uri="{28A0092B-C50C-407E-A947-70E740481C1C}">
+                <a14:useLocalDpi xmlns:a14="http://schemas.microsoft.com/office/drawing/2010/main" val="0"/>
+              </a:ext>
+            </a:extLst>
+          </a:blip>
+          <a:srcRect/>
+          <a:stretch>
+            <a:fillRect/>
+          </a:stretch>
+        </p:blipFill>
+        <p:spPr bwMode="auto">
+          <a:xfrm>
+            <a:off x="9242856" y="2863216"/>
+            <a:ext cx="3204300" cy="2136200"/>
+          </a:xfrm>
+          <a:prstGeom prst="rect">
+            <a:avLst/>
+          </a:prstGeom>
+          <a:noFill/>
+          <a:extLst>
+            <a:ext uri="{909E8E84-426E-40DD-AFC4-6F175D3DCCD1}">
+              <a14:hiddenFill xmlns:a14="http://schemas.microsoft.com/office/drawing/2010/main">
+                <a:solidFill>
+                  <a:srgbClr val="FFFFFF"/>
+                </a:solidFill>
+              </a14:hiddenFill>
+            </a:ext>
+          </a:extLst>
+        </p:spPr>
+      </p:pic>
+      <p:pic>
+        <p:nvPicPr>
+          <p:cNvPr id="2100" name="Picture 52">
+            <a:extLst>
+              <a:ext uri="{FF2B5EF4-FFF2-40B4-BE49-F238E27FC236}">
+                <a16:creationId xmlns:a16="http://schemas.microsoft.com/office/drawing/2014/main" id="{E98B80C4-3EB2-70FB-89BC-0D4C46B989D4}"/>
+              </a:ext>
+            </a:extLst>
+          </p:cNvPr>
+          <p:cNvPicPr>
+            <a:picLocks noChangeAspect="1" noChangeArrowheads="1"/>
+          </p:cNvPicPr>
+          <p:nvPr/>
+        </p:nvPicPr>
+        <p:blipFill>
+          <a:blip r:embed="rId27">
+            <a:extLst>
+              <a:ext uri="{28A0092B-C50C-407E-A947-70E740481C1C}">
+                <a14:useLocalDpi xmlns:a14="http://schemas.microsoft.com/office/drawing/2010/main" val="0"/>
+              </a:ext>
+            </a:extLst>
+          </a:blip>
+          <a:srcRect/>
+          <a:stretch>
+            <a:fillRect/>
+          </a:stretch>
+        </p:blipFill>
+        <p:spPr bwMode="auto">
+          <a:xfrm>
+            <a:off x="10191594" y="4231890"/>
+            <a:ext cx="1269791" cy="367049"/>
+          </a:xfrm>
+          <a:prstGeom prst="rect">
+            <a:avLst/>
+          </a:prstGeom>
+          <a:noFill/>
+          <a:extLst>
+            <a:ext uri="{909E8E84-426E-40DD-AFC4-6F175D3DCCD1}">
+              <a14:hiddenFill xmlns:a14="http://schemas.microsoft.com/office/drawing/2010/main">
+                <a:solidFill>
+                  <a:srgbClr val="FFFFFF"/>
+                </a:solidFill>
+              </a14:hiddenFill>
+            </a:ext>
+          </a:extLst>
+        </p:spPr>
+      </p:pic>
+      <p:pic>
+        <p:nvPicPr>
+          <p:cNvPr id="2102" name="Picture 54" descr="Amazon Web Services (AWS): A cloud computing platform that provides a wide  range of services.">
+            <a:extLst>
+              <a:ext uri="{FF2B5EF4-FFF2-40B4-BE49-F238E27FC236}">
+                <a16:creationId xmlns:a16="http://schemas.microsoft.com/office/drawing/2014/main" id="{DB08C80C-A7CA-DD70-0B0D-58858EE80FA0}"/>
+              </a:ext>
+            </a:extLst>
+          </p:cNvPr>
+          <p:cNvPicPr>
+            <a:picLocks noChangeAspect="1" noChangeArrowheads="1"/>
+          </p:cNvPicPr>
+          <p:nvPr/>
+        </p:nvPicPr>
+        <p:blipFill>
+          <a:blip r:embed="rId28">
+            <a:extLst>
+              <a:ext uri="{28A0092B-C50C-407E-A947-70E740481C1C}">
+                <a14:useLocalDpi xmlns:a14="http://schemas.microsoft.com/office/drawing/2010/main" val="0"/>
+              </a:ext>
+            </a:extLst>
+          </a:blip>
+          <a:srcRect/>
+          <a:stretch>
+            <a:fillRect/>
+          </a:stretch>
+        </p:blipFill>
+        <p:spPr bwMode="auto">
+          <a:xfrm>
+            <a:off x="10031463" y="2958254"/>
+            <a:ext cx="1547690" cy="581996"/>
+          </a:xfrm>
+          <a:prstGeom prst="rect">
+            <a:avLst/>
+          </a:prstGeom>
+          <a:noFill/>
+          <a:extLst>
+            <a:ext uri="{909E8E84-426E-40DD-AFC4-6F175D3DCCD1}">
+              <a14:hiddenFill xmlns:a14="http://schemas.microsoft.com/office/drawing/2010/main">
+                <a:solidFill>
+                  <a:srgbClr val="FFFFFF"/>
+                </a:solidFill>
+              </a14:hiddenFill>
+            </a:ext>
+          </a:extLst>
+        </p:spPr>
+      </p:pic>
+      <p:sp>
+        <p:nvSpPr>
+          <p:cNvPr id="30" name="Down Arrow 29">
+            <a:extLst>
+              <a:ext uri="{FF2B5EF4-FFF2-40B4-BE49-F238E27FC236}">
+                <a16:creationId xmlns:a16="http://schemas.microsoft.com/office/drawing/2014/main" id="{E2BBCAC3-396B-537E-9071-00E6B66D054B}"/>
+              </a:ext>
+            </a:extLst>
+          </p:cNvPr>
+          <p:cNvSpPr/>
+          <p:nvPr/>
+        </p:nvSpPr>
+        <p:spPr>
+          <a:xfrm rot="14251787">
+            <a:off x="8520103" y="3559764"/>
+            <a:ext cx="224142" cy="2018085"/>
+          </a:xfrm>
+          <a:prstGeom prst="downArrow">
+            <a:avLst/>
+          </a:prstGeom>
+        </p:spPr>
+        <p:style>
+          <a:lnRef idx="2">
+            <a:schemeClr val="accent1">
+              <a:shade val="15000"/>
+            </a:schemeClr>
+          </a:lnRef>
+          <a:fillRef idx="1">
+            <a:schemeClr val="accent1"/>
+          </a:fillRef>
+          <a:effectRef idx="0">
+            <a:schemeClr val="accent1"/>
+          </a:effectRef>
+          <a:fontRef idx="minor">
+            <a:schemeClr val="lt1"/>
+          </a:fontRef>
+        </p:style>
+        <p:txBody>
+          <a:bodyPr rtlCol="0" anchor="ctr"/>
+          <a:lstStyle/>
+          <a:p>
+            <a:pPr algn="ctr"/>
+            <a:endParaRPr lang="en-US"/>
+          </a:p>
+        </p:txBody>
+      </p:sp>
+      <p:sp>
+        <p:nvSpPr>
+          <p:cNvPr id="31" name="TextBox 30">
+            <a:extLst>
+              <a:ext uri="{FF2B5EF4-FFF2-40B4-BE49-F238E27FC236}">
+                <a16:creationId xmlns:a16="http://schemas.microsoft.com/office/drawing/2014/main" id="{D8DCB48B-B20E-CF93-90CC-DF711F034A83}"/>
+              </a:ext>
+            </a:extLst>
+          </p:cNvPr>
+          <p:cNvSpPr txBox="1"/>
+          <p:nvPr/>
+        </p:nvSpPr>
+        <p:spPr>
+          <a:xfrm rot="19611978">
+            <a:off x="8070017" y="4139823"/>
+            <a:ext cx="872803" cy="369332"/>
+          </a:xfrm>
+          <a:prstGeom prst="rect">
+            <a:avLst/>
+          </a:prstGeom>
+          <a:noFill/>
+        </p:spPr>
+        <p:txBody>
+          <a:bodyPr wrap="none" rtlCol="0">
+            <a:spAutoFit/>
+          </a:bodyPr>
+          <a:lstStyle/>
+          <a:p>
+            <a:r>
+              <a:rPr lang="en-US" dirty="0"/>
+              <a:t>Ship to</a:t>
+            </a:r>
+          </a:p>
+        </p:txBody>
+      </p:sp>
+      <p:sp>
+        <p:nvSpPr>
+          <p:cNvPr id="32" name="TextBox 31">
+            <a:extLst>
+              <a:ext uri="{FF2B5EF4-FFF2-40B4-BE49-F238E27FC236}">
+                <a16:creationId xmlns:a16="http://schemas.microsoft.com/office/drawing/2014/main" id="{CDAAC947-1DD6-6702-E942-B89833AA7428}"/>
+              </a:ext>
+            </a:extLst>
+          </p:cNvPr>
+          <p:cNvSpPr txBox="1"/>
+          <p:nvPr/>
+        </p:nvSpPr>
+        <p:spPr>
+          <a:xfrm>
+            <a:off x="10082006" y="4719064"/>
+            <a:ext cx="1109599" cy="253916"/>
+          </a:xfrm>
+          <a:prstGeom prst="rect">
+            <a:avLst/>
+          </a:prstGeom>
+          <a:noFill/>
+        </p:spPr>
+        <p:txBody>
+          <a:bodyPr wrap="none" rtlCol="0">
+            <a:spAutoFit/>
+          </a:bodyPr>
+          <a:lstStyle/>
+          <a:p>
+            <a:r>
+              <a:rPr lang="en-US" sz="1050" dirty="0"/>
+              <a:t>Cloud Providers</a:t>
+            </a:r>
+          </a:p>
+        </p:txBody>
+      </p:sp>
+    </p:spTree>
+    <p:extLst>
+      <p:ext uri="{BB962C8B-B14F-4D97-AF65-F5344CB8AC3E}">
+        <p14:creationId xmlns:p14="http://schemas.microsoft.com/office/powerpoint/2010/main" val="1621694639"/>
+      </p:ext>
+    </p:extLst>
+  </p:cSld>
+  <p:clrMapOvr>
+    <a:masterClrMapping/>
+  </p:clrMapOvr>
+</p:sld>
+</file>
+
 <file path=ppt/theme/theme1.xml><?xml version="1.0" encoding="utf-8"?>
 <a:theme xmlns:a="http://schemas.openxmlformats.org/drawingml/2006/main" name="Office Theme">
   <a:themeElements>

</xml_diff>